<commit_message>
Adjust similarity tolerance for ZoomToArea Test
</commit_message>
<xml_diff>
--- a/doc/test/ZoomLab/ZoomToArea.pptx
+++ b/doc/test/ZoomLab/ZoomToArea.pptx
@@ -20,37 +20,37 @@
     <p:sldId id="375" r:id="rId14"/>
     <p:sldId id="376" r:id="rId15"/>
     <p:sldId id="296" r:id="rId16"/>
-    <p:sldId id="374" r:id="rId17"/>
-    <p:sldId id="297" r:id="rId18"/>
-    <p:sldId id="362" r:id="rId19"/>
-    <p:sldId id="363" r:id="rId20"/>
-    <p:sldId id="366" r:id="rId21"/>
-    <p:sldId id="365" r:id="rId22"/>
-    <p:sldId id="369" r:id="rId23"/>
-    <p:sldId id="368" r:id="rId24"/>
-    <p:sldId id="372" r:id="rId25"/>
-    <p:sldId id="371" r:id="rId26"/>
-    <p:sldId id="373" r:id="rId27"/>
+    <p:sldId id="410" r:id="rId17"/>
+    <p:sldId id="374" r:id="rId18"/>
+    <p:sldId id="398" r:id="rId19"/>
+    <p:sldId id="399" r:id="rId20"/>
+    <p:sldId id="402" r:id="rId21"/>
+    <p:sldId id="401" r:id="rId22"/>
+    <p:sldId id="405" r:id="rId23"/>
+    <p:sldId id="404" r:id="rId24"/>
+    <p:sldId id="408" r:id="rId25"/>
+    <p:sldId id="407" r:id="rId26"/>
+    <p:sldId id="409" r:id="rId27"/>
     <p:sldId id="318" r:id="rId28"/>
     <p:sldId id="319" r:id="rId29"/>
-    <p:sldId id="360" r:id="rId30"/>
-    <p:sldId id="361" r:id="rId31"/>
+    <p:sldId id="396" r:id="rId30"/>
+    <p:sldId id="397" r:id="rId31"/>
     <p:sldId id="324" r:id="rId32"/>
     <p:sldId id="325" r:id="rId33"/>
-    <p:sldId id="347" r:id="rId34"/>
-    <p:sldId id="348" r:id="rId35"/>
-    <p:sldId id="349" r:id="rId36"/>
-    <p:sldId id="352" r:id="rId37"/>
-    <p:sldId id="351" r:id="rId38"/>
-    <p:sldId id="355" r:id="rId39"/>
-    <p:sldId id="354" r:id="rId40"/>
-    <p:sldId id="358" r:id="rId41"/>
-    <p:sldId id="357" r:id="rId42"/>
-    <p:sldId id="359" r:id="rId43"/>
+    <p:sldId id="383" r:id="rId34"/>
+    <p:sldId id="384" r:id="rId35"/>
+    <p:sldId id="385" r:id="rId36"/>
+    <p:sldId id="388" r:id="rId37"/>
+    <p:sldId id="387" r:id="rId38"/>
+    <p:sldId id="391" r:id="rId39"/>
+    <p:sldId id="390" r:id="rId40"/>
+    <p:sldId id="394" r:id="rId41"/>
+    <p:sldId id="393" r:id="rId42"/>
+    <p:sldId id="395" r:id="rId43"/>
     <p:sldId id="322" r:id="rId44"/>
     <p:sldId id="323" r:id="rId45"/>
-    <p:sldId id="345" r:id="rId46"/>
-    <p:sldId id="346" r:id="rId47"/>
+    <p:sldId id="381" r:id="rId46"/>
+    <p:sldId id="382" r:id="rId47"/>
     <p:sldId id="304" r:id="rId48"/>
   </p:sldIdLst>
   <p:sldSz cx="9144000" cy="6858000" type="screen4x3"/>
@@ -172,37 +172,37 @@
             <p14:sldId id="375"/>
             <p14:sldId id="376"/>
             <p14:sldId id="296"/>
+            <p14:sldId id="410"/>
             <p14:sldId id="374"/>
-            <p14:sldId id="297"/>
-            <p14:sldId id="362"/>
-            <p14:sldId id="363"/>
-            <p14:sldId id="366"/>
-            <p14:sldId id="365"/>
-            <p14:sldId id="369"/>
-            <p14:sldId id="368"/>
-            <p14:sldId id="372"/>
-            <p14:sldId id="371"/>
-            <p14:sldId id="373"/>
+            <p14:sldId id="398"/>
+            <p14:sldId id="399"/>
+            <p14:sldId id="402"/>
+            <p14:sldId id="401"/>
+            <p14:sldId id="405"/>
+            <p14:sldId id="404"/>
+            <p14:sldId id="408"/>
+            <p14:sldId id="407"/>
+            <p14:sldId id="409"/>
             <p14:sldId id="318"/>
             <p14:sldId id="319"/>
-            <p14:sldId id="360"/>
-            <p14:sldId id="361"/>
+            <p14:sldId id="396"/>
+            <p14:sldId id="397"/>
             <p14:sldId id="324"/>
             <p14:sldId id="325"/>
-            <p14:sldId id="347"/>
-            <p14:sldId id="348"/>
-            <p14:sldId id="349"/>
-            <p14:sldId id="352"/>
-            <p14:sldId id="351"/>
-            <p14:sldId id="355"/>
-            <p14:sldId id="354"/>
-            <p14:sldId id="358"/>
-            <p14:sldId id="357"/>
-            <p14:sldId id="359"/>
+            <p14:sldId id="383"/>
+            <p14:sldId id="384"/>
+            <p14:sldId id="385"/>
+            <p14:sldId id="388"/>
+            <p14:sldId id="387"/>
+            <p14:sldId id="391"/>
+            <p14:sldId id="390"/>
+            <p14:sldId id="394"/>
+            <p14:sldId id="393"/>
+            <p14:sldId id="395"/>
             <p14:sldId id="322"/>
             <p14:sldId id="323"/>
-            <p14:sldId id="345"/>
-            <p14:sldId id="346"/>
+            <p14:sldId id="381"/>
+            <p14:sldId id="382"/>
             <p14:sldId id="304"/>
           </p14:sldIdLst>
         </p14:section>
@@ -407,7 +407,7 @@
           <a:p>
             <a:fld id="{699DC775-C286-4358-8C92-D7E584E969B3}" type="datetimeFigureOut">
               <a:rPr lang="en-US" smtClean="0"/>
-              <a:t>5/11/2017</a:t>
+              <a:t>4/12/2019</a:t>
             </a:fld>
             <a:endParaRPr lang="en-US"/>
           </a:p>
@@ -577,7 +577,7 @@
           <a:p>
             <a:fld id="{699DC775-C286-4358-8C92-D7E584E969B3}" type="datetimeFigureOut">
               <a:rPr lang="en-US" smtClean="0"/>
-              <a:t>5/11/2017</a:t>
+              <a:t>4/12/2019</a:t>
             </a:fld>
             <a:endParaRPr lang="en-US"/>
           </a:p>
@@ -757,7 +757,7 @@
           <a:p>
             <a:fld id="{699DC775-C286-4358-8C92-D7E584E969B3}" type="datetimeFigureOut">
               <a:rPr lang="en-US" smtClean="0"/>
-              <a:t>5/11/2017</a:t>
+              <a:t>4/12/2019</a:t>
             </a:fld>
             <a:endParaRPr lang="en-US"/>
           </a:p>
@@ -999,7 +999,7 @@
           <a:p>
             <a:fld id="{699DC775-C286-4358-8C92-D7E584E969B3}" type="datetimeFigureOut">
               <a:rPr lang="en-US" smtClean="0"/>
-              <a:t>5/11/2017</a:t>
+              <a:t>4/12/2019</a:t>
             </a:fld>
             <a:endParaRPr lang="en-US"/>
           </a:p>
@@ -1169,7 +1169,7 @@
           <a:p>
             <a:fld id="{699DC775-C286-4358-8C92-D7E584E969B3}" type="datetimeFigureOut">
               <a:rPr lang="en-US" smtClean="0"/>
-              <a:t>5/11/2017</a:t>
+              <a:t>4/12/2019</a:t>
             </a:fld>
             <a:endParaRPr lang="en-US"/>
           </a:p>
@@ -1415,7 +1415,7 @@
           <a:p>
             <a:fld id="{699DC775-C286-4358-8C92-D7E584E969B3}" type="datetimeFigureOut">
               <a:rPr lang="en-US" smtClean="0"/>
-              <a:t>5/11/2017</a:t>
+              <a:t>4/12/2019</a:t>
             </a:fld>
             <a:endParaRPr lang="en-US"/>
           </a:p>
@@ -1703,7 +1703,7 @@
           <a:p>
             <a:fld id="{699DC775-C286-4358-8C92-D7E584E969B3}" type="datetimeFigureOut">
               <a:rPr lang="en-US" smtClean="0"/>
-              <a:t>5/11/2017</a:t>
+              <a:t>4/12/2019</a:t>
             </a:fld>
             <a:endParaRPr lang="en-US"/>
           </a:p>
@@ -2125,7 +2125,7 @@
           <a:p>
             <a:fld id="{699DC775-C286-4358-8C92-D7E584E969B3}" type="datetimeFigureOut">
               <a:rPr lang="en-US" smtClean="0"/>
-              <a:t>5/11/2017</a:t>
+              <a:t>4/12/2019</a:t>
             </a:fld>
             <a:endParaRPr lang="en-US"/>
           </a:p>
@@ -2243,7 +2243,7 @@
           <a:p>
             <a:fld id="{699DC775-C286-4358-8C92-D7E584E969B3}" type="datetimeFigureOut">
               <a:rPr lang="en-US" smtClean="0"/>
-              <a:t>5/11/2017</a:t>
+              <a:t>4/12/2019</a:t>
             </a:fld>
             <a:endParaRPr lang="en-US"/>
           </a:p>
@@ -2338,7 +2338,7 @@
           <a:p>
             <a:fld id="{699DC775-C286-4358-8C92-D7E584E969B3}" type="datetimeFigureOut">
               <a:rPr lang="en-US" smtClean="0"/>
-              <a:t>5/11/2017</a:t>
+              <a:t>4/12/2019</a:t>
             </a:fld>
             <a:endParaRPr lang="en-US"/>
           </a:p>
@@ -2615,7 +2615,7 @@
           <a:p>
             <a:fld id="{699DC775-C286-4358-8C92-D7E584E969B3}" type="datetimeFigureOut">
               <a:rPr lang="en-US" smtClean="0"/>
-              <a:t>5/11/2017</a:t>
+              <a:t>4/12/2019</a:t>
             </a:fld>
             <a:endParaRPr lang="en-US"/>
           </a:p>
@@ -2785,7 +2785,7 @@
           <a:p>
             <a:fld id="{699DC775-C286-4358-8C92-D7E584E969B3}" type="datetimeFigureOut">
               <a:rPr lang="en-US" smtClean="0"/>
-              <a:t>5/11/2017</a:t>
+              <a:t>4/12/2019</a:t>
             </a:fld>
             <a:endParaRPr lang="en-US"/>
           </a:p>
@@ -3038,7 +3038,7 @@
           <a:p>
             <a:fld id="{699DC775-C286-4358-8C92-D7E584E969B3}" type="datetimeFigureOut">
               <a:rPr lang="en-US" smtClean="0"/>
-              <a:t>5/11/2017</a:t>
+              <a:t>4/12/2019</a:t>
             </a:fld>
             <a:endParaRPr lang="en-US"/>
           </a:p>
@@ -3208,7 +3208,7 @@
           <a:p>
             <a:fld id="{699DC775-C286-4358-8C92-D7E584E969B3}" type="datetimeFigureOut">
               <a:rPr lang="en-US" smtClean="0"/>
-              <a:t>5/11/2017</a:t>
+              <a:t>4/12/2019</a:t>
             </a:fld>
             <a:endParaRPr lang="en-US"/>
           </a:p>
@@ -3388,7 +3388,7 @@
           <a:p>
             <a:fld id="{699DC775-C286-4358-8C92-D7E584E969B3}" type="datetimeFigureOut">
               <a:rPr lang="en-US" smtClean="0"/>
-              <a:t>5/11/2017</a:t>
+              <a:t>4/12/2019</a:t>
             </a:fld>
             <a:endParaRPr lang="en-US"/>
           </a:p>
@@ -3638,7 +3638,7 @@
           <a:p>
             <a:fld id="{699DC775-C286-4358-8C92-D7E584E969B3}" type="datetimeFigureOut">
               <a:rPr lang="en-US" smtClean="0"/>
-              <a:t>5/11/2017</a:t>
+              <a:t>4/12/2019</a:t>
             </a:fld>
             <a:endParaRPr lang="en-US"/>
           </a:p>
@@ -3816,7 +3816,7 @@
           <a:p>
             <a:fld id="{699DC775-C286-4358-8C92-D7E584E969B3}" type="datetimeFigureOut">
               <a:rPr lang="en-US" smtClean="0"/>
-              <a:t>5/11/2017</a:t>
+              <a:t>4/12/2019</a:t>
             </a:fld>
             <a:endParaRPr lang="en-US"/>
           </a:p>
@@ -4070,7 +4070,7 @@
           <a:p>
             <a:fld id="{699DC775-C286-4358-8C92-D7E584E969B3}" type="datetimeFigureOut">
               <a:rPr lang="en-US" smtClean="0"/>
-              <a:t>5/11/2017</a:t>
+              <a:t>4/12/2019</a:t>
             </a:fld>
             <a:endParaRPr lang="en-US"/>
           </a:p>
@@ -4366,7 +4366,7 @@
           <a:p>
             <a:fld id="{699DC775-C286-4358-8C92-D7E584E969B3}" type="datetimeFigureOut">
               <a:rPr lang="en-US" smtClean="0"/>
-              <a:t>5/11/2017</a:t>
+              <a:t>4/12/2019</a:t>
             </a:fld>
             <a:endParaRPr lang="en-US"/>
           </a:p>
@@ -4796,7 +4796,7 @@
           <a:p>
             <a:fld id="{699DC775-C286-4358-8C92-D7E584E969B3}" type="datetimeFigureOut">
               <a:rPr lang="en-US" smtClean="0"/>
-              <a:t>5/11/2017</a:t>
+              <a:t>4/12/2019</a:t>
             </a:fld>
             <a:endParaRPr lang="en-US"/>
           </a:p>
@@ -4922,7 +4922,7 @@
           <a:p>
             <a:fld id="{699DC775-C286-4358-8C92-D7E584E969B3}" type="datetimeFigureOut">
               <a:rPr lang="en-US" smtClean="0"/>
-              <a:t>5/11/2017</a:t>
+              <a:t>4/12/2019</a:t>
             </a:fld>
             <a:endParaRPr lang="en-US"/>
           </a:p>
@@ -5025,7 +5025,7 @@
           <a:p>
             <a:fld id="{699DC775-C286-4358-8C92-D7E584E969B3}" type="datetimeFigureOut">
               <a:rPr lang="en-US" smtClean="0"/>
-              <a:t>5/11/2017</a:t>
+              <a:t>4/12/2019</a:t>
             </a:fld>
             <a:endParaRPr lang="en-US"/>
           </a:p>
@@ -5271,7 +5271,7 @@
           <a:p>
             <a:fld id="{699DC775-C286-4358-8C92-D7E584E969B3}" type="datetimeFigureOut">
               <a:rPr lang="en-US" smtClean="0"/>
-              <a:t>5/11/2017</a:t>
+              <a:t>4/12/2019</a:t>
             </a:fld>
             <a:endParaRPr lang="en-US"/>
           </a:p>
@@ -5556,7 +5556,7 @@
           <a:p>
             <a:fld id="{699DC775-C286-4358-8C92-D7E584E969B3}" type="datetimeFigureOut">
               <a:rPr lang="en-US" smtClean="0"/>
-              <a:t>5/11/2017</a:t>
+              <a:t>4/12/2019</a:t>
             </a:fld>
             <a:endParaRPr lang="en-US"/>
           </a:p>
@@ -5817,7 +5817,7 @@
           <a:p>
             <a:fld id="{699DC775-C286-4358-8C92-D7E584E969B3}" type="datetimeFigureOut">
               <a:rPr lang="en-US" smtClean="0"/>
-              <a:t>5/11/2017</a:t>
+              <a:t>4/12/2019</a:t>
             </a:fld>
             <a:endParaRPr lang="en-US"/>
           </a:p>
@@ -5995,7 +5995,7 @@
           <a:p>
             <a:fld id="{699DC775-C286-4358-8C92-D7E584E969B3}" type="datetimeFigureOut">
               <a:rPr lang="en-US" smtClean="0"/>
-              <a:t>5/11/2017</a:t>
+              <a:t>4/12/2019</a:t>
             </a:fld>
             <a:endParaRPr lang="en-US"/>
           </a:p>
@@ -6183,7 +6183,7 @@
           <a:p>
             <a:fld id="{699DC775-C286-4358-8C92-D7E584E969B3}" type="datetimeFigureOut">
               <a:rPr lang="en-US" smtClean="0"/>
-              <a:t>5/11/2017</a:t>
+              <a:t>4/12/2019</a:t>
             </a:fld>
             <a:endParaRPr lang="en-US"/>
           </a:p>
@@ -6471,7 +6471,7 @@
           <a:p>
             <a:fld id="{699DC775-C286-4358-8C92-D7E584E969B3}" type="datetimeFigureOut">
               <a:rPr lang="en-US" smtClean="0"/>
-              <a:t>5/11/2017</a:t>
+              <a:t>4/12/2019</a:t>
             </a:fld>
             <a:endParaRPr lang="en-US"/>
           </a:p>
@@ -6893,7 +6893,7 @@
           <a:p>
             <a:fld id="{699DC775-C286-4358-8C92-D7E584E969B3}" type="datetimeFigureOut">
               <a:rPr lang="en-US" smtClean="0"/>
-              <a:t>5/11/2017</a:t>
+              <a:t>4/12/2019</a:t>
             </a:fld>
             <a:endParaRPr lang="en-US"/>
           </a:p>
@@ -7011,7 +7011,7 @@
           <a:p>
             <a:fld id="{699DC775-C286-4358-8C92-D7E584E969B3}" type="datetimeFigureOut">
               <a:rPr lang="en-US" smtClean="0"/>
-              <a:t>5/11/2017</a:t>
+              <a:t>4/12/2019</a:t>
             </a:fld>
             <a:endParaRPr lang="en-US"/>
           </a:p>
@@ -7106,7 +7106,7 @@
           <a:p>
             <a:fld id="{699DC775-C286-4358-8C92-D7E584E969B3}" type="datetimeFigureOut">
               <a:rPr lang="en-US" smtClean="0"/>
-              <a:t>5/11/2017</a:t>
+              <a:t>4/12/2019</a:t>
             </a:fld>
             <a:endParaRPr lang="en-US"/>
           </a:p>
@@ -7383,7 +7383,7 @@
           <a:p>
             <a:fld id="{699DC775-C286-4358-8C92-D7E584E969B3}" type="datetimeFigureOut">
               <a:rPr lang="en-US" smtClean="0"/>
-              <a:t>5/11/2017</a:t>
+              <a:t>4/12/2019</a:t>
             </a:fld>
             <a:endParaRPr lang="en-US"/>
           </a:p>
@@ -7636,7 +7636,7 @@
           <a:p>
             <a:fld id="{699DC775-C286-4358-8C92-D7E584E969B3}" type="datetimeFigureOut">
               <a:rPr lang="en-US" smtClean="0"/>
-              <a:t>5/11/2017</a:t>
+              <a:t>4/12/2019</a:t>
             </a:fld>
             <a:endParaRPr lang="en-US"/>
           </a:p>
@@ -7849,7 +7849,7 @@
           <a:p>
             <a:fld id="{699DC775-C286-4358-8C92-D7E584E969B3}" type="datetimeFigureOut">
               <a:rPr lang="en-US" smtClean="0"/>
-              <a:t>5/11/2017</a:t>
+              <a:t>4/12/2019</a:t>
             </a:fld>
             <a:endParaRPr lang="en-US"/>
           </a:p>
@@ -8364,7 +8364,7 @@
           <a:p>
             <a:fld id="{699DC775-C286-4358-8C92-D7E584E969B3}" type="datetimeFigureOut">
               <a:rPr lang="en-US" smtClean="0"/>
-              <a:t>5/11/2017</a:t>
+              <a:t>4/12/2019</a:t>
             </a:fld>
             <a:endParaRPr lang="en-US"/>
           </a:p>
@@ -8877,7 +8877,7 @@
           <a:p>
             <a:fld id="{699DC775-C286-4358-8C92-D7E584E969B3}" type="datetimeFigureOut">
               <a:rPr lang="en-US" smtClean="0"/>
-              <a:t>5/11/2017</a:t>
+              <a:t>4/12/2019</a:t>
             </a:fld>
             <a:endParaRPr lang="en-US"/>
           </a:p>
@@ -10347,11 +10347,11 @@
   <p:clrMapOvr>
     <a:masterClrMapping/>
   </p:clrMapOvr>
-  <mc:AlternateContent xmlns:mc="http://schemas.openxmlformats.org/markup-compatibility/2006">
-    <mc:Choice xmlns:p14="http://schemas.microsoft.com/office/powerpoint/2010/main" Requires="p14">
+  <mc:AlternateContent xmlns:mc="http://schemas.openxmlformats.org/markup-compatibility/2006" xmlns:p14="http://schemas.microsoft.com/office/powerpoint/2010/main">
+    <mc:Choice Requires="p14">
       <p:transition spd="slow" p14:dur="2000"/>
     </mc:Choice>
-    <mc:Fallback>
+    <mc:Fallback xmlns="">
       <p:transition spd="slow"/>
     </mc:Fallback>
   </mc:AlternateContent>
@@ -11430,18 +11430,18 @@
     </p:spTree>
     <p:extLst>
       <p:ext uri="{BB962C8B-B14F-4D97-AF65-F5344CB8AC3E}">
-        <p14:creationId xmlns:p14="http://schemas.microsoft.com/office/powerpoint/2010/main" val="3684537491"/>
+        <p14:creationId xmlns:p14="http://schemas.microsoft.com/office/powerpoint/2010/main" val="3806220602"/>
       </p:ext>
     </p:extLst>
   </p:cSld>
   <p:clrMapOvr>
     <a:masterClrMapping/>
   </p:clrMapOvr>
-  <mc:AlternateContent xmlns:mc="http://schemas.openxmlformats.org/markup-compatibility/2006" xmlns:p14="http://schemas.microsoft.com/office/powerpoint/2010/main">
-    <mc:Choice Requires="p14">
+  <mc:AlternateContent xmlns:mc="http://schemas.openxmlformats.org/markup-compatibility/2006">
+    <mc:Choice xmlns:p14="http://schemas.microsoft.com/office/powerpoint/2010/main" Requires="p14">
       <p:transition spd="slow" p14:dur="2000" advTm="1000"/>
     </mc:Choice>
-    <mc:Fallback xmlns="">
+    <mc:Fallback>
       <p:transition spd="slow" advTm="1000"/>
     </mc:Fallback>
   </mc:AlternateContent>
@@ -11759,7 +11759,7 @@
 
 <file path=ppt/slides/slide15.xml><?xml version="1.0" encoding="utf-8"?>
 <p:sld xmlns:a="http://schemas.openxmlformats.org/drawingml/2006/main" xmlns:r="http://schemas.openxmlformats.org/officeDocument/2006/relationships" xmlns:p="http://schemas.openxmlformats.org/presentationml/2006/main">
-  <p:cSld name="PPTLabsZoomToAreaSlide201705111428194626">
+  <p:cSld name="PPTLabsZoomToAreaSlide201904121153331525">
     <p:bg>
       <p:bgPr>
         <a:solidFill>
@@ -12092,7 +12092,7 @@
       </p:sp>
       <p:sp>
         <p:nvSpPr>
-          <p:cNvPr id="3" name="PPTLabsMagnifyShape201705111428194645"/>
+          <p:cNvPr id="3" name="PPTLabsMagnifyShape201904121153331525"/>
           <p:cNvSpPr/>
           <p:nvPr/>
         </p:nvSpPr>
@@ -12139,14 +12139,14 @@
           <a:p>
             <a:pPr algn="ctr"/>
             <a:r>
-              <a:rPr lang="en-US" b="1" smtClean="0">
+              <a:rPr lang="en-SG" b="1" smtClean="0">
                 <a:solidFill>
                   <a:srgbClr val="FFFFFF"/>
                 </a:solidFill>
               </a:rPr>
               <a:t>Zoom Shape 1</a:t>
             </a:r>
-            <a:endParaRPr lang="en-US" b="1">
+            <a:endParaRPr lang="en-SG" b="1">
               <a:solidFill>
                 <a:srgbClr val="FFFFFF"/>
               </a:solidFill>
@@ -12156,7 +12156,7 @@
       </p:sp>
       <p:sp>
         <p:nvSpPr>
-          <p:cNvPr id="8" name="PPTLabsMagnifyShape201705111428194696"/>
+          <p:cNvPr id="8" name="PPTLabsMagnifyShape201904121153331575"/>
           <p:cNvSpPr/>
           <p:nvPr/>
         </p:nvSpPr>
@@ -12203,14 +12203,14 @@
           <a:p>
             <a:pPr algn="ctr"/>
             <a:r>
-              <a:rPr lang="en-US" b="1" smtClean="0">
+              <a:rPr lang="en-SG" b="1" smtClean="0">
                 <a:solidFill>
                   <a:srgbClr val="FFFFFF"/>
                 </a:solidFill>
               </a:rPr>
               <a:t>Zoom Shape 2</a:t>
             </a:r>
-            <a:endParaRPr lang="en-US" b="1">
+            <a:endParaRPr lang="en-SG" b="1">
               <a:solidFill>
                 <a:srgbClr val="FFFFFF"/>
               </a:solidFill>
@@ -12220,7 +12220,7 @@
       </p:sp>
       <p:sp>
         <p:nvSpPr>
-          <p:cNvPr id="9" name="PPTLabsMagnifyShape201705111428194756"/>
+          <p:cNvPr id="9" name="PPTLabsMagnifyShape201904121153331604"/>
           <p:cNvSpPr/>
           <p:nvPr/>
         </p:nvSpPr>
@@ -12267,14 +12267,14 @@
           <a:p>
             <a:pPr algn="ctr"/>
             <a:r>
-              <a:rPr lang="en-US" b="1" smtClean="0">
+              <a:rPr lang="en-SG" b="1" smtClean="0">
                 <a:solidFill>
                   <a:srgbClr val="FFFFFF"/>
                 </a:solidFill>
               </a:rPr>
               <a:t>Zoom Shape 3</a:t>
             </a:r>
-            <a:endParaRPr lang="en-US" b="1">
+            <a:endParaRPr lang="en-SG" b="1">
               <a:solidFill>
                 <a:srgbClr val="FFFFFF"/>
               </a:solidFill>
@@ -12284,7 +12284,7 @@
       </p:sp>
       <p:sp>
         <p:nvSpPr>
-          <p:cNvPr id="10" name="PPTLabsMagnifyShape201705111428194806"/>
+          <p:cNvPr id="10" name="PPTLabsMagnifyShape201904121153331644"/>
           <p:cNvSpPr/>
           <p:nvPr/>
         </p:nvSpPr>
@@ -12331,14 +12331,14 @@
           <a:p>
             <a:pPr algn="ctr"/>
             <a:r>
-              <a:rPr lang="en-US" b="1" smtClean="0">
+              <a:rPr lang="en-SG" b="1" smtClean="0">
                 <a:solidFill>
                   <a:srgbClr val="FFFFFF"/>
                 </a:solidFill>
               </a:rPr>
               <a:t>Zoom Shape 4</a:t>
             </a:r>
-            <a:endParaRPr lang="en-US" b="1">
+            <a:endParaRPr lang="en-SG" b="1">
               <a:solidFill>
                 <a:srgbClr val="FFFFFF"/>
               </a:solidFill>
@@ -12349,7 +12349,7 @@
     </p:spTree>
     <p:extLst>
       <p:ext uri="{BB962C8B-B14F-4D97-AF65-F5344CB8AC3E}">
-        <p14:creationId xmlns:p14="http://schemas.microsoft.com/office/powerpoint/2010/main" val="1061844167"/>
+        <p14:creationId xmlns:p14="http://schemas.microsoft.com/office/powerpoint/2010/main" val="3684537491"/>
       </p:ext>
     </p:extLst>
   </p:cSld>
@@ -12773,7 +12773,7 @@
 
 <file path=ppt/slides/slide16.xml><?xml version="1.0" encoding="utf-8"?>
 <p:sld xmlns:a="http://schemas.openxmlformats.org/drawingml/2006/main" xmlns:r="http://schemas.openxmlformats.org/officeDocument/2006/relationships" xmlns:p="http://schemas.openxmlformats.org/presentationml/2006/main">
-  <p:cSld name="PPTLabsMagnifyingSlide201705111428195046">
+  <p:cSld name="PPTLabsMagnifyingSlide201904121153331774">
     <p:bg>
       <p:bgPr>
         <a:solidFill>
@@ -12874,14 +12874,20 @@
       </p:sp>
       <p:pic>
         <p:nvPicPr>
-          <p:cNvPr id="5" name="PPTLabsMagnifyAreaGroup201705111428197711" hidden="1"/>
+          <p:cNvPr id="5" name="PPTLabsMagnifyAreaGroup201904121153336383" hidden="1"/>
           <p:cNvPicPr>
             <a:picLocks/>
           </p:cNvPicPr>
           <p:nvPr/>
         </p:nvPicPr>
         <p:blipFill>
-          <a:blip r:embed="rId3"/>
+          <a:blip r:embed="rId3">
+            <a:extLst>
+              <a:ext uri="{28A0092B-C50C-407E-A947-70E740481C1C}">
+                <a14:useLocalDpi xmlns:a14="http://schemas.microsoft.com/office/drawing/2010/main" val="0"/>
+              </a:ext>
+            </a:extLst>
+          </a:blip>
           <a:stretch>
             <a:fillRect/>
           </a:stretch>
@@ -12898,14 +12904,20 @@
       </p:pic>
       <p:pic>
         <p:nvPicPr>
-          <p:cNvPr id="22" name="PPTLabsMagnifyAreaSlide201705111428198221"/>
+          <p:cNvPr id="22" name="PPTLabsMagnifyAreaSlide201904121153336765"/>
           <p:cNvPicPr>
             <a:picLocks/>
           </p:cNvPicPr>
           <p:nvPr/>
         </p:nvPicPr>
         <p:blipFill>
-          <a:blip r:embed="rId3"/>
+          <a:blip r:embed="rId3">
+            <a:extLst>
+              <a:ext uri="{28A0092B-C50C-407E-A947-70E740481C1C}">
+                <a14:useLocalDpi xmlns:a14="http://schemas.microsoft.com/office/drawing/2010/main" val="0"/>
+              </a:ext>
+            </a:extLst>
+          </a:blip>
           <a:stretch>
             <a:fillRect/>
           </a:stretch>
@@ -12922,7 +12934,7 @@
       </p:pic>
       <p:pic>
         <p:nvPicPr>
-          <p:cNvPr id="6" name="PPTIndicator201705111428198191"/>
+          <p:cNvPr id="6" name="PPTIndicator201904121153336745"/>
           <p:cNvPicPr>
             <a:picLocks/>
           </p:cNvPicPr>
@@ -12953,7 +12965,7 @@
     </p:spTree>
     <p:extLst>
       <p:ext uri="{BB962C8B-B14F-4D97-AF65-F5344CB8AC3E}">
-        <p14:creationId xmlns:p14="http://schemas.microsoft.com/office/powerpoint/2010/main" val="789142181"/>
+        <p14:creationId xmlns:p14="http://schemas.microsoft.com/office/powerpoint/2010/main" val="2415337702"/>
       </p:ext>
     </p:extLst>
   </p:cSld>
@@ -13060,7 +13072,7 @@
                                     <p:cond delay="0"/>
                                   </p:stCondLst>
                                   <p:childTnLst>
-                                    <p:animMotion origin="layout" path="M 0 0 C 0.2105131 0.2478195 0.2105131 0.2478195 0.4210261 0.495639 E" pathEditMode="relative" ptsTypes="">
+                                    <p:animMotion origin="layout" path="M 0 0 C 0.2105131 0.2478196 0.2105131 0.2478196 0.4210261 0.4956393 E" pathEditMode="relative" ptsTypes="">
                                       <p:cBhvr>
                                         <p:cTn id="11" dur="500" fill="hold"/>
                                         <p:tgtEl>
@@ -13126,7 +13138,7 @@
 
 <file path=ppt/slides/slide17.xml><?xml version="1.0" encoding="utf-8"?>
 <p:sld xmlns:a="http://schemas.openxmlformats.org/drawingml/2006/main" xmlns:r="http://schemas.openxmlformats.org/officeDocument/2006/relationships" xmlns:p="http://schemas.openxmlformats.org/presentationml/2006/main">
-  <p:cSld name="PPTLabsMagnifiedSlide201705111428198241">
+  <p:cSld name="PPTLabsMagnifiedSlide201904121153336785">
     <p:bg>
       <p:bgPr>
         <a:solidFill>
@@ -13151,14 +13163,20 @@
       </p:grpSpPr>
       <p:pic>
         <p:nvPicPr>
-          <p:cNvPr id="5" name="PPTLabsMagnifyAreaGroup201705111428197711"/>
+          <p:cNvPr id="5" name="PPTLabsMagnifyAreaGroup201904121153336383"/>
           <p:cNvPicPr>
             <a:picLocks noChangeAspect="1"/>
           </p:cNvPicPr>
           <p:nvPr/>
         </p:nvPicPr>
         <p:blipFill>
-          <a:blip r:embed="rId2"/>
+          <a:blip r:embed="rId2">
+            <a:extLst>
+              <a:ext uri="{28A0092B-C50C-407E-A947-70E740481C1C}">
+                <a14:useLocalDpi xmlns:a14="http://schemas.microsoft.com/office/drawing/2010/main" val="0"/>
+              </a:ext>
+            </a:extLst>
+          </a:blip>
           <a:srcRect/>
           <a:stretch>
             <a:fillRect/>
@@ -13166,8 +13184,8 @@
         </p:blipFill>
         <p:spPr>
           <a:xfrm>
-            <a:off x="-2354749" y="-1254471"/>
-            <a:ext cx="21551802" cy="16163835"/>
+            <a:off x="-2354311" y="-1254200"/>
+            <a:ext cx="21549770" cy="16162343"/>
           </a:xfrm>
           <a:prstGeom prst="rect">
             <a:avLst/>
@@ -13176,7 +13194,7 @@
       </p:pic>
       <p:pic>
         <p:nvPicPr>
-          <p:cNvPr id="3" name="PPTIndicator201705111428198471"/>
+          <p:cNvPr id="3" name="PPTIndicator201904121153337003"/>
           <p:cNvPicPr>
             <a:picLocks/>
           </p:cNvPicPr>
@@ -13207,7 +13225,7 @@
     </p:spTree>
     <p:extLst>
       <p:ext uri="{BB962C8B-B14F-4D97-AF65-F5344CB8AC3E}">
-        <p14:creationId xmlns:p14="http://schemas.microsoft.com/office/powerpoint/2010/main" val="3438702707"/>
+        <p14:creationId xmlns:p14="http://schemas.microsoft.com/office/powerpoint/2010/main" val="3901356973"/>
       </p:ext>
     </p:extLst>
   </p:cSld>
@@ -13332,7 +13350,7 @@
 
 <file path=ppt/slides/slide18.xml><?xml version="1.0" encoding="utf-8"?>
 <p:sld xmlns:a="http://schemas.openxmlformats.org/drawingml/2006/main" xmlns:r="http://schemas.openxmlformats.org/officeDocument/2006/relationships" xmlns:p="http://schemas.openxmlformats.org/presentationml/2006/main">
-  <p:cSld name="PPTLabsMagnifiedPanSlide201705111428201825">
+  <p:cSld name="PPTLabsMagnifiedPanSlide201904121153342321">
     <p:bg>
       <p:bgPr>
         <a:solidFill>
@@ -13357,14 +13375,20 @@
       </p:grpSpPr>
       <p:pic>
         <p:nvPicPr>
-          <p:cNvPr id="5" name="PPTLabsMagnifyAreaGroup201705111428197711"/>
+          <p:cNvPr id="5" name="PPTLabsMagnifyAreaGroup201904121153336383"/>
           <p:cNvPicPr>
             <a:picLocks/>
           </p:cNvPicPr>
           <p:nvPr/>
         </p:nvPicPr>
         <p:blipFill>
-          <a:blip r:embed="rId2"/>
+          <a:blip r:embed="rId2">
+            <a:extLst>
+              <a:ext uri="{28A0092B-C50C-407E-A947-70E740481C1C}">
+                <a14:useLocalDpi xmlns:a14="http://schemas.microsoft.com/office/drawing/2010/main" val="0"/>
+              </a:ext>
+            </a:extLst>
+          </a:blip>
           <a:srcRect/>
           <a:stretch>
             <a:fillRect/>
@@ -13372,8 +13396,8 @@
         </p:blipFill>
         <p:spPr>
           <a:xfrm>
-            <a:off x="0" y="0"/>
-            <a:ext cx="9144000" cy="6857993"/>
+            <a:off x="1" y="0"/>
+            <a:ext cx="9143991" cy="6858000"/>
           </a:xfrm>
           <a:prstGeom prst="rect">
             <a:avLst/>
@@ -13382,14 +13406,20 @@
       </p:pic>
       <p:pic>
         <p:nvPicPr>
-          <p:cNvPr id="6" name="PPTLabsMagnifyAreaGroup201705111428197711"/>
+          <p:cNvPr id="6" name="PPTLabsMagnifyAreaGroup201904121153336383"/>
           <p:cNvPicPr>
             <a:picLocks/>
           </p:cNvPicPr>
           <p:nvPr/>
         </p:nvPicPr>
         <p:blipFill>
-          <a:blip r:embed="rId2"/>
+          <a:blip r:embed="rId2">
+            <a:extLst>
+              <a:ext uri="{28A0092B-C50C-407E-A947-70E740481C1C}">
+                <a14:useLocalDpi xmlns:a14="http://schemas.microsoft.com/office/drawing/2010/main" val="0"/>
+              </a:ext>
+            </a:extLst>
+          </a:blip>
           <a:srcRect/>
           <a:stretch>
             <a:fillRect/>
@@ -13397,8 +13427,8 @@
         </p:blipFill>
         <p:spPr>
           <a:xfrm>
-            <a:off x="-2354749" y="-1254471"/>
-            <a:ext cx="21551802" cy="16163835"/>
+            <a:off x="-2354311" y="-1254200"/>
+            <a:ext cx="21549770" cy="16162343"/>
           </a:xfrm>
           <a:prstGeom prst="rect">
             <a:avLst/>
@@ -13407,7 +13437,7 @@
       </p:pic>
       <p:pic>
         <p:nvPicPr>
-          <p:cNvPr id="2" name="PPTIndicator201705111428202131"/>
+          <p:cNvPr id="2" name="PPTIndicator201904121153342874"/>
           <p:cNvPicPr>
             <a:picLocks/>
           </p:cNvPicPr>
@@ -13438,7 +13468,7 @@
     </p:spTree>
     <p:extLst>
       <p:ext uri="{BB962C8B-B14F-4D97-AF65-F5344CB8AC3E}">
-        <p14:creationId xmlns:p14="http://schemas.microsoft.com/office/powerpoint/2010/main" val="3752020867"/>
+        <p14:creationId xmlns:p14="http://schemas.microsoft.com/office/powerpoint/2010/main" val="3486458233"/>
       </p:ext>
     </p:extLst>
   </p:cSld>
@@ -13536,7 +13566,7 @@
                                     <p:cond delay="0"/>
                                   </p:stCondLst>
                                   <p:childTnLst>
-                                    <p:animMotion origin="layout" path="M 0 0 C 0.2104742 0.2477727 0.2104742 0.2477727 0.4209484 0.4955453 E" pathEditMode="relative" ptsTypes="">
+                                    <p:animMotion origin="layout" path="M 0 0 C 0.2104428 0.2477378 0.2104428 0.2477378 0.4208856 0.4954756 E" pathEditMode="relative" ptsTypes="">
                                       <p:cBhvr>
                                         <p:cTn id="10" dur="1" fill="hold"/>
                                         <p:tgtEl>
@@ -13564,7 +13594,7 @@
                                           <p:spTgt spid="5"/>
                                         </p:tgtEl>
                                       </p:cBhvr>
-                                      <p:by x="235693" y="235693"/>
+                                      <p:by x="235671" y="235671"/>
                                     </p:animScale>
                                   </p:childTnLst>
                                 </p:cTn>
@@ -13619,7 +13649,7 @@
                                     <p:cond delay="0"/>
                                   </p:stCondLst>
                                   <p:childTnLst>
-                                    <p:animMotion origin="layout" path="M 0.4209484 0.4955453 C 0.4328169 0.9727173 0.4328169 0.9727173 0.4446853 1.449889 E" pathEditMode="relative" ptsTypes="">
+                                    <p:animMotion origin="layout" path="M 0.4208857 0.4954756 C 0.4327389 0.9724518 0.4327389 0.9724518 0.4445921 1.449428 E" pathEditMode="relative" ptsTypes="">
                                       <p:cBhvr>
                                         <p:cTn id="18" dur="400" fill="hold"/>
                                         <p:tgtEl>
@@ -13647,7 +13677,7 @@
                                           <p:spTgt spid="5"/>
                                         </p:tgtEl>
                                       </p:cBhvr>
-                                      <p:by x="224368" y="224372"/>
+                                      <p:by x="224342" y="224333"/>
                                     </p:animScale>
                                   </p:childTnLst>
                                 </p:cTn>
@@ -13685,7 +13715,7 @@
 
 <file path=ppt/slides/slide19.xml><?xml version="1.0" encoding="utf-8"?>
 <p:sld xmlns:a="http://schemas.openxmlformats.org/drawingml/2006/main" xmlns:r="http://schemas.openxmlformats.org/officeDocument/2006/relationships" xmlns:p="http://schemas.openxmlformats.org/presentationml/2006/main">
-  <p:cSld name="PPTLabsMagnifiedSlide201705111428201521">
+  <p:cSld name="PPTLabsMagnifiedSlide201904121153342002">
     <p:bg>
       <p:bgPr>
         <a:solidFill>
@@ -13710,14 +13740,20 @@
       </p:grpSpPr>
       <p:pic>
         <p:nvPicPr>
-          <p:cNvPr id="5" name="PPTLabsMagnifyAreaGroup201705111428201069"/>
+          <p:cNvPr id="5" name="PPTLabsMagnifyAreaGroup201904121153341672"/>
           <p:cNvPicPr>
             <a:picLocks noChangeAspect="1"/>
           </p:cNvPicPr>
           <p:nvPr/>
         </p:nvPicPr>
         <p:blipFill>
-          <a:blip r:embed="rId2"/>
+          <a:blip r:embed="rId2">
+            <a:extLst>
+              <a:ext uri="{28A0092B-C50C-407E-A947-70E740481C1C}">
+                <a14:useLocalDpi xmlns:a14="http://schemas.microsoft.com/office/drawing/2010/main" val="0"/>
+              </a:ext>
+            </a:extLst>
+          </a:blip>
           <a:srcRect/>
           <a:stretch>
             <a:fillRect/>
@@ -13725,8 +13761,8 @@
         </p:blipFill>
         <p:spPr>
           <a:xfrm>
-            <a:off x="-15539485" y="-4761187"/>
-            <a:ext cx="48355375" cy="36267051"/>
+            <a:off x="-15535223" y="-4759577"/>
+            <a:ext cx="48345137" cy="36257512"/>
           </a:xfrm>
           <a:prstGeom prst="rect">
             <a:avLst/>
@@ -13735,7 +13771,7 @@
       </p:pic>
       <p:pic>
         <p:nvPicPr>
-          <p:cNvPr id="3" name="PPTIndicator201705111428201795"/>
+          <p:cNvPr id="3" name="PPTIndicator201904121153342281"/>
           <p:cNvPicPr>
             <a:picLocks/>
           </p:cNvPicPr>
@@ -13766,7 +13802,7 @@
     </p:spTree>
     <p:extLst>
       <p:ext uri="{BB962C8B-B14F-4D97-AF65-F5344CB8AC3E}">
-        <p14:creationId xmlns:p14="http://schemas.microsoft.com/office/powerpoint/2010/main" val="847195898"/>
+        <p14:creationId xmlns:p14="http://schemas.microsoft.com/office/powerpoint/2010/main" val="3248401269"/>
       </p:ext>
     </p:extLst>
   </p:cSld>
@@ -14084,7 +14120,7 @@
 
 <file path=ppt/slides/slide20.xml><?xml version="1.0" encoding="utf-8"?>
 <p:sld xmlns:a="http://schemas.openxmlformats.org/drawingml/2006/main" xmlns:r="http://schemas.openxmlformats.org/officeDocument/2006/relationships" xmlns:p="http://schemas.openxmlformats.org/presentationml/2006/main">
-  <p:cSld name="PPTLabsMagnifiedPanSlide201705111428205327">
+  <p:cSld name="PPTLabsMagnifiedPanSlide201904121153348704">
     <p:bg>
       <p:bgPr>
         <a:solidFill>
@@ -14109,14 +14145,20 @@
       </p:grpSpPr>
       <p:pic>
         <p:nvPicPr>
-          <p:cNvPr id="5" name="PPTLabsMagnifyAreaGroup201705111428201069"/>
+          <p:cNvPr id="5" name="PPTLabsMagnifyAreaGroup201904121153341672"/>
           <p:cNvPicPr>
             <a:picLocks/>
           </p:cNvPicPr>
           <p:nvPr/>
         </p:nvPicPr>
         <p:blipFill>
-          <a:blip r:embed="rId2"/>
+          <a:blip r:embed="rId2">
+            <a:extLst>
+              <a:ext uri="{28A0092B-C50C-407E-A947-70E740481C1C}">
+                <a14:useLocalDpi xmlns:a14="http://schemas.microsoft.com/office/drawing/2010/main" val="0"/>
+              </a:ext>
+            </a:extLst>
+          </a:blip>
           <a:srcRect/>
           <a:stretch>
             <a:fillRect/>
@@ -14124,8 +14166,8 @@
         </p:blipFill>
         <p:spPr>
           <a:xfrm>
-            <a:off x="0" y="0"/>
-            <a:ext cx="9143869" cy="6858000"/>
+            <a:off x="0" y="1"/>
+            <a:ext cx="9144000" cy="6857747"/>
           </a:xfrm>
           <a:prstGeom prst="rect">
             <a:avLst/>
@@ -14134,14 +14176,20 @@
       </p:pic>
       <p:pic>
         <p:nvPicPr>
-          <p:cNvPr id="6" name="PPTLabsMagnifyAreaGroup201705111428201069"/>
+          <p:cNvPr id="6" name="PPTLabsMagnifyAreaGroup201904121153341672"/>
           <p:cNvPicPr>
             <a:picLocks/>
           </p:cNvPicPr>
           <p:nvPr/>
         </p:nvPicPr>
         <p:blipFill>
-          <a:blip r:embed="rId2"/>
+          <a:blip r:embed="rId2">
+            <a:extLst>
+              <a:ext uri="{28A0092B-C50C-407E-A947-70E740481C1C}">
+                <a14:useLocalDpi xmlns:a14="http://schemas.microsoft.com/office/drawing/2010/main" val="0"/>
+              </a:ext>
+            </a:extLst>
+          </a:blip>
           <a:srcRect/>
           <a:stretch>
             <a:fillRect/>
@@ -14149,8 +14197,8 @@
         </p:blipFill>
         <p:spPr>
           <a:xfrm>
-            <a:off x="-15539486" y="-4761187"/>
-            <a:ext cx="48355375" cy="36267051"/>
+            <a:off x="-15535222" y="-4759577"/>
+            <a:ext cx="48345137" cy="36257512"/>
           </a:xfrm>
           <a:prstGeom prst="rect">
             <a:avLst/>
@@ -14159,7 +14207,7 @@
       </p:pic>
       <p:pic>
         <p:nvPicPr>
-          <p:cNvPr id="2" name="PPTIndicator201705111428205497"/>
+          <p:cNvPr id="2" name="PPTIndicator201904121153348879"/>
           <p:cNvPicPr>
             <a:picLocks/>
           </p:cNvPicPr>
@@ -14190,7 +14238,7 @@
     </p:spTree>
     <p:extLst>
       <p:ext uri="{BB962C8B-B14F-4D97-AF65-F5344CB8AC3E}">
-        <p14:creationId xmlns:p14="http://schemas.microsoft.com/office/powerpoint/2010/main" val="2215249357"/>
+        <p14:creationId xmlns:p14="http://schemas.microsoft.com/office/powerpoint/2010/main" val="2753012662"/>
       </p:ext>
     </p:extLst>
   </p:cSld>
@@ -14288,7 +14336,7 @@
                                     <p:cond delay="0"/>
                                   </p:stCondLst>
                                   <p:childTnLst>
-                                    <p:animMotion origin="layout" path="M 0 0 C 0.2223462 0.7249445 0.2223462 0.7249445 0.4446925 1.449889 E" pathEditMode="relative" ptsTypes="">
+                                    <p:animMotion origin="layout" path="M 0 0 C 0.2222958 0.7247232 0.2222958 0.7247232 0.4445916 1.449446 E" pathEditMode="relative" ptsTypes="">
                                       <p:cBhvr>
                                         <p:cTn id="10" dur="1" fill="hold"/>
                                         <p:tgtEl>
@@ -14316,7 +14364,7 @@
                                           <p:spTgt spid="5"/>
                                         </p:tgtEl>
                                       </p:cBhvr>
-                                      <p:by x="528828" y="528828"/>
+                                      <p:by x="528709" y="528709"/>
                                     </p:animScale>
                                   </p:childTnLst>
                                 </p:cTn>
@@ -14371,7 +14419,7 @@
                                     <p:cond delay="0"/>
                                   </p:stCondLst>
                                   <p:childTnLst>
-                                    <p:animMotion origin="layout" path="M 0.4446925 1.449889 C 0.002813399 0.8386196 0.002813399 0.8386196 -0.4390657 0.2273501 E" pathEditMode="relative" ptsTypes="">
+                                    <p:animMotion origin="layout" path="M 0.4445916 1.449447 C 0.0027771 0.8383933 0.0027771 0.8383933 -0.4390375 0.2273406 E" pathEditMode="relative" ptsTypes="">
                                       <p:cBhvr>
                                         <p:cTn id="18" dur="400" fill="hold"/>
                                         <p:tgtEl>
@@ -14399,7 +14447,7 @@
                                           <p:spTgt spid="5"/>
                                         </p:tgtEl>
                                       </p:cBhvr>
-                                      <p:by x="35516" y="35515"/>
+                                      <p:by x="35522" y="35523"/>
                                     </p:animScale>
                                   </p:childTnLst>
                                 </p:cTn>
@@ -14437,7 +14485,7 @@
 
 <file path=ppt/slides/slide21.xml><?xml version="1.0" encoding="utf-8"?>
 <p:sld xmlns:a="http://schemas.openxmlformats.org/drawingml/2006/main" xmlns:r="http://schemas.openxmlformats.org/officeDocument/2006/relationships" xmlns:p="http://schemas.openxmlformats.org/presentationml/2006/main">
-  <p:cSld name="PPTLabsMagnifiedSlide201705111428205036">
+  <p:cSld name="PPTLabsMagnifiedSlide201904121153348361">
     <p:bg>
       <p:bgPr>
         <a:solidFill>
@@ -14462,14 +14510,20 @@
       </p:grpSpPr>
       <p:pic>
         <p:nvPicPr>
-          <p:cNvPr id="5" name="PPTLabsMagnifyAreaGroup201705111428204704"/>
+          <p:cNvPr id="5" name="PPTLabsMagnifyAreaGroup201904121153347921"/>
           <p:cNvPicPr>
             <a:picLocks noChangeAspect="1"/>
           </p:cNvPicPr>
           <p:nvPr/>
         </p:nvPicPr>
         <p:blipFill>
-          <a:blip r:embed="rId2"/>
+          <a:blip r:embed="rId2">
+            <a:extLst>
+              <a:ext uri="{28A0092B-C50C-407E-A947-70E740481C1C}">
+                <a14:useLocalDpi xmlns:a14="http://schemas.microsoft.com/office/drawing/2010/main" val="0"/>
+              </a:ext>
+            </a:extLst>
+          </a:blip>
           <a:srcRect/>
           <a:stretch>
             <a:fillRect/>
@@ -14477,8 +14531,8 @@
         </p:blipFill>
         <p:spPr>
           <a:xfrm>
-            <a:off x="-8029764" y="-1452008"/>
-            <a:ext cx="17173764" cy="12880349"/>
+            <a:off x="-8029119" y="-1451933"/>
+            <a:ext cx="17173119" cy="12879811"/>
           </a:xfrm>
           <a:prstGeom prst="rect">
             <a:avLst/>
@@ -14487,7 +14541,7 @@
       </p:pic>
       <p:pic>
         <p:nvPicPr>
-          <p:cNvPr id="3" name="PPTIndicator201705111428205297"/>
+          <p:cNvPr id="3" name="PPTIndicator201904121153348664"/>
           <p:cNvPicPr>
             <a:picLocks/>
           </p:cNvPicPr>
@@ -14518,7 +14572,7 @@
     </p:spTree>
     <p:extLst>
       <p:ext uri="{BB962C8B-B14F-4D97-AF65-F5344CB8AC3E}">
-        <p14:creationId xmlns:p14="http://schemas.microsoft.com/office/powerpoint/2010/main" val="102992547"/>
+        <p14:creationId xmlns:p14="http://schemas.microsoft.com/office/powerpoint/2010/main" val="3789742803"/>
       </p:ext>
     </p:extLst>
   </p:cSld>
@@ -14643,7 +14697,7 @@
 
 <file path=ppt/slides/slide22.xml><?xml version="1.0" encoding="utf-8"?>
 <p:sld xmlns:a="http://schemas.openxmlformats.org/drawingml/2006/main" xmlns:r="http://schemas.openxmlformats.org/officeDocument/2006/relationships" xmlns:p="http://schemas.openxmlformats.org/presentationml/2006/main">
-  <p:cSld name="PPTLabsMagnifiedPanSlide201705111428208828">
+  <p:cSld name="PPTLabsMagnifiedPanSlide201904121153354874">
     <p:bg>
       <p:bgPr>
         <a:solidFill>
@@ -14668,14 +14722,20 @@
       </p:grpSpPr>
       <p:pic>
         <p:nvPicPr>
-          <p:cNvPr id="5" name="PPTLabsMagnifyAreaGroup201705111428204704"/>
+          <p:cNvPr id="5" name="PPTLabsMagnifyAreaGroup201904121153347921"/>
           <p:cNvPicPr>
             <a:picLocks/>
           </p:cNvPicPr>
           <p:nvPr/>
         </p:nvPicPr>
         <p:blipFill>
-          <a:blip r:embed="rId2"/>
+          <a:blip r:embed="rId2">
+            <a:extLst>
+              <a:ext uri="{28A0092B-C50C-407E-A947-70E740481C1C}">
+                <a14:useLocalDpi xmlns:a14="http://schemas.microsoft.com/office/drawing/2010/main" val="0"/>
+              </a:ext>
+            </a:extLst>
+          </a:blip>
           <a:srcRect/>
           <a:stretch>
             <a:fillRect/>
@@ -14683,8 +14743,8 @@
         </p:blipFill>
         <p:spPr>
           <a:xfrm>
-            <a:off x="1" y="0"/>
-            <a:ext cx="9143981" cy="6858000"/>
+            <a:off x="0" y="0"/>
+            <a:ext cx="9144001" cy="6857984"/>
           </a:xfrm>
           <a:prstGeom prst="rect">
             <a:avLst/>
@@ -14693,14 +14753,20 @@
       </p:pic>
       <p:pic>
         <p:nvPicPr>
-          <p:cNvPr id="6" name="PPTLabsMagnifyAreaGroup201705111428204704"/>
+          <p:cNvPr id="6" name="PPTLabsMagnifyAreaGroup201904121153347921"/>
           <p:cNvPicPr>
             <a:picLocks/>
           </p:cNvPicPr>
           <p:nvPr/>
         </p:nvPicPr>
         <p:blipFill>
-          <a:blip r:embed="rId2"/>
+          <a:blip r:embed="rId2">
+            <a:extLst>
+              <a:ext uri="{28A0092B-C50C-407E-A947-70E740481C1C}">
+                <a14:useLocalDpi xmlns:a14="http://schemas.microsoft.com/office/drawing/2010/main" val="0"/>
+              </a:ext>
+            </a:extLst>
+          </a:blip>
           <a:srcRect/>
           <a:stretch>
             <a:fillRect/>
@@ -14708,8 +14774,8 @@
         </p:blipFill>
         <p:spPr>
           <a:xfrm>
-            <a:off x="-8029764" y="-1452008"/>
-            <a:ext cx="17173764" cy="12880349"/>
+            <a:off x="-8029119" y="-1451933"/>
+            <a:ext cx="17173119" cy="12879811"/>
           </a:xfrm>
           <a:prstGeom prst="rect">
             <a:avLst/>
@@ -14718,7 +14784,7 @@
       </p:pic>
       <p:pic>
         <p:nvPicPr>
-          <p:cNvPr id="2" name="PPTIndicator201705111428209008"/>
+          <p:cNvPr id="2" name="PPTIndicator201904121153355010"/>
           <p:cNvPicPr>
             <a:picLocks/>
           </p:cNvPicPr>
@@ -14749,7 +14815,7 @@
     </p:spTree>
     <p:extLst>
       <p:ext uri="{BB962C8B-B14F-4D97-AF65-F5344CB8AC3E}">
-        <p14:creationId xmlns:p14="http://schemas.microsoft.com/office/powerpoint/2010/main" val="1170809142"/>
+        <p14:creationId xmlns:p14="http://schemas.microsoft.com/office/powerpoint/2010/main" val="2551552537"/>
       </p:ext>
     </p:extLst>
   </p:cSld>
@@ -14847,7 +14913,7 @@
                                     <p:cond delay="0"/>
                                   </p:stCondLst>
                                   <p:childTnLst>
-                                    <p:animMotion origin="layout" path="M 0 0 C -0.219536 0.113675 -0.219536 0.113675 -0.4390719 0.22735 E" pathEditMode="relative" ptsTypes="">
+                                    <p:animMotion origin="layout" path="M 0 0 C -0.2195188 0.1136615 -0.2195188 0.1136615 -0.4390375 0.2273229 E" pathEditMode="relative" ptsTypes="">
                                       <p:cBhvr>
                                         <p:cTn id="10" dur="1" fill="hold"/>
                                         <p:tgtEl>
@@ -14875,7 +14941,7 @@
                                           <p:spTgt spid="5"/>
                                         </p:tgtEl>
                                       </p:cBhvr>
-                                      <p:by x="187815" y="187815"/>
+                                      <p:by x="187808" y="187808"/>
                                     </p:animScale>
                                   </p:childTnLst>
                                 </p:cTn>
@@ -14930,7 +14996,7 @@
                                     <p:cond delay="0"/>
                                   </p:stCondLst>
                                   <p:childTnLst>
-                                    <p:animMotion origin="layout" path="M -0.4390718 0.22735 C -0.1814083 -0.1447552 -0.1814083 -0.1447552 0.07625526 -0.5168604 E" pathEditMode="relative" ptsTypes="">
+                                    <p:animMotion origin="layout" path="M -0.4390375 0.2273228 C -0.1813931 -0.1447375 -0.1813931 -0.1447375 0.07625118 -0.5167978 E" pathEditMode="relative" ptsTypes="">
                                       <p:cBhvr>
                                         <p:cTn id="18" dur="400" fill="hold"/>
                                         <p:tgtEl>
@@ -14958,7 +15024,7 @@
                                           <p:spTgt spid="5"/>
                                         </p:tgtEl>
                                       </p:cBhvr>
-                                      <p:by x="108283" y="108283"/>
+                                      <p:by x="108283" y="108281"/>
                                     </p:animScale>
                                   </p:childTnLst>
                                 </p:cTn>
@@ -14996,7 +15062,7 @@
 
 <file path=ppt/slides/slide23.xml><?xml version="1.0" encoding="utf-8"?>
 <p:sld xmlns:a="http://schemas.openxmlformats.org/drawingml/2006/main" xmlns:r="http://schemas.openxmlformats.org/officeDocument/2006/relationships" xmlns:p="http://schemas.openxmlformats.org/presentationml/2006/main">
-  <p:cSld name="PPTLabsMagnifiedSlide201705111428208527">
+  <p:cSld name="PPTLabsMagnifiedSlide201904121153354530">
     <p:bg>
       <p:bgPr>
         <a:solidFill>
@@ -15021,14 +15087,20 @@
       </p:grpSpPr>
       <p:pic>
         <p:nvPicPr>
-          <p:cNvPr id="5" name="PPTLabsMagnifyAreaGroup201705111428208072"/>
+          <p:cNvPr id="5" name="PPTLabsMagnifyAreaGroup201904121153354153"/>
           <p:cNvPicPr>
             <a:picLocks noChangeAspect="1"/>
           </p:cNvPicPr>
           <p:nvPr/>
         </p:nvPicPr>
         <p:blipFill>
-          <a:blip r:embed="rId2"/>
+          <a:blip r:embed="rId2">
+            <a:extLst>
+              <a:ext uri="{28A0092B-C50C-407E-A947-70E740481C1C}">
+                <a14:useLocalDpi xmlns:a14="http://schemas.microsoft.com/office/drawing/2010/main" val="0"/>
+              </a:ext>
+            </a:extLst>
+          </a:blip>
           <a:srcRect/>
           <a:stretch>
             <a:fillRect/>
@@ -15036,8 +15108,8 @@
         </p:blipFill>
         <p:spPr>
           <a:xfrm>
-            <a:off x="-4028893" y="-7089260"/>
-            <a:ext cx="18596324" cy="13947264"/>
+            <a:off x="-4028544" y="-7088422"/>
+            <a:ext cx="18595570" cy="13946431"/>
           </a:xfrm>
           <a:prstGeom prst="rect">
             <a:avLst/>
@@ -15046,7 +15118,7 @@
       </p:pic>
       <p:pic>
         <p:nvPicPr>
-          <p:cNvPr id="3" name="PPTIndicator201705111428208798"/>
+          <p:cNvPr id="3" name="PPTIndicator201904121153354844"/>
           <p:cNvPicPr>
             <a:picLocks/>
           </p:cNvPicPr>
@@ -15077,7 +15149,7 @@
     </p:spTree>
     <p:extLst>
       <p:ext uri="{BB962C8B-B14F-4D97-AF65-F5344CB8AC3E}">
-        <p14:creationId xmlns:p14="http://schemas.microsoft.com/office/powerpoint/2010/main" val="1203944331"/>
+        <p14:creationId xmlns:p14="http://schemas.microsoft.com/office/powerpoint/2010/main" val="3978186483"/>
       </p:ext>
     </p:extLst>
   </p:cSld>
@@ -15202,7 +15274,7 @@
 
 <file path=ppt/slides/slide24.xml><?xml version="1.0" encoding="utf-8"?>
 <p:sld xmlns:a="http://schemas.openxmlformats.org/drawingml/2006/main" xmlns:r="http://schemas.openxmlformats.org/officeDocument/2006/relationships" xmlns:p="http://schemas.openxmlformats.org/presentationml/2006/main">
-  <p:cSld name="PPTLabsDeMagnifyingSlide201705111428209078">
+  <p:cSld name="PPTLabsDeMagnifyingSlide201904121153355059">
     <p:bg>
       <p:bgPr>
         <a:solidFill>
@@ -15303,14 +15375,20 @@
       </p:sp>
       <p:pic>
         <p:nvPicPr>
-          <p:cNvPr id="5" name="PPTLabsMagnifyAreaGroup201705111428208072"/>
+          <p:cNvPr id="5" name="PPTLabsMagnifyAreaGroup201904121153354153"/>
           <p:cNvPicPr>
             <a:picLocks/>
           </p:cNvPicPr>
           <p:nvPr/>
         </p:nvPicPr>
         <p:blipFill>
-          <a:blip r:embed="rId3"/>
+          <a:blip r:embed="rId3">
+            <a:extLst>
+              <a:ext uri="{28A0092B-C50C-407E-A947-70E740481C1C}">
+                <a14:useLocalDpi xmlns:a14="http://schemas.microsoft.com/office/drawing/2010/main" val="0"/>
+              </a:ext>
+            </a:extLst>
+          </a:blip>
           <a:stretch>
             <a:fillRect/>
           </a:stretch>
@@ -15318,7 +15396,7 @@
         <p:spPr>
           <a:xfrm>
             <a:off x="0" y="0"/>
-            <a:ext cx="9144000" cy="6857998"/>
+            <a:ext cx="9144000" cy="6858000"/>
           </a:xfrm>
           <a:prstGeom prst="rect">
             <a:avLst/>
@@ -15327,22 +15405,28 @@
       </p:pic>
       <p:pic>
         <p:nvPicPr>
-          <p:cNvPr id="11" name="PPTLabsMagnifyAreaGroup201705111428208072"/>
+          <p:cNvPr id="10" name="PPTLabsMagnifyAreaGroup201904121153354153"/>
           <p:cNvPicPr>
             <a:picLocks/>
           </p:cNvPicPr>
           <p:nvPr/>
         </p:nvPicPr>
         <p:blipFill>
-          <a:blip r:embed="rId3"/>
+          <a:blip r:embed="rId3">
+            <a:extLst>
+              <a:ext uri="{28A0092B-C50C-407E-A947-70E740481C1C}">
+                <a14:useLocalDpi xmlns:a14="http://schemas.microsoft.com/office/drawing/2010/main" val="0"/>
+              </a:ext>
+            </a:extLst>
+          </a:blip>
           <a:stretch>
             <a:fillRect/>
           </a:stretch>
         </p:blipFill>
         <p:spPr>
           <a:xfrm>
-            <a:off x="-4029560" y="-7090474"/>
-            <a:ext cx="18597967" cy="13948474"/>
+            <a:off x="-4029559" y="-7090474"/>
+            <a:ext cx="18597966" cy="13948474"/>
           </a:xfrm>
           <a:prstGeom prst="rect">
             <a:avLst/>
@@ -15351,7 +15435,7 @@
       </p:pic>
       <p:pic>
         <p:nvPicPr>
-          <p:cNvPr id="3" name="PPTIndicator201705111428209298"/>
+          <p:cNvPr id="3" name="PPTIndicator201904121153355349"/>
           <p:cNvPicPr>
             <a:picLocks/>
           </p:cNvPicPr>
@@ -15382,7 +15466,7 @@
     </p:spTree>
     <p:extLst>
       <p:ext uri="{BB962C8B-B14F-4D97-AF65-F5344CB8AC3E}">
-        <p14:creationId xmlns:p14="http://schemas.microsoft.com/office/powerpoint/2010/main" val="2628252027"/>
+        <p14:creationId xmlns:p14="http://schemas.microsoft.com/office/powerpoint/2010/main" val="1297785741"/>
       </p:ext>
     </p:extLst>
   </p:cSld>
@@ -15480,7 +15564,7 @@
                                     <p:cond delay="0"/>
                                   </p:stCondLst>
                                   <p:childTnLst>
-                                    <p:animMotion origin="layout" path="M 0 0 C 0.03813563 -0.2584745 0.03813563 -0.2584745 0.07627127 -0.5169489 E" pathEditMode="relative" ptsTypes="">
+                                    <p:animMotion origin="layout" path="M 0 0 C 0.03813559 -0.2584746 0.03813559 -0.2584746 0.07627118 -0.5169491 E" pathEditMode="relative" ptsTypes="">
                                       <p:cBhvr>
                                         <p:cTn id="10" dur="1" fill="hold"/>
                                         <p:tgtEl>
@@ -15523,7 +15607,7 @@
                                       <p:cBhvr>
                                         <p:cTn id="14" dur="10"/>
                                         <p:tgtEl>
-                                          <p:spTgt spid="11"/>
+                                          <p:spTgt spid="10"/>
                                         </p:tgtEl>
                                       </p:cBhvr>
                                     </p:animEffect>
@@ -15535,7 +15619,7 @@
                                           </p:stCondLst>
                                         </p:cTn>
                                         <p:tgtEl>
-                                          <p:spTgt spid="11"/>
+                                          <p:spTgt spid="10"/>
                                         </p:tgtEl>
                                         <p:attrNameLst>
                                           <p:attrName>style.visibility</p:attrName>
@@ -15554,7 +15638,7 @@
                                     <p:cond delay="0"/>
                                   </p:stCondLst>
                                   <p:childTnLst>
-                                    <p:animMotion origin="layout" path="M 0.07627127 -0.516949 C 0.03813564 -0.2584744 0.03813564 -0.2584744 -7.450581E-09 1.192093E-07 E" pathEditMode="relative" ptsTypes="">
+                                    <p:animMotion origin="layout" path="M 0.07627118 -0.5169491 C 0.0381356 -0.2584745 0.0381356 -0.2584745 7.450581E-09 0 E" pathEditMode="relative" ptsTypes="">
                                       <p:cBhvr>
                                         <p:cTn id="17" dur="400" fill="hold"/>
                                         <p:tgtEl>
@@ -16677,7 +16761,7 @@
 
 <file path=ppt/slides/slide27.xml><?xml version="1.0" encoding="utf-8"?>
 <p:sld xmlns:a="http://schemas.openxmlformats.org/drawingml/2006/main" xmlns:r="http://schemas.openxmlformats.org/officeDocument/2006/relationships" xmlns:p="http://schemas.openxmlformats.org/presentationml/2006/main">
-  <p:cSld name="PPTLabsZoomToAreaSlide201705111427513434">
+  <p:cSld name="PPTLabsZoomToAreaSlide201904121152572795">
     <p:bg>
       <p:bgPr>
         <a:solidFill>
@@ -17010,7 +17094,7 @@
       </p:sp>
       <p:sp>
         <p:nvSpPr>
-          <p:cNvPr id="3" name="PPTLabsMagnifyShape201705111427513514"/>
+          <p:cNvPr id="3" name="PPTLabsMagnifyShape201904121152572835"/>
           <p:cNvSpPr/>
           <p:nvPr/>
         </p:nvSpPr>
@@ -17057,14 +17141,14 @@
           <a:p>
             <a:pPr algn="ctr"/>
             <a:r>
-              <a:rPr lang="en-US" b="1" smtClean="0">
+              <a:rPr lang="en-SG" b="1" smtClean="0">
                 <a:solidFill>
                   <a:srgbClr val="FFFFFF"/>
                 </a:solidFill>
               </a:rPr>
               <a:t>Zoom Shape 1</a:t>
             </a:r>
-            <a:endParaRPr lang="en-US" b="1">
+            <a:endParaRPr lang="en-SG" b="1">
               <a:solidFill>
                 <a:srgbClr val="FFFFFF"/>
               </a:solidFill>
@@ -17074,7 +17158,7 @@
       </p:sp>
       <p:sp>
         <p:nvSpPr>
-          <p:cNvPr id="8" name="PPTLabsMagnifyShape201705111427513674"/>
+          <p:cNvPr id="8" name="PPTLabsMagnifyShape201904121152572964"/>
           <p:cNvSpPr/>
           <p:nvPr/>
         </p:nvSpPr>
@@ -17121,14 +17205,14 @@
           <a:p>
             <a:pPr algn="ctr"/>
             <a:r>
-              <a:rPr lang="en-US" b="1" smtClean="0">
+              <a:rPr lang="en-SG" b="1" smtClean="0">
                 <a:solidFill>
                   <a:srgbClr val="FFFFFF"/>
                 </a:solidFill>
               </a:rPr>
               <a:t>Zoom Shape 2</a:t>
             </a:r>
-            <a:endParaRPr lang="en-US" b="1">
+            <a:endParaRPr lang="en-SG" b="1">
               <a:solidFill>
                 <a:srgbClr val="FFFFFF"/>
               </a:solidFill>
@@ -17138,7 +17222,7 @@
       </p:sp>
       <p:sp>
         <p:nvSpPr>
-          <p:cNvPr id="9" name="PPTLabsMagnifyShape201705111427513724"/>
+          <p:cNvPr id="9" name="PPTLabsMagnifyShape201904121152573004"/>
           <p:cNvSpPr/>
           <p:nvPr/>
         </p:nvSpPr>
@@ -17185,14 +17269,14 @@
           <a:p>
             <a:pPr algn="ctr"/>
             <a:r>
-              <a:rPr lang="en-US" b="1" smtClean="0">
+              <a:rPr lang="en-SG" b="1" smtClean="0">
                 <a:solidFill>
                   <a:srgbClr val="FFFFFF"/>
                 </a:solidFill>
               </a:rPr>
               <a:t>Zoom Shape 3</a:t>
             </a:r>
-            <a:endParaRPr lang="en-US" b="1">
+            <a:endParaRPr lang="en-SG" b="1">
               <a:solidFill>
                 <a:srgbClr val="FFFFFF"/>
               </a:solidFill>
@@ -17202,7 +17286,7 @@
       </p:sp>
       <p:sp>
         <p:nvSpPr>
-          <p:cNvPr id="10" name="PPTLabsMagnifyShape201705111427513784"/>
+          <p:cNvPr id="10" name="PPTLabsMagnifyShape201904121152573044"/>
           <p:cNvSpPr/>
           <p:nvPr/>
         </p:nvSpPr>
@@ -17249,14 +17333,14 @@
           <a:p>
             <a:pPr algn="ctr"/>
             <a:r>
-              <a:rPr lang="en-US" b="1" smtClean="0">
+              <a:rPr lang="en-SG" b="1" smtClean="0">
                 <a:solidFill>
                   <a:srgbClr val="FFFFFF"/>
                 </a:solidFill>
               </a:rPr>
               <a:t>Zoom Shape 4</a:t>
             </a:r>
-            <a:endParaRPr lang="en-US" b="1">
+            <a:endParaRPr lang="en-SG" b="1">
               <a:solidFill>
                 <a:srgbClr val="FFFFFF"/>
               </a:solidFill>
@@ -17267,7 +17351,7 @@
     </p:spTree>
     <p:extLst>
       <p:ext uri="{BB962C8B-B14F-4D97-AF65-F5344CB8AC3E}">
-        <p14:creationId xmlns:p14="http://schemas.microsoft.com/office/powerpoint/2010/main" val="3915566693"/>
+        <p14:creationId xmlns:p14="http://schemas.microsoft.com/office/powerpoint/2010/main" val="3228635756"/>
       </p:ext>
     </p:extLst>
   </p:cSld>
@@ -17691,7 +17775,7 @@
 
 <file path=ppt/slides/slide28.xml><?xml version="1.0" encoding="utf-8"?>
 <p:sld xmlns:a="http://schemas.openxmlformats.org/drawingml/2006/main" xmlns:r="http://schemas.openxmlformats.org/officeDocument/2006/relationships" xmlns:p="http://schemas.openxmlformats.org/presentationml/2006/main">
-  <p:cSld name="PPTLabsMagnifyingSlide201705111427514103">
+  <p:cSld name="PPTLabsMagnifyingSlide201904121152573167">
     <p:bg>
       <p:bgPr>
         <a:solidFill>
@@ -17716,7 +17800,7 @@
       </p:grpSpPr>
       <p:pic>
         <p:nvPicPr>
-          <p:cNvPr id="34" name="Picture 3" descr="File:AmineTreating.png"/>
+          <p:cNvPr id="33" name="Picture 3" descr="File:AmineTreating.png"/>
           <p:cNvPicPr>
             <a:picLocks noChangeAspect="1" noChangeArrowheads="1"/>
           </p:cNvPicPr>
@@ -17762,7 +17846,7 @@
       </p:pic>
       <p:sp>
         <p:nvSpPr>
-          <p:cNvPr id="35" name="TextBox 1"/>
+          <p:cNvPr id="34" name="TextBox 1"/>
           <p:cNvSpPr txBox="1"/>
           <p:nvPr/>
         </p:nvSpPr>
@@ -17792,14 +17876,20 @@
       </p:sp>
       <p:pic>
         <p:nvPicPr>
-          <p:cNvPr id="36" name="PPTLabsMagnifyAreaGroup201705111427528056"/>
+          <p:cNvPr id="35" name="PPTLabsMagnifyAreaGroup201904121152597793"/>
           <p:cNvPicPr>
             <a:picLocks/>
           </p:cNvPicPr>
           <p:nvPr/>
         </p:nvPicPr>
         <p:blipFill>
-          <a:blip r:embed="rId3"/>
+          <a:blip r:embed="rId3">
+            <a:extLst>
+              <a:ext uri="{28A0092B-C50C-407E-A947-70E740481C1C}">
+                <a14:useLocalDpi xmlns:a14="http://schemas.microsoft.com/office/drawing/2010/main" val="0"/>
+              </a:ext>
+            </a:extLst>
+          </a:blip>
           <a:stretch>
             <a:fillRect/>
           </a:stretch>
@@ -17807,7 +17897,7 @@
         <p:spPr>
           <a:xfrm>
             <a:off x="0" y="0"/>
-            <a:ext cx="9144000" cy="6857998"/>
+            <a:ext cx="9144000" cy="6858000"/>
           </a:xfrm>
           <a:prstGeom prst="rect">
             <a:avLst/>
@@ -17816,22 +17906,28 @@
       </p:pic>
       <p:pic>
         <p:nvPicPr>
-          <p:cNvPr id="37" name="PPTLabsMagnifyAreaGroup201705111427528056"/>
+          <p:cNvPr id="36" name="PPTLabsMagnifyAreaGroup201904121152597793"/>
           <p:cNvPicPr>
             <a:picLocks/>
           </p:cNvPicPr>
           <p:nvPr/>
         </p:nvPicPr>
         <p:blipFill>
-          <a:blip r:embed="rId3"/>
+          <a:blip r:embed="rId3">
+            <a:extLst>
+              <a:ext uri="{28A0092B-C50C-407E-A947-70E740481C1C}">
+                <a14:useLocalDpi xmlns:a14="http://schemas.microsoft.com/office/drawing/2010/main" val="0"/>
+              </a:ext>
+            </a:extLst>
+          </a:blip>
           <a:stretch>
             <a:fillRect/>
           </a:stretch>
         </p:blipFill>
         <p:spPr>
           <a:xfrm>
-            <a:off x="-4029560" y="-7090474"/>
-            <a:ext cx="18597967" cy="13948474"/>
+            <a:off x="-4029559" y="-7090474"/>
+            <a:ext cx="18597966" cy="13948474"/>
           </a:xfrm>
           <a:prstGeom prst="rect">
             <a:avLst/>
@@ -17840,14 +17936,20 @@
       </p:pic>
       <p:pic>
         <p:nvPicPr>
-          <p:cNvPr id="33" name="PPTLabsMagnifyAreaGroup201705111427528056"/>
+          <p:cNvPr id="32" name="PPTLabsMagnifyAreaGroup201904121152597793"/>
           <p:cNvPicPr>
             <a:picLocks noChangeAspect="1"/>
           </p:cNvPicPr>
           <p:nvPr/>
         </p:nvPicPr>
         <p:blipFill>
-          <a:blip r:embed="rId3"/>
+          <a:blip r:embed="rId3">
+            <a:extLst>
+              <a:ext uri="{28A0092B-C50C-407E-A947-70E740481C1C}">
+                <a14:useLocalDpi xmlns:a14="http://schemas.microsoft.com/office/drawing/2010/main" val="0"/>
+              </a:ext>
+            </a:extLst>
+          </a:blip>
           <a:srcRect/>
           <a:stretch>
             <a:fillRect/>
@@ -17855,8 +17957,8 @@
         </p:blipFill>
         <p:spPr>
           <a:xfrm>
-            <a:off x="-4028893" y="-7089260"/>
-            <a:ext cx="18596324" cy="13947264"/>
+            <a:off x="-4028544" y="-7088422"/>
+            <a:ext cx="18595570" cy="13946431"/>
           </a:xfrm>
           <a:prstGeom prst="rect">
             <a:avLst/>
@@ -17865,14 +17967,206 @@
       </p:pic>
       <p:pic>
         <p:nvPicPr>
-          <p:cNvPr id="31" name="PPTLabsMagnifyAreaGroup201705111427524473"/>
+          <p:cNvPr id="30" name="PPTLabsMagnifyAreaGroup201904121152591789"/>
           <p:cNvPicPr>
             <a:picLocks/>
           </p:cNvPicPr>
           <p:nvPr/>
         </p:nvPicPr>
         <p:blipFill>
-          <a:blip r:embed="rId3"/>
+          <a:blip r:embed="rId3">
+            <a:extLst>
+              <a:ext uri="{28A0092B-C50C-407E-A947-70E740481C1C}">
+                <a14:useLocalDpi xmlns:a14="http://schemas.microsoft.com/office/drawing/2010/main" val="0"/>
+              </a:ext>
+            </a:extLst>
+          </a:blip>
+          <a:srcRect/>
+          <a:stretch>
+            <a:fillRect/>
+          </a:stretch>
+        </p:blipFill>
+        <p:spPr>
+          <a:xfrm>
+            <a:off x="0" y="0"/>
+            <a:ext cx="9144001" cy="6857984"/>
+          </a:xfrm>
+          <a:prstGeom prst="rect">
+            <a:avLst/>
+          </a:prstGeom>
+        </p:spPr>
+      </p:pic>
+      <p:pic>
+        <p:nvPicPr>
+          <p:cNvPr id="31" name="PPTLabsMagnifyAreaGroup201904121152591789"/>
+          <p:cNvPicPr>
+            <a:picLocks/>
+          </p:cNvPicPr>
+          <p:nvPr/>
+        </p:nvPicPr>
+        <p:blipFill>
+          <a:blip r:embed="rId3">
+            <a:extLst>
+              <a:ext uri="{28A0092B-C50C-407E-A947-70E740481C1C}">
+                <a14:useLocalDpi xmlns:a14="http://schemas.microsoft.com/office/drawing/2010/main" val="0"/>
+              </a:ext>
+            </a:extLst>
+          </a:blip>
+          <a:srcRect/>
+          <a:stretch>
+            <a:fillRect/>
+          </a:stretch>
+        </p:blipFill>
+        <p:spPr>
+          <a:xfrm>
+            <a:off x="-8029119" y="-1451933"/>
+            <a:ext cx="17173119" cy="12879811"/>
+          </a:xfrm>
+          <a:prstGeom prst="rect">
+            <a:avLst/>
+          </a:prstGeom>
+        </p:spPr>
+      </p:pic>
+      <p:pic>
+        <p:nvPicPr>
+          <p:cNvPr id="29" name="PPTLabsMagnifyAreaGroup201904121152591789"/>
+          <p:cNvPicPr>
+            <a:picLocks noChangeAspect="1"/>
+          </p:cNvPicPr>
+          <p:nvPr/>
+        </p:nvPicPr>
+        <p:blipFill>
+          <a:blip r:embed="rId3">
+            <a:extLst>
+              <a:ext uri="{28A0092B-C50C-407E-A947-70E740481C1C}">
+                <a14:useLocalDpi xmlns:a14="http://schemas.microsoft.com/office/drawing/2010/main" val="0"/>
+              </a:ext>
+            </a:extLst>
+          </a:blip>
+          <a:srcRect/>
+          <a:stretch>
+            <a:fillRect/>
+          </a:stretch>
+        </p:blipFill>
+        <p:spPr>
+          <a:xfrm>
+            <a:off x="-8029119" y="-1451933"/>
+            <a:ext cx="17173119" cy="12879811"/>
+          </a:xfrm>
+          <a:prstGeom prst="rect">
+            <a:avLst/>
+          </a:prstGeom>
+        </p:spPr>
+      </p:pic>
+      <p:pic>
+        <p:nvPicPr>
+          <p:cNvPr id="27" name="PPTLabsMagnifyAreaGroup201904121152584878"/>
+          <p:cNvPicPr>
+            <a:picLocks/>
+          </p:cNvPicPr>
+          <p:nvPr/>
+        </p:nvPicPr>
+        <p:blipFill>
+          <a:blip r:embed="rId3">
+            <a:extLst>
+              <a:ext uri="{28A0092B-C50C-407E-A947-70E740481C1C}">
+                <a14:useLocalDpi xmlns:a14="http://schemas.microsoft.com/office/drawing/2010/main" val="0"/>
+              </a:ext>
+            </a:extLst>
+          </a:blip>
+          <a:srcRect/>
+          <a:stretch>
+            <a:fillRect/>
+          </a:stretch>
+        </p:blipFill>
+        <p:spPr>
+          <a:xfrm>
+            <a:off x="0" y="1"/>
+            <a:ext cx="9144000" cy="6857747"/>
+          </a:xfrm>
+          <a:prstGeom prst="rect">
+            <a:avLst/>
+          </a:prstGeom>
+        </p:spPr>
+      </p:pic>
+      <p:pic>
+        <p:nvPicPr>
+          <p:cNvPr id="28" name="PPTLabsMagnifyAreaGroup201904121152584878"/>
+          <p:cNvPicPr>
+            <a:picLocks/>
+          </p:cNvPicPr>
+          <p:nvPr/>
+        </p:nvPicPr>
+        <p:blipFill>
+          <a:blip r:embed="rId3">
+            <a:extLst>
+              <a:ext uri="{28A0092B-C50C-407E-A947-70E740481C1C}">
+                <a14:useLocalDpi xmlns:a14="http://schemas.microsoft.com/office/drawing/2010/main" val="0"/>
+              </a:ext>
+            </a:extLst>
+          </a:blip>
+          <a:srcRect/>
+          <a:stretch>
+            <a:fillRect/>
+          </a:stretch>
+        </p:blipFill>
+        <p:spPr>
+          <a:xfrm>
+            <a:off x="-15535222" y="-4759577"/>
+            <a:ext cx="48345137" cy="36257512"/>
+          </a:xfrm>
+          <a:prstGeom prst="rect">
+            <a:avLst/>
+          </a:prstGeom>
+        </p:spPr>
+      </p:pic>
+      <p:pic>
+        <p:nvPicPr>
+          <p:cNvPr id="26" name="PPTLabsMagnifyAreaGroup201904121152584878"/>
+          <p:cNvPicPr>
+            <a:picLocks noChangeAspect="1"/>
+          </p:cNvPicPr>
+          <p:nvPr/>
+        </p:nvPicPr>
+        <p:blipFill>
+          <a:blip r:embed="rId3">
+            <a:extLst>
+              <a:ext uri="{28A0092B-C50C-407E-A947-70E740481C1C}">
+                <a14:useLocalDpi xmlns:a14="http://schemas.microsoft.com/office/drawing/2010/main" val="0"/>
+              </a:ext>
+            </a:extLst>
+          </a:blip>
+          <a:srcRect/>
+          <a:stretch>
+            <a:fillRect/>
+          </a:stretch>
+        </p:blipFill>
+        <p:spPr>
+          <a:xfrm>
+            <a:off x="-15535222" y="-4759577"/>
+            <a:ext cx="48345137" cy="36257512"/>
+          </a:xfrm>
+          <a:prstGeom prst="rect">
+            <a:avLst/>
+          </a:prstGeom>
+        </p:spPr>
+      </p:pic>
+      <p:pic>
+        <p:nvPicPr>
+          <p:cNvPr id="24" name="PPTLabsMagnifyAreaGroup201904121152579320"/>
+          <p:cNvPicPr>
+            <a:picLocks/>
+          </p:cNvPicPr>
+          <p:nvPr/>
+        </p:nvPicPr>
+        <p:blipFill>
+          <a:blip r:embed="rId3">
+            <a:extLst>
+              <a:ext uri="{28A0092B-C50C-407E-A947-70E740481C1C}">
+                <a14:useLocalDpi xmlns:a14="http://schemas.microsoft.com/office/drawing/2010/main" val="0"/>
+              </a:ext>
+            </a:extLst>
+          </a:blip>
           <a:srcRect/>
           <a:stretch>
             <a:fillRect/>
@@ -17881,7 +18175,7 @@
         <p:spPr>
           <a:xfrm>
             <a:off x="1" y="0"/>
-            <a:ext cx="9143981" cy="6858000"/>
+            <a:ext cx="9143991" cy="6858000"/>
           </a:xfrm>
           <a:prstGeom prst="rect">
             <a:avLst/>
@@ -17890,14 +18184,20 @@
       </p:pic>
       <p:pic>
         <p:nvPicPr>
-          <p:cNvPr id="32" name="PPTLabsMagnifyAreaGroup201705111427524473"/>
+          <p:cNvPr id="25" name="PPTLabsMagnifyAreaGroup201904121152579320"/>
           <p:cNvPicPr>
             <a:picLocks/>
           </p:cNvPicPr>
           <p:nvPr/>
         </p:nvPicPr>
         <p:blipFill>
-          <a:blip r:embed="rId3"/>
+          <a:blip r:embed="rId3">
+            <a:extLst>
+              <a:ext uri="{28A0092B-C50C-407E-A947-70E740481C1C}">
+                <a14:useLocalDpi xmlns:a14="http://schemas.microsoft.com/office/drawing/2010/main" val="0"/>
+              </a:ext>
+            </a:extLst>
+          </a:blip>
           <a:srcRect/>
           <a:stretch>
             <a:fillRect/>
@@ -17905,8 +18205,8 @@
         </p:blipFill>
         <p:spPr>
           <a:xfrm>
-            <a:off x="-8029764" y="-1452008"/>
-            <a:ext cx="17173764" cy="12880349"/>
+            <a:off x="-2354311" y="-1254200"/>
+            <a:ext cx="21549770" cy="16162343"/>
           </a:xfrm>
           <a:prstGeom prst="rect">
             <a:avLst/>
@@ -17915,14 +18215,20 @@
       </p:pic>
       <p:pic>
         <p:nvPicPr>
-          <p:cNvPr id="30" name="PPTLabsMagnifyAreaGroup201705111427524473"/>
+          <p:cNvPr id="23" name="PPTLabsMagnifyAreaGroup201904121152579320"/>
           <p:cNvPicPr>
             <a:picLocks noChangeAspect="1"/>
           </p:cNvPicPr>
           <p:nvPr/>
         </p:nvPicPr>
         <p:blipFill>
-          <a:blip r:embed="rId3"/>
+          <a:blip r:embed="rId3">
+            <a:extLst>
+              <a:ext uri="{28A0092B-C50C-407E-A947-70E740481C1C}">
+                <a14:useLocalDpi xmlns:a14="http://schemas.microsoft.com/office/drawing/2010/main" val="0"/>
+              </a:ext>
+            </a:extLst>
+          </a:blip>
           <a:srcRect/>
           <a:stretch>
             <a:fillRect/>
@@ -17930,158 +18236,8 @@
         </p:blipFill>
         <p:spPr>
           <a:xfrm>
-            <a:off x="-8029764" y="-1452008"/>
-            <a:ext cx="17173764" cy="12880349"/>
-          </a:xfrm>
-          <a:prstGeom prst="rect">
-            <a:avLst/>
-          </a:prstGeom>
-        </p:spPr>
-      </p:pic>
-      <p:pic>
-        <p:nvPicPr>
-          <p:cNvPr id="28" name="PPTLabsMagnifyAreaGroup201705111427520659"/>
-          <p:cNvPicPr>
-            <a:picLocks/>
-          </p:cNvPicPr>
-          <p:nvPr/>
-        </p:nvPicPr>
-        <p:blipFill>
-          <a:blip r:embed="rId3"/>
-          <a:srcRect/>
-          <a:stretch>
-            <a:fillRect/>
-          </a:stretch>
-        </p:blipFill>
-        <p:spPr>
-          <a:xfrm>
-            <a:off x="0" y="0"/>
-            <a:ext cx="9143869" cy="6858000"/>
-          </a:xfrm>
-          <a:prstGeom prst="rect">
-            <a:avLst/>
-          </a:prstGeom>
-        </p:spPr>
-      </p:pic>
-      <p:pic>
-        <p:nvPicPr>
-          <p:cNvPr id="29" name="PPTLabsMagnifyAreaGroup201705111427520659"/>
-          <p:cNvPicPr>
-            <a:picLocks/>
-          </p:cNvPicPr>
-          <p:nvPr/>
-        </p:nvPicPr>
-        <p:blipFill>
-          <a:blip r:embed="rId3"/>
-          <a:srcRect/>
-          <a:stretch>
-            <a:fillRect/>
-          </a:stretch>
-        </p:blipFill>
-        <p:spPr>
-          <a:xfrm>
-            <a:off x="-15539486" y="-4761187"/>
-            <a:ext cx="48355375" cy="36267051"/>
-          </a:xfrm>
-          <a:prstGeom prst="rect">
-            <a:avLst/>
-          </a:prstGeom>
-        </p:spPr>
-      </p:pic>
-      <p:pic>
-        <p:nvPicPr>
-          <p:cNvPr id="27" name="PPTLabsMagnifyAreaGroup201705111427520659"/>
-          <p:cNvPicPr>
-            <a:picLocks noChangeAspect="1"/>
-          </p:cNvPicPr>
-          <p:nvPr/>
-        </p:nvPicPr>
-        <p:blipFill>
-          <a:blip r:embed="rId3"/>
-          <a:srcRect/>
-          <a:stretch>
-            <a:fillRect/>
-          </a:stretch>
-        </p:blipFill>
-        <p:spPr>
-          <a:xfrm>
-            <a:off x="-15539486" y="-4761187"/>
-            <a:ext cx="48355375" cy="36267051"/>
-          </a:xfrm>
-          <a:prstGeom prst="rect">
-            <a:avLst/>
-          </a:prstGeom>
-        </p:spPr>
-      </p:pic>
-      <p:pic>
-        <p:nvPicPr>
-          <p:cNvPr id="25" name="PPTLabsMagnifyAreaGroup201705111427516985"/>
-          <p:cNvPicPr>
-            <a:picLocks/>
-          </p:cNvPicPr>
-          <p:nvPr/>
-        </p:nvPicPr>
-        <p:blipFill>
-          <a:blip r:embed="rId3"/>
-          <a:srcRect/>
-          <a:stretch>
-            <a:fillRect/>
-          </a:stretch>
-        </p:blipFill>
-        <p:spPr>
-          <a:xfrm>
-            <a:off x="0" y="0"/>
-            <a:ext cx="9144000" cy="6857993"/>
-          </a:xfrm>
-          <a:prstGeom prst="rect">
-            <a:avLst/>
-          </a:prstGeom>
-        </p:spPr>
-      </p:pic>
-      <p:pic>
-        <p:nvPicPr>
-          <p:cNvPr id="26" name="PPTLabsMagnifyAreaGroup201705111427516985"/>
-          <p:cNvPicPr>
-            <a:picLocks/>
-          </p:cNvPicPr>
-          <p:nvPr/>
-        </p:nvPicPr>
-        <p:blipFill>
-          <a:blip r:embed="rId3"/>
-          <a:srcRect/>
-          <a:stretch>
-            <a:fillRect/>
-          </a:stretch>
-        </p:blipFill>
-        <p:spPr>
-          <a:xfrm>
-            <a:off x="-2354749" y="-1254471"/>
-            <a:ext cx="21551802" cy="16163835"/>
-          </a:xfrm>
-          <a:prstGeom prst="rect">
-            <a:avLst/>
-          </a:prstGeom>
-        </p:spPr>
-      </p:pic>
-      <p:pic>
-        <p:nvPicPr>
-          <p:cNvPr id="24" name="PPTLabsMagnifyAreaGroup201705111427516985"/>
-          <p:cNvPicPr>
-            <a:picLocks noChangeAspect="1"/>
-          </p:cNvPicPr>
-          <p:nvPr/>
-        </p:nvPicPr>
-        <p:blipFill>
-          <a:blip r:embed="rId3"/>
-          <a:srcRect/>
-          <a:stretch>
-            <a:fillRect/>
-          </a:stretch>
-        </p:blipFill>
-        <p:spPr>
-          <a:xfrm>
-            <a:off x="-2354749" y="-1254471"/>
-            <a:ext cx="21551802" cy="16163835"/>
+            <a:off x="-2354311" y="-1254200"/>
+            <a:ext cx="21549770" cy="16162343"/>
           </a:xfrm>
           <a:prstGeom prst="rect">
             <a:avLst/>
@@ -18166,14 +18322,20 @@
       </p:sp>
       <p:pic>
         <p:nvPicPr>
-          <p:cNvPr id="5" name="PPTLabsMagnifyAreaGroup201705111427516985" hidden="1"/>
+          <p:cNvPr id="5" name="PPTLabsMagnifyAreaGroup201904121152579320" hidden="1"/>
           <p:cNvPicPr>
             <a:picLocks/>
           </p:cNvPicPr>
           <p:nvPr/>
         </p:nvPicPr>
         <p:blipFill>
-          <a:blip r:embed="rId3"/>
+          <a:blip r:embed="rId3">
+            <a:extLst>
+              <a:ext uri="{28A0092B-C50C-407E-A947-70E740481C1C}">
+                <a14:useLocalDpi xmlns:a14="http://schemas.microsoft.com/office/drawing/2010/main" val="0"/>
+              </a:ext>
+            </a:extLst>
+          </a:blip>
           <a:stretch>
             <a:fillRect/>
           </a:stretch>
@@ -18190,14 +18352,20 @@
       </p:pic>
       <p:pic>
         <p:nvPicPr>
-          <p:cNvPr id="22" name="PPTLabsMagnifyAreaSlide201705111427517574"/>
+          <p:cNvPr id="22" name="PPTLabsMagnifyAreaSlide201904121152579702"/>
           <p:cNvPicPr>
             <a:picLocks/>
           </p:cNvPicPr>
           <p:nvPr/>
         </p:nvPicPr>
         <p:blipFill>
-          <a:blip r:embed="rId3"/>
+          <a:blip r:embed="rId3">
+            <a:extLst>
+              <a:ext uri="{28A0092B-C50C-407E-A947-70E740481C1C}">
+                <a14:useLocalDpi xmlns:a14="http://schemas.microsoft.com/office/drawing/2010/main" val="0"/>
+              </a:ext>
+            </a:extLst>
+          </a:blip>
           <a:stretch>
             <a:fillRect/>
           </a:stretch>
@@ -18214,7 +18382,7 @@
       </p:pic>
       <p:pic>
         <p:nvPicPr>
-          <p:cNvPr id="6" name="PPTIndicator201705111427517484"/>
+          <p:cNvPr id="6" name="PPTIndicator201904121152579652"/>
           <p:cNvPicPr>
             <a:picLocks/>
           </p:cNvPicPr>
@@ -18245,7 +18413,7 @@
     </p:spTree>
     <p:extLst>
       <p:ext uri="{BB962C8B-B14F-4D97-AF65-F5344CB8AC3E}">
-        <p14:creationId xmlns:p14="http://schemas.microsoft.com/office/powerpoint/2010/main" val="1699140480"/>
+        <p14:creationId xmlns:p14="http://schemas.microsoft.com/office/powerpoint/2010/main" val="3764173744"/>
       </p:ext>
     </p:extLst>
   </p:cSld>
@@ -18352,7 +18520,7 @@
                                     <p:cond delay="0"/>
                                   </p:stCondLst>
                                   <p:childTnLst>
-                                    <p:animMotion origin="layout" path="M 0 0 C 0.2105131 0.2478195 0.2105131 0.2478195 0.4210261 0.495639 E" pathEditMode="relative" ptsTypes="">
+                                    <p:animMotion origin="layout" path="M 0 0 C 0.2105131 0.2478196 0.2105131 0.2478196 0.4210261 0.4956393 E" pathEditMode="relative" ptsTypes="">
                                       <p:cBhvr>
                                         <p:cTn id="11" dur="500" fill="hold"/>
                                         <p:tgtEl>
@@ -18489,7 +18657,7 @@
                                           </p:stCondLst>
                                         </p:cTn>
                                         <p:tgtEl>
-                                          <p:spTgt spid="24"/>
+                                          <p:spTgt spid="23"/>
                                         </p:tgtEl>
                                         <p:attrNameLst>
                                           <p:attrName>style.visibility</p:attrName>
@@ -18561,7 +18729,7 @@
                                           </p:stCondLst>
                                         </p:cTn>
                                         <p:tgtEl>
-                                          <p:spTgt spid="24"/>
+                                          <p:spTgt spid="23"/>
                                         </p:tgtEl>
                                         <p:attrNameLst>
                                           <p:attrName>style.visibility</p:attrName>
@@ -18588,7 +18756,7 @@
                                           </p:stCondLst>
                                         </p:cTn>
                                         <p:tgtEl>
-                                          <p:spTgt spid="26"/>
+                                          <p:spTgt spid="25"/>
                                         </p:tgtEl>
                                         <p:attrNameLst>
                                           <p:attrName>style.visibility</p:attrName>
@@ -18615,7 +18783,7 @@
                                           </p:stCondLst>
                                         </p:cTn>
                                         <p:tgtEl>
-                                          <p:spTgt spid="25"/>
+                                          <p:spTgt spid="24"/>
                                         </p:tgtEl>
                                         <p:attrNameLst>
                                           <p:attrName>style.visibility</p:attrName>
@@ -18634,11 +18802,11 @@
                                     <p:cond delay="0"/>
                                   </p:stCondLst>
                                   <p:childTnLst>
-                                    <p:animMotion origin="layout" path="M 0 0 C 0.2104742 0.2477727 0.2104742 0.2477727 0.4209484 0.4955453 E" pathEditMode="relative" ptsTypes="">
+                                    <p:animMotion origin="layout" path="M 0 0 C 0.2104428 0.2477378 0.2104428 0.2477378 0.4208856 0.4954756 E" pathEditMode="relative" ptsTypes="">
                                       <p:cBhvr>
                                         <p:cTn id="34" dur="1" fill="hold"/>
                                         <p:tgtEl>
-                                          <p:spTgt spid="25"/>
+                                          <p:spTgt spid="24"/>
                                         </p:tgtEl>
                                         <p:attrNameLst>
                                           <p:attrName>ppt_x</p:attrName>
@@ -18659,10 +18827,10 @@
                                       <p:cBhvr>
                                         <p:cTn id="36" dur="1" fill="hold"/>
                                         <p:tgtEl>
-                                          <p:spTgt spid="25"/>
-                                        </p:tgtEl>
-                                      </p:cBhvr>
-                                      <p:by x="235693" y="235693"/>
+                                          <p:spTgt spid="24"/>
+                                        </p:tgtEl>
+                                      </p:cBhvr>
+                                      <p:by x="235671" y="235671"/>
                                     </p:animScale>
                                   </p:childTnLst>
                                 </p:cTn>
@@ -18677,7 +18845,7 @@
                                       <p:cBhvr>
                                         <p:cTn id="38" dur="10"/>
                                         <p:tgtEl>
-                                          <p:spTgt spid="26"/>
+                                          <p:spTgt spid="25"/>
                                         </p:tgtEl>
                                       </p:cBhvr>
                                     </p:animEffect>
@@ -18689,7 +18857,7 @@
                                           </p:stCondLst>
                                         </p:cTn>
                                         <p:tgtEl>
-                                          <p:spTgt spid="26"/>
+                                          <p:spTgt spid="25"/>
                                         </p:tgtEl>
                                         <p:attrNameLst>
                                           <p:attrName>style.visibility</p:attrName>
@@ -18717,11 +18885,11 @@
                                     <p:cond delay="0"/>
                                   </p:stCondLst>
                                   <p:childTnLst>
-                                    <p:animMotion origin="layout" path="M 0.4209484 0.4955453 C 0.4328169 0.9727173 0.4328169 0.9727173 0.4446853 1.449889 E" pathEditMode="relative" ptsTypes="">
+                                    <p:animMotion origin="layout" path="M 0.4208857 0.4954756 C 0.4327389 0.9724518 0.4327389 0.9724518 0.4445921 1.449428 E" pathEditMode="relative" ptsTypes="">
                                       <p:cBhvr>
                                         <p:cTn id="42" dur="400" fill="hold"/>
                                         <p:tgtEl>
-                                          <p:spTgt spid="25"/>
+                                          <p:spTgt spid="24"/>
                                         </p:tgtEl>
                                         <p:attrNameLst>
                                           <p:attrName>ppt_x</p:attrName>
@@ -18742,10 +18910,10 @@
                                       <p:cBhvr>
                                         <p:cTn id="44" dur="400" fill="hold"/>
                                         <p:tgtEl>
-                                          <p:spTgt spid="25"/>
-                                        </p:tgtEl>
-                                      </p:cBhvr>
-                                      <p:by x="224368" y="224372"/>
+                                          <p:spTgt spid="24"/>
+                                        </p:tgtEl>
+                                      </p:cBhvr>
+                                      <p:by x="224342" y="224333"/>
                                     </p:animScale>
                                   </p:childTnLst>
                                 </p:cTn>
@@ -18773,7 +18941,7 @@
                                           </p:stCondLst>
                                         </p:cTn>
                                         <p:tgtEl>
-                                          <p:spTgt spid="27"/>
+                                          <p:spTgt spid="26"/>
                                         </p:tgtEl>
                                         <p:attrNameLst>
                                           <p:attrName>style.visibility</p:attrName>
@@ -18800,7 +18968,7 @@
                                           </p:stCondLst>
                                         </p:cTn>
                                         <p:tgtEl>
-                                          <p:spTgt spid="25"/>
+                                          <p:spTgt spid="24"/>
                                         </p:tgtEl>
                                         <p:attrNameLst>
                                           <p:attrName>style.visibility</p:attrName>
@@ -18845,7 +19013,7 @@
                                           </p:stCondLst>
                                         </p:cTn>
                                         <p:tgtEl>
-                                          <p:spTgt spid="27"/>
+                                          <p:spTgt spid="26"/>
                                         </p:tgtEl>
                                         <p:attrNameLst>
                                           <p:attrName>style.visibility</p:attrName>
@@ -18872,7 +19040,7 @@
                                           </p:stCondLst>
                                         </p:cTn>
                                         <p:tgtEl>
-                                          <p:spTgt spid="29"/>
+                                          <p:spTgt spid="28"/>
                                         </p:tgtEl>
                                         <p:attrNameLst>
                                           <p:attrName>style.visibility</p:attrName>
@@ -18899,7 +19067,7 @@
                                           </p:stCondLst>
                                         </p:cTn>
                                         <p:tgtEl>
-                                          <p:spTgt spid="28"/>
+                                          <p:spTgt spid="27"/>
                                         </p:tgtEl>
                                         <p:attrNameLst>
                                           <p:attrName>style.visibility</p:attrName>
@@ -18918,11 +19086,11 @@
                                     <p:cond delay="0"/>
                                   </p:stCondLst>
                                   <p:childTnLst>
-                                    <p:animMotion origin="layout" path="M 0 0 C 0.2223462 0.7249445 0.2223462 0.7249445 0.4446925 1.449889 E" pathEditMode="relative" ptsTypes="">
+                                    <p:animMotion origin="layout" path="M 0 0 C 0.2222958 0.7247232 0.2222958 0.7247232 0.4445916 1.449446 E" pathEditMode="relative" ptsTypes="">
                                       <p:cBhvr>
                                         <p:cTn id="59" dur="1" fill="hold"/>
                                         <p:tgtEl>
-                                          <p:spTgt spid="28"/>
+                                          <p:spTgt spid="27"/>
                                         </p:tgtEl>
                                         <p:attrNameLst>
                                           <p:attrName>ppt_x</p:attrName>
@@ -18943,10 +19111,10 @@
                                       <p:cBhvr>
                                         <p:cTn id="61" dur="1" fill="hold"/>
                                         <p:tgtEl>
-                                          <p:spTgt spid="28"/>
-                                        </p:tgtEl>
-                                      </p:cBhvr>
-                                      <p:by x="528828" y="528828"/>
+                                          <p:spTgt spid="27"/>
+                                        </p:tgtEl>
+                                      </p:cBhvr>
+                                      <p:by x="528709" y="528709"/>
                                     </p:animScale>
                                   </p:childTnLst>
                                 </p:cTn>
@@ -18961,7 +19129,7 @@
                                       <p:cBhvr>
                                         <p:cTn id="63" dur="10"/>
                                         <p:tgtEl>
-                                          <p:spTgt spid="29"/>
+                                          <p:spTgt spid="28"/>
                                         </p:tgtEl>
                                       </p:cBhvr>
                                     </p:animEffect>
@@ -18973,7 +19141,7 @@
                                           </p:stCondLst>
                                         </p:cTn>
                                         <p:tgtEl>
-                                          <p:spTgt spid="29"/>
+                                          <p:spTgt spid="28"/>
                                         </p:tgtEl>
                                         <p:attrNameLst>
                                           <p:attrName>style.visibility</p:attrName>
@@ -19001,11 +19169,11 @@
                                     <p:cond delay="0"/>
                                   </p:stCondLst>
                                   <p:childTnLst>
-                                    <p:animMotion origin="layout" path="M 0.4446925 1.449889 C 0.002813399 0.8386196 0.002813399 0.8386196 -0.4390657 0.2273501 E" pathEditMode="relative" ptsTypes="">
+                                    <p:animMotion origin="layout" path="M 0.4445916 1.449447 C 0.0027771 0.8383933 0.0027771 0.8383933 -0.4390375 0.2273406 E" pathEditMode="relative" ptsTypes="">
                                       <p:cBhvr>
                                         <p:cTn id="67" dur="400" fill="hold"/>
                                         <p:tgtEl>
-                                          <p:spTgt spid="28"/>
+                                          <p:spTgt spid="27"/>
                                         </p:tgtEl>
                                         <p:attrNameLst>
                                           <p:attrName>ppt_x</p:attrName>
@@ -19026,10 +19194,10 @@
                                       <p:cBhvr>
                                         <p:cTn id="69" dur="400" fill="hold"/>
                                         <p:tgtEl>
-                                          <p:spTgt spid="28"/>
-                                        </p:tgtEl>
-                                      </p:cBhvr>
-                                      <p:by x="35516" y="35515"/>
+                                          <p:spTgt spid="27"/>
+                                        </p:tgtEl>
+                                      </p:cBhvr>
+                                      <p:by x="35522" y="35523"/>
                                     </p:animScale>
                                   </p:childTnLst>
                                 </p:cTn>
@@ -19057,7 +19225,7 @@
                                           </p:stCondLst>
                                         </p:cTn>
                                         <p:tgtEl>
-                                          <p:spTgt spid="30"/>
+                                          <p:spTgt spid="29"/>
                                         </p:tgtEl>
                                         <p:attrNameLst>
                                           <p:attrName>style.visibility</p:attrName>
@@ -19084,7 +19252,7 @@
                                           </p:stCondLst>
                                         </p:cTn>
                                         <p:tgtEl>
-                                          <p:spTgt spid="28"/>
+                                          <p:spTgt spid="27"/>
                                         </p:tgtEl>
                                         <p:attrNameLst>
                                           <p:attrName>style.visibility</p:attrName>
@@ -19129,7 +19297,7 @@
                                           </p:stCondLst>
                                         </p:cTn>
                                         <p:tgtEl>
-                                          <p:spTgt spid="30"/>
+                                          <p:spTgt spid="29"/>
                                         </p:tgtEl>
                                         <p:attrNameLst>
                                           <p:attrName>style.visibility</p:attrName>
@@ -19156,7 +19324,7 @@
                                           </p:stCondLst>
                                         </p:cTn>
                                         <p:tgtEl>
-                                          <p:spTgt spid="32"/>
+                                          <p:spTgt spid="31"/>
                                         </p:tgtEl>
                                         <p:attrNameLst>
                                           <p:attrName>style.visibility</p:attrName>
@@ -19183,7 +19351,7 @@
                                           </p:stCondLst>
                                         </p:cTn>
                                         <p:tgtEl>
-                                          <p:spTgt spid="31"/>
+                                          <p:spTgt spid="30"/>
                                         </p:tgtEl>
                                         <p:attrNameLst>
                                           <p:attrName>style.visibility</p:attrName>
@@ -19202,11 +19370,11 @@
                                     <p:cond delay="0"/>
                                   </p:stCondLst>
                                   <p:childTnLst>
-                                    <p:animMotion origin="layout" path="M 0 0 C -0.219536 0.113675 -0.219536 0.113675 -0.4390719 0.22735 E" pathEditMode="relative" ptsTypes="">
+                                    <p:animMotion origin="layout" path="M 0 0 C -0.2195188 0.1136615 -0.2195188 0.1136615 -0.4390375 0.2273229 E" pathEditMode="relative" ptsTypes="">
                                       <p:cBhvr>
                                         <p:cTn id="84" dur="1" fill="hold"/>
                                         <p:tgtEl>
-                                          <p:spTgt spid="31"/>
+                                          <p:spTgt spid="30"/>
                                         </p:tgtEl>
                                         <p:attrNameLst>
                                           <p:attrName>ppt_x</p:attrName>
@@ -19227,10 +19395,10 @@
                                       <p:cBhvr>
                                         <p:cTn id="86" dur="1" fill="hold"/>
                                         <p:tgtEl>
-                                          <p:spTgt spid="31"/>
-                                        </p:tgtEl>
-                                      </p:cBhvr>
-                                      <p:by x="187815" y="187815"/>
+                                          <p:spTgt spid="30"/>
+                                        </p:tgtEl>
+                                      </p:cBhvr>
+                                      <p:by x="187808" y="187808"/>
                                     </p:animScale>
                                   </p:childTnLst>
                                 </p:cTn>
@@ -19245,7 +19413,7 @@
                                       <p:cBhvr>
                                         <p:cTn id="88" dur="10"/>
                                         <p:tgtEl>
-                                          <p:spTgt spid="32"/>
+                                          <p:spTgt spid="31"/>
                                         </p:tgtEl>
                                       </p:cBhvr>
                                     </p:animEffect>
@@ -19257,7 +19425,7 @@
                                           </p:stCondLst>
                                         </p:cTn>
                                         <p:tgtEl>
-                                          <p:spTgt spid="32"/>
+                                          <p:spTgt spid="31"/>
                                         </p:tgtEl>
                                         <p:attrNameLst>
                                           <p:attrName>style.visibility</p:attrName>
@@ -19285,11 +19453,11 @@
                                     <p:cond delay="0"/>
                                   </p:stCondLst>
                                   <p:childTnLst>
-                                    <p:animMotion origin="layout" path="M -0.4390718 0.22735 C -0.1814083 -0.1447552 -0.1814083 -0.1447552 0.07625526 -0.5168604 E" pathEditMode="relative" ptsTypes="">
+                                    <p:animMotion origin="layout" path="M -0.4390375 0.2273228 C -0.1813931 -0.1447375 -0.1813931 -0.1447375 0.07625118 -0.5167978 E" pathEditMode="relative" ptsTypes="">
                                       <p:cBhvr>
                                         <p:cTn id="92" dur="400" fill="hold"/>
                                         <p:tgtEl>
-                                          <p:spTgt spid="31"/>
+                                          <p:spTgt spid="30"/>
                                         </p:tgtEl>
                                         <p:attrNameLst>
                                           <p:attrName>ppt_x</p:attrName>
@@ -19310,10 +19478,10 @@
                                       <p:cBhvr>
                                         <p:cTn id="94" dur="400" fill="hold"/>
                                         <p:tgtEl>
-                                          <p:spTgt spid="31"/>
-                                        </p:tgtEl>
-                                      </p:cBhvr>
-                                      <p:by x="108283" y="108283"/>
+                                          <p:spTgt spid="30"/>
+                                        </p:tgtEl>
+                                      </p:cBhvr>
+                                      <p:by x="108283" y="108281"/>
                                     </p:animScale>
                                   </p:childTnLst>
                                 </p:cTn>
@@ -19341,7 +19509,7 @@
                                           </p:stCondLst>
                                         </p:cTn>
                                         <p:tgtEl>
-                                          <p:spTgt spid="33"/>
+                                          <p:spTgt spid="32"/>
                                         </p:tgtEl>
                                         <p:attrNameLst>
                                           <p:attrName>style.visibility</p:attrName>
@@ -19368,7 +19536,7 @@
                                           </p:stCondLst>
                                         </p:cTn>
                                         <p:tgtEl>
-                                          <p:spTgt spid="31"/>
+                                          <p:spTgt spid="30"/>
                                         </p:tgtEl>
                                         <p:attrNameLst>
                                           <p:attrName>style.visibility</p:attrName>
@@ -19413,7 +19581,7 @@
                                           </p:stCondLst>
                                         </p:cTn>
                                         <p:tgtEl>
-                                          <p:spTgt spid="33"/>
+                                          <p:spTgt spid="32"/>
                                         </p:tgtEl>
                                         <p:attrNameLst>
                                           <p:attrName>style.visibility</p:attrName>
@@ -19440,7 +19608,7 @@
                                           </p:stCondLst>
                                         </p:cTn>
                                         <p:tgtEl>
-                                          <p:spTgt spid="37"/>
+                                          <p:spTgt spid="36"/>
                                         </p:tgtEl>
                                         <p:attrNameLst>
                                           <p:attrName>style.visibility</p:attrName>
@@ -19467,7 +19635,7 @@
                                           </p:stCondLst>
                                         </p:cTn>
                                         <p:tgtEl>
-                                          <p:spTgt spid="36"/>
+                                          <p:spTgt spid="35"/>
                                         </p:tgtEl>
                                         <p:attrNameLst>
                                           <p:attrName>style.visibility</p:attrName>
@@ -19486,11 +19654,11 @@
                                     <p:cond delay="0"/>
                                   </p:stCondLst>
                                   <p:childTnLst>
-                                    <p:animMotion origin="layout" path="M 0 0 C 0.03813563 -0.2584745 0.03813563 -0.2584745 0.07627127 -0.5169489 E" pathEditMode="relative" ptsTypes="">
+                                    <p:animMotion origin="layout" path="M 0 0 C 0.03813559 -0.2584746 0.03813559 -0.2584746 0.07627118 -0.5169491 E" pathEditMode="relative" ptsTypes="">
                                       <p:cBhvr>
                                         <p:cTn id="109" dur="1" fill="hold"/>
                                         <p:tgtEl>
-                                          <p:spTgt spid="36"/>
+                                          <p:spTgt spid="35"/>
                                         </p:tgtEl>
                                         <p:attrNameLst>
                                           <p:attrName>ppt_x</p:attrName>
@@ -19511,7 +19679,7 @@
                                       <p:cBhvr>
                                         <p:cTn id="111" dur="1" fill="hold"/>
                                         <p:tgtEl>
-                                          <p:spTgt spid="36"/>
+                                          <p:spTgt spid="35"/>
                                         </p:tgtEl>
                                       </p:cBhvr>
                                       <p:by x="203390" y="203390"/>
@@ -19529,7 +19697,7 @@
                                       <p:cBhvr>
                                         <p:cTn id="113" dur="10"/>
                                         <p:tgtEl>
-                                          <p:spTgt spid="37"/>
+                                          <p:spTgt spid="36"/>
                                         </p:tgtEl>
                                       </p:cBhvr>
                                     </p:animEffect>
@@ -19541,7 +19709,7 @@
                                           </p:stCondLst>
                                         </p:cTn>
                                         <p:tgtEl>
-                                          <p:spTgt spid="37"/>
+                                          <p:spTgt spid="36"/>
                                         </p:tgtEl>
                                         <p:attrNameLst>
                                           <p:attrName>style.visibility</p:attrName>
@@ -19560,11 +19728,11 @@
                                     <p:cond delay="0"/>
                                   </p:stCondLst>
                                   <p:childTnLst>
-                                    <p:animMotion origin="layout" path="M 0.07627127 -0.516949 C 0.03813564 -0.2584744 0.03813564 -0.2584744 -7.450581E-09 1.192093E-07 E" pathEditMode="relative" ptsTypes="">
+                                    <p:animMotion origin="layout" path="M 0.07627118 -0.5169491 C 0.0381356 -0.2584745 0.0381356 -0.2584745 7.450581E-09 0 E" pathEditMode="relative" ptsTypes="">
                                       <p:cBhvr>
                                         <p:cTn id="116" dur="400" fill="hold"/>
                                         <p:tgtEl>
-                                          <p:spTgt spid="36"/>
+                                          <p:spTgt spid="35"/>
                                         </p:tgtEl>
                                         <p:attrNameLst>
                                           <p:attrName>ppt_x</p:attrName>
@@ -19585,7 +19753,7 @@
                                       <p:cBhvr>
                                         <p:cTn id="118" dur="400" fill="hold"/>
                                         <p:tgtEl>
-                                          <p:spTgt spid="36"/>
+                                          <p:spTgt spid="35"/>
                                         </p:tgtEl>
                                       </p:cBhvr>
                                       <p:by x="49167" y="49167"/>
@@ -19616,7 +19784,7 @@
                                           </p:stCondLst>
                                         </p:cTn>
                                         <p:tgtEl>
-                                          <p:spTgt spid="34"/>
+                                          <p:spTgt spid="33"/>
                                         </p:tgtEl>
                                         <p:attrNameLst>
                                           <p:attrName>style.visibility</p:attrName>
@@ -19643,7 +19811,7 @@
                                           </p:stCondLst>
                                         </p:cTn>
                                         <p:tgtEl>
-                                          <p:spTgt spid="35"/>
+                                          <p:spTgt spid="34"/>
                                         </p:tgtEl>
                                         <p:attrNameLst>
                                           <p:attrName>style.visibility</p:attrName>
@@ -19666,7 +19834,7 @@
                                       <p:cBhvr>
                                         <p:cTn id="125" dur="10"/>
                                         <p:tgtEl>
-                                          <p:spTgt spid="36"/>
+                                          <p:spTgt spid="35"/>
                                         </p:tgtEl>
                                       </p:cBhvr>
                                     </p:animEffect>
@@ -19678,7 +19846,7 @@
                                           </p:stCondLst>
                                         </p:cTn>
                                         <p:tgtEl>
-                                          <p:spTgt spid="36"/>
+                                          <p:spTgt spid="35"/>
                                         </p:tgtEl>
                                         <p:attrNameLst>
                                           <p:attrName>style.visibility</p:attrName>
@@ -19719,7 +19887,7 @@
       </p:par>
     </p:tnLst>
     <p:bldLst>
-      <p:bldP spid="35" grpId="0"/>
+      <p:bldP spid="34" grpId="0"/>
       <p:bldP spid="2" grpId="0"/>
     </p:bldLst>
   </p:timing>
@@ -20763,7 +20931,7 @@
 
 <file path=ppt/slides/slide31.xml><?xml version="1.0" encoding="utf-8"?>
 <p:sld xmlns:a="http://schemas.openxmlformats.org/drawingml/2006/main" xmlns:r="http://schemas.openxmlformats.org/officeDocument/2006/relationships" xmlns:p="http://schemas.openxmlformats.org/presentationml/2006/main">
-  <p:cSld name="PPTLabsZoomToAreaSlide201705111426152231">
+  <p:cSld name="PPTLabsZoomToAreaSlide201904121151295328">
     <p:bg>
       <p:bgPr>
         <a:solidFill>
@@ -21096,7 +21264,7 @@
       </p:sp>
       <p:sp>
         <p:nvSpPr>
-          <p:cNvPr id="3" name="PPTLabsMagnifyShape201705111426152311"/>
+          <p:cNvPr id="3" name="PPTLabsMagnifyShape201904121151295368"/>
           <p:cNvSpPr/>
           <p:nvPr/>
         </p:nvSpPr>
@@ -21143,14 +21311,14 @@
           <a:p>
             <a:pPr algn="ctr"/>
             <a:r>
-              <a:rPr lang="en-US" b="1" smtClean="0">
+              <a:rPr lang="en-SG" b="1" smtClean="0">
                 <a:solidFill>
                   <a:srgbClr val="FFFFFF"/>
                 </a:solidFill>
               </a:rPr>
               <a:t>Zoom Shape 1</a:t>
             </a:r>
-            <a:endParaRPr lang="en-US" b="1">
+            <a:endParaRPr lang="en-SG" b="1">
               <a:solidFill>
                 <a:srgbClr val="FFFFFF"/>
               </a:solidFill>
@@ -21160,7 +21328,7 @@
       </p:sp>
       <p:sp>
         <p:nvSpPr>
-          <p:cNvPr id="8" name="PPTLabsMagnifyShape201705111426152482"/>
+          <p:cNvPr id="8" name="PPTLabsMagnifyShape201904121151295488"/>
           <p:cNvSpPr/>
           <p:nvPr/>
         </p:nvSpPr>
@@ -21207,14 +21375,14 @@
           <a:p>
             <a:pPr algn="ctr"/>
             <a:r>
-              <a:rPr lang="en-US" b="1" smtClean="0">
+              <a:rPr lang="en-SG" b="1" smtClean="0">
                 <a:solidFill>
                   <a:srgbClr val="FFFFFF"/>
                 </a:solidFill>
               </a:rPr>
               <a:t>Zoom Shape 2</a:t>
             </a:r>
-            <a:endParaRPr lang="en-US" b="1">
+            <a:endParaRPr lang="en-SG" b="1">
               <a:solidFill>
                 <a:srgbClr val="FFFFFF"/>
               </a:solidFill>
@@ -21224,7 +21392,7 @@
       </p:sp>
       <p:sp>
         <p:nvSpPr>
-          <p:cNvPr id="9" name="PPTLabsMagnifyShape201705111426152532"/>
+          <p:cNvPr id="9" name="PPTLabsMagnifyShape201904121151295528"/>
           <p:cNvSpPr/>
           <p:nvPr/>
         </p:nvSpPr>
@@ -21271,14 +21439,14 @@
           <a:p>
             <a:pPr algn="ctr"/>
             <a:r>
-              <a:rPr lang="en-US" b="1" smtClean="0">
+              <a:rPr lang="en-SG" b="1" smtClean="0">
                 <a:solidFill>
                   <a:srgbClr val="FFFFFF"/>
                 </a:solidFill>
               </a:rPr>
               <a:t>Zoom Shape 3</a:t>
             </a:r>
-            <a:endParaRPr lang="en-US" b="1">
+            <a:endParaRPr lang="en-SG" b="1">
               <a:solidFill>
                 <a:srgbClr val="FFFFFF"/>
               </a:solidFill>
@@ -21288,7 +21456,7 @@
       </p:sp>
       <p:sp>
         <p:nvSpPr>
-          <p:cNvPr id="10" name="PPTLabsMagnifyShape201705111426152582"/>
+          <p:cNvPr id="10" name="PPTLabsMagnifyShape201904121151295558"/>
           <p:cNvSpPr/>
           <p:nvPr/>
         </p:nvSpPr>
@@ -21335,14 +21503,14 @@
           <a:p>
             <a:pPr algn="ctr"/>
             <a:r>
-              <a:rPr lang="en-US" b="1" smtClean="0">
+              <a:rPr lang="en-SG" b="1" smtClean="0">
                 <a:solidFill>
                   <a:srgbClr val="FFFFFF"/>
                 </a:solidFill>
               </a:rPr>
               <a:t>Zoom Shape 4</a:t>
             </a:r>
-            <a:endParaRPr lang="en-US" b="1">
+            <a:endParaRPr lang="en-SG" b="1">
               <a:solidFill>
                 <a:srgbClr val="FFFFFF"/>
               </a:solidFill>
@@ -21353,7 +21521,7 @@
     </p:spTree>
     <p:extLst>
       <p:ext uri="{BB962C8B-B14F-4D97-AF65-F5344CB8AC3E}">
-        <p14:creationId xmlns:p14="http://schemas.microsoft.com/office/powerpoint/2010/main" val="2294978696"/>
+        <p14:creationId xmlns:p14="http://schemas.microsoft.com/office/powerpoint/2010/main" val="1956007888"/>
       </p:ext>
     </p:extLst>
   </p:cSld>
@@ -21777,7 +21945,7 @@
 
 <file path=ppt/slides/slide32.xml><?xml version="1.0" encoding="utf-8"?>
 <p:sld xmlns:a="http://schemas.openxmlformats.org/drawingml/2006/main" xmlns:r="http://schemas.openxmlformats.org/officeDocument/2006/relationships" xmlns:p="http://schemas.openxmlformats.org/presentationml/2006/main">
-  <p:cSld name="PPTLabsMagnifyingSlide201705111426152890">
+  <p:cSld name="PPTLabsMagnifyingSlide201904121151295677">
     <p:bg>
       <p:bgPr>
         <a:solidFill>
@@ -21878,14 +22046,20 @@
       </p:sp>
       <p:pic>
         <p:nvPicPr>
-          <p:cNvPr id="5" name="PPTLabsMagnifyAreaGroup201705111426155743" hidden="1"/>
+          <p:cNvPr id="5" name="PPTLabsMagnifyAreaGroup201904121151301981" hidden="1"/>
           <p:cNvPicPr>
             <a:picLocks/>
           </p:cNvPicPr>
           <p:nvPr/>
         </p:nvPicPr>
         <p:blipFill>
-          <a:blip r:embed="rId3"/>
+          <a:blip r:embed="rId3">
+            <a:extLst>
+              <a:ext uri="{28A0092B-C50C-407E-A947-70E740481C1C}">
+                <a14:useLocalDpi xmlns:a14="http://schemas.microsoft.com/office/drawing/2010/main" val="0"/>
+              </a:ext>
+            </a:extLst>
+          </a:blip>
           <a:stretch>
             <a:fillRect/>
           </a:stretch>
@@ -21902,23 +22076,29 @@
       </p:pic>
       <p:pic>
         <p:nvPicPr>
-          <p:cNvPr id="22" name="PPTLabsMagnifyAreaSlide201705111426156340"/>
+          <p:cNvPr id="22" name="PPTLabsMagnifyAreaSlide201904121151302407"/>
           <p:cNvPicPr>
             <a:picLocks/>
           </p:cNvPicPr>
           <p:nvPr/>
         </p:nvPicPr>
         <p:blipFill>
-          <a:blip r:embed="rId3"/>
-          <a:srcRect l="10926" t="7761" r="46646" b="49811"/>
+          <a:blip r:embed="rId3">
+            <a:extLst>
+              <a:ext uri="{28A0092B-C50C-407E-A947-70E740481C1C}">
+                <a14:useLocalDpi xmlns:a14="http://schemas.microsoft.com/office/drawing/2010/main" val="0"/>
+              </a:ext>
+            </a:extLst>
+          </a:blip>
+          <a:srcRect l="10925" t="7760" r="46643" b="49808"/>
           <a:stretch>
             <a:fillRect/>
           </a:stretch>
         </p:blipFill>
         <p:spPr>
           <a:xfrm>
-            <a:off x="998925" y="532116"/>
-            <a:ext cx="3879657" cy="2909740"/>
+            <a:off x="998776" y="532000"/>
+            <a:ext cx="3879956" cy="2909970"/>
           </a:xfrm>
           <a:prstGeom prst="rect">
             <a:avLst/>
@@ -21927,7 +22107,7 @@
       </p:pic>
       <p:pic>
         <p:nvPicPr>
-          <p:cNvPr id="6" name="PPTIndicator201705111426156230"/>
+          <p:cNvPr id="6" name="PPTIndicator201904121151302337"/>
           <p:cNvPicPr>
             <a:picLocks/>
           </p:cNvPicPr>
@@ -21958,7 +22138,7 @@
     </p:spTree>
     <p:extLst>
       <p:ext uri="{BB962C8B-B14F-4D97-AF65-F5344CB8AC3E}">
-        <p14:creationId xmlns:p14="http://schemas.microsoft.com/office/powerpoint/2010/main" val="2258728610"/>
+        <p14:creationId xmlns:p14="http://schemas.microsoft.com/office/powerpoint/2010/main" val="256203005"/>
       </p:ext>
     </p:extLst>
   </p:cSld>
@@ -22135,7 +22315,7 @@
                                     <p:cond delay="0"/>
                                   </p:stCondLst>
                                   <p:childTnLst>
-                                    <p:animMotion origin="layout" path="M 0 0 C 0.089307 0.1051337 0.089307 0.1051337 0.178614 0.2102674 E" pathEditMode="relative" ptsTypes="">
+                                    <p:animMotion origin="layout" path="M 0 0 C 0.08930698 0.1051338 0.08930698 0.1051338 0.178614 0.2102676 E" pathEditMode="relative" ptsTypes="">
                                       <p:cBhvr>
                                         <p:cTn id="17" dur="500" fill="hold"/>
                                         <p:tgtEl>
@@ -22163,7 +22343,7 @@
                                           <p:spTgt spid="22"/>
                                         </p:tgtEl>
                                       </p:cBhvr>
-                                      <p:by x="235691" y="235691"/>
+                                      <p:by x="235673" y="235673"/>
                                     </p:animScale>
                                   </p:childTnLst>
                                 </p:cTn>
@@ -22204,7 +22384,7 @@
 
 <file path=ppt/slides/slide33.xml><?xml version="1.0" encoding="utf-8"?>
 <p:sld xmlns:a="http://schemas.openxmlformats.org/drawingml/2006/main" xmlns:r="http://schemas.openxmlformats.org/officeDocument/2006/relationships" xmlns:p="http://schemas.openxmlformats.org/presentationml/2006/main">
-  <p:cSld name="PPTLabsMagnifiedSlide201705111426156390">
+  <p:cSld name="PPTLabsMagnifiedSlide201904121151302426">
     <p:bg>
       <p:bgPr>
         <a:solidFill>
@@ -22229,14 +22409,20 @@
       </p:grpSpPr>
       <p:pic>
         <p:nvPicPr>
-          <p:cNvPr id="5" name="PPTLabsMagnifyAreaGroup201705111426155743"/>
+          <p:cNvPr id="5" name="PPTLabsMagnifyAreaGroup201904121151301981"/>
           <p:cNvPicPr>
             <a:picLocks noChangeAspect="1"/>
           </p:cNvPicPr>
           <p:nvPr/>
         </p:nvPicPr>
         <p:blipFill>
-          <a:blip r:embed="rId2"/>
+          <a:blip r:embed="rId2">
+            <a:extLst>
+              <a:ext uri="{28A0092B-C50C-407E-A947-70E740481C1C}">
+                <a14:useLocalDpi xmlns:a14="http://schemas.microsoft.com/office/drawing/2010/main" val="0"/>
+              </a:ext>
+            </a:extLst>
+          </a:blip>
           <a:srcRect/>
           <a:stretch>
             <a:fillRect/>
@@ -22244,8 +22430,8 @@
         </p:blipFill>
         <p:spPr>
           <a:xfrm>
-            <a:off x="-2354749" y="-1254471"/>
-            <a:ext cx="21551802" cy="16163835"/>
+            <a:off x="-2354311" y="-1254200"/>
+            <a:ext cx="21549770" cy="16162343"/>
           </a:xfrm>
           <a:prstGeom prst="rect">
             <a:avLst/>
@@ -22254,7 +22440,7 @@
       </p:pic>
       <p:pic>
         <p:nvPicPr>
-          <p:cNvPr id="3" name="PPTIndicator201705111426156729"/>
+          <p:cNvPr id="3" name="PPTIndicator201904121151302661"/>
           <p:cNvPicPr>
             <a:picLocks/>
           </p:cNvPicPr>
@@ -22285,7 +22471,7 @@
     </p:spTree>
     <p:extLst>
       <p:ext uri="{BB962C8B-B14F-4D97-AF65-F5344CB8AC3E}">
-        <p14:creationId xmlns:p14="http://schemas.microsoft.com/office/powerpoint/2010/main" val="1644900449"/>
+        <p14:creationId xmlns:p14="http://schemas.microsoft.com/office/powerpoint/2010/main" val="3375459919"/>
       </p:ext>
     </p:extLst>
   </p:cSld>
@@ -22410,7 +22596,7 @@
 
 <file path=ppt/slides/slide34.xml><?xml version="1.0" encoding="utf-8"?>
 <p:sld xmlns:a="http://schemas.openxmlformats.org/drawingml/2006/main" xmlns:r="http://schemas.openxmlformats.org/officeDocument/2006/relationships" xmlns:p="http://schemas.openxmlformats.org/presentationml/2006/main">
-  <p:cSld name="PPTLabsMagnifiedPanSlide201705111426160103">
+  <p:cSld name="PPTLabsMagnifiedPanSlide201904121151307851">
     <p:bg>
       <p:bgPr>
         <a:solidFill>
@@ -22435,14 +22621,20 @@
       </p:grpSpPr>
       <p:pic>
         <p:nvPicPr>
-          <p:cNvPr id="5" name="PPTLabsMagnifyAreaGroup201705111426155743"/>
+          <p:cNvPr id="5" name="PPTLabsMagnifyAreaGroup201904121151301981"/>
           <p:cNvPicPr>
             <a:picLocks/>
           </p:cNvPicPr>
           <p:nvPr/>
         </p:nvPicPr>
         <p:blipFill>
-          <a:blip r:embed="rId2"/>
+          <a:blip r:embed="rId2">
+            <a:extLst>
+              <a:ext uri="{28A0092B-C50C-407E-A947-70E740481C1C}">
+                <a14:useLocalDpi xmlns:a14="http://schemas.microsoft.com/office/drawing/2010/main" val="0"/>
+              </a:ext>
+            </a:extLst>
+          </a:blip>
           <a:srcRect/>
           <a:stretch>
             <a:fillRect/>
@@ -22450,8 +22642,8 @@
         </p:blipFill>
         <p:spPr>
           <a:xfrm>
-            <a:off x="0" y="0"/>
-            <a:ext cx="9144000" cy="6857993"/>
+            <a:off x="1" y="0"/>
+            <a:ext cx="9143991" cy="6858000"/>
           </a:xfrm>
           <a:prstGeom prst="rect">
             <a:avLst/>
@@ -22460,14 +22652,20 @@
       </p:pic>
       <p:pic>
         <p:nvPicPr>
-          <p:cNvPr id="6" name="PPTLabsMagnifyAreaGroup201705111426155743"/>
+          <p:cNvPr id="6" name="PPTLabsMagnifyAreaGroup201904121151301981"/>
           <p:cNvPicPr>
             <a:picLocks/>
           </p:cNvPicPr>
           <p:nvPr/>
         </p:nvPicPr>
         <p:blipFill>
-          <a:blip r:embed="rId2"/>
+          <a:blip r:embed="rId2">
+            <a:extLst>
+              <a:ext uri="{28A0092B-C50C-407E-A947-70E740481C1C}">
+                <a14:useLocalDpi xmlns:a14="http://schemas.microsoft.com/office/drawing/2010/main" val="0"/>
+              </a:ext>
+            </a:extLst>
+          </a:blip>
           <a:srcRect/>
           <a:stretch>
             <a:fillRect/>
@@ -22475,8 +22673,8 @@
         </p:blipFill>
         <p:spPr>
           <a:xfrm>
-            <a:off x="-2354749" y="-1254471"/>
-            <a:ext cx="21551802" cy="16163835"/>
+            <a:off x="-2354311" y="-1254200"/>
+            <a:ext cx="21549770" cy="16162343"/>
           </a:xfrm>
           <a:prstGeom prst="rect">
             <a:avLst/>
@@ -22485,7 +22683,7 @@
       </p:pic>
       <p:pic>
         <p:nvPicPr>
-          <p:cNvPr id="2" name="PPTIndicator201705111426160413"/>
+          <p:cNvPr id="2" name="PPTIndicator201904121151308450"/>
           <p:cNvPicPr>
             <a:picLocks/>
           </p:cNvPicPr>
@@ -22516,7 +22714,7 @@
     </p:spTree>
     <p:extLst>
       <p:ext uri="{BB962C8B-B14F-4D97-AF65-F5344CB8AC3E}">
-        <p14:creationId xmlns:p14="http://schemas.microsoft.com/office/powerpoint/2010/main" val="1465412335"/>
+        <p14:creationId xmlns:p14="http://schemas.microsoft.com/office/powerpoint/2010/main" val="165756691"/>
       </p:ext>
     </p:extLst>
   </p:cSld>
@@ -22614,7 +22812,7 @@
                                     <p:cond delay="0"/>
                                   </p:stCondLst>
                                   <p:childTnLst>
-                                    <p:animMotion origin="layout" path="M 0 0 C 0.2104742 0.2477727 0.2104742 0.2477727 0.4209484 0.4955453 E" pathEditMode="relative" ptsTypes="">
+                                    <p:animMotion origin="layout" path="M 0 0 C 0.2104428 0.2477378 0.2104428 0.2477378 0.4208856 0.4954756 E" pathEditMode="relative" ptsTypes="">
                                       <p:cBhvr>
                                         <p:cTn id="10" dur="1" fill="hold"/>
                                         <p:tgtEl>
@@ -22642,7 +22840,7 @@
                                           <p:spTgt spid="5"/>
                                         </p:tgtEl>
                                       </p:cBhvr>
-                                      <p:by x="235693" y="235693"/>
+                                      <p:by x="235671" y="235671"/>
                                     </p:animScale>
                                   </p:childTnLst>
                                 </p:cTn>
@@ -22697,7 +22895,7 @@
                                     <p:cond delay="0"/>
                                   </p:stCondLst>
                                   <p:childTnLst>
-                                    <p:animMotion origin="layout" path="M 0.4209484 0.4955453 C 0.4328169 0.9727173 0.4328169 0.9727173 0.4446853 1.449889 E" pathEditMode="relative" ptsTypes="">
+                                    <p:animMotion origin="layout" path="M 0.4208857 0.4954756 C 0.4327389 0.9724518 0.4327389 0.9724518 0.4445921 1.449428 E" pathEditMode="relative" ptsTypes="">
                                       <p:cBhvr>
                                         <p:cTn id="18" dur="400" fill="hold"/>
                                         <p:tgtEl>
@@ -22725,7 +22923,7 @@
                                           <p:spTgt spid="5"/>
                                         </p:tgtEl>
                                       </p:cBhvr>
-                                      <p:by x="224368" y="224372"/>
+                                      <p:by x="224342" y="224333"/>
                                     </p:animScale>
                                   </p:childTnLst>
                                 </p:cTn>
@@ -22763,7 +22961,7 @@
 
 <file path=ppt/slides/slide35.xml><?xml version="1.0" encoding="utf-8"?>
 <p:sld xmlns:a="http://schemas.openxmlformats.org/drawingml/2006/main" xmlns:r="http://schemas.openxmlformats.org/officeDocument/2006/relationships" xmlns:p="http://schemas.openxmlformats.org/presentationml/2006/main">
-  <p:cSld name="PPTLabsMagnifiedSlide201705111426159797">
+  <p:cSld name="PPTLabsMagnifiedSlide201904121151307518">
     <p:bg>
       <p:bgPr>
         <a:solidFill>
@@ -22788,14 +22986,20 @@
       </p:grpSpPr>
       <p:pic>
         <p:nvPicPr>
-          <p:cNvPr id="5" name="PPTLabsMagnifyAreaGroup201705111426159350"/>
+          <p:cNvPr id="5" name="PPTLabsMagnifyAreaGroup201904121151307249"/>
           <p:cNvPicPr>
             <a:picLocks noChangeAspect="1"/>
           </p:cNvPicPr>
           <p:nvPr/>
         </p:nvPicPr>
         <p:blipFill>
-          <a:blip r:embed="rId2"/>
+          <a:blip r:embed="rId2">
+            <a:extLst>
+              <a:ext uri="{28A0092B-C50C-407E-A947-70E740481C1C}">
+                <a14:useLocalDpi xmlns:a14="http://schemas.microsoft.com/office/drawing/2010/main" val="0"/>
+              </a:ext>
+            </a:extLst>
+          </a:blip>
           <a:srcRect/>
           <a:stretch>
             <a:fillRect/>
@@ -22803,8 +23007,8 @@
         </p:blipFill>
         <p:spPr>
           <a:xfrm>
-            <a:off x="-15539485" y="-4761187"/>
-            <a:ext cx="48355375" cy="36267051"/>
+            <a:off x="-15535223" y="-4759577"/>
+            <a:ext cx="48345137" cy="36257512"/>
           </a:xfrm>
           <a:prstGeom prst="rect">
             <a:avLst/>
@@ -22813,7 +23017,7 @@
       </p:pic>
       <p:pic>
         <p:nvPicPr>
-          <p:cNvPr id="3" name="PPTIndicator201705111426160053"/>
+          <p:cNvPr id="3" name="PPTIndicator201904121151307811"/>
           <p:cNvPicPr>
             <a:picLocks/>
           </p:cNvPicPr>
@@ -22844,7 +23048,7 @@
     </p:spTree>
     <p:extLst>
       <p:ext uri="{BB962C8B-B14F-4D97-AF65-F5344CB8AC3E}">
-        <p14:creationId xmlns:p14="http://schemas.microsoft.com/office/powerpoint/2010/main" val="377132491"/>
+        <p14:creationId xmlns:p14="http://schemas.microsoft.com/office/powerpoint/2010/main" val="4021697351"/>
       </p:ext>
     </p:extLst>
   </p:cSld>
@@ -22969,7 +23173,7 @@
 
 <file path=ppt/slides/slide36.xml><?xml version="1.0" encoding="utf-8"?>
 <p:sld xmlns:a="http://schemas.openxmlformats.org/drawingml/2006/main" xmlns:r="http://schemas.openxmlformats.org/officeDocument/2006/relationships" xmlns:p="http://schemas.openxmlformats.org/presentationml/2006/main">
-  <p:cSld name="PPTLabsMagnifiedPanSlide201705111426163920">
+  <p:cSld name="PPTLabsMagnifiedPanSlide201904121151314375">
     <p:bg>
       <p:bgPr>
         <a:solidFill>
@@ -22994,14 +23198,20 @@
       </p:grpSpPr>
       <p:pic>
         <p:nvPicPr>
-          <p:cNvPr id="5" name="PPTLabsMagnifyAreaGroup201705111426159350"/>
+          <p:cNvPr id="5" name="PPTLabsMagnifyAreaGroup201904121151307249"/>
           <p:cNvPicPr>
             <a:picLocks/>
           </p:cNvPicPr>
           <p:nvPr/>
         </p:nvPicPr>
         <p:blipFill>
-          <a:blip r:embed="rId2"/>
+          <a:blip r:embed="rId2">
+            <a:extLst>
+              <a:ext uri="{28A0092B-C50C-407E-A947-70E740481C1C}">
+                <a14:useLocalDpi xmlns:a14="http://schemas.microsoft.com/office/drawing/2010/main" val="0"/>
+              </a:ext>
+            </a:extLst>
+          </a:blip>
           <a:srcRect/>
           <a:stretch>
             <a:fillRect/>
@@ -23009,8 +23219,8 @@
         </p:blipFill>
         <p:spPr>
           <a:xfrm>
-            <a:off x="0" y="0"/>
-            <a:ext cx="9143869" cy="6858000"/>
+            <a:off x="0" y="1"/>
+            <a:ext cx="9144000" cy="6857747"/>
           </a:xfrm>
           <a:prstGeom prst="rect">
             <a:avLst/>
@@ -23019,14 +23229,20 @@
       </p:pic>
       <p:pic>
         <p:nvPicPr>
-          <p:cNvPr id="6" name="PPTLabsMagnifyAreaGroup201705111426159350"/>
+          <p:cNvPr id="6" name="PPTLabsMagnifyAreaGroup201904121151307249"/>
           <p:cNvPicPr>
             <a:picLocks/>
           </p:cNvPicPr>
           <p:nvPr/>
         </p:nvPicPr>
         <p:blipFill>
-          <a:blip r:embed="rId2"/>
+          <a:blip r:embed="rId2">
+            <a:extLst>
+              <a:ext uri="{28A0092B-C50C-407E-A947-70E740481C1C}">
+                <a14:useLocalDpi xmlns:a14="http://schemas.microsoft.com/office/drawing/2010/main" val="0"/>
+              </a:ext>
+            </a:extLst>
+          </a:blip>
           <a:srcRect/>
           <a:stretch>
             <a:fillRect/>
@@ -23034,8 +23250,8 @@
         </p:blipFill>
         <p:spPr>
           <a:xfrm>
-            <a:off x="-15539486" y="-4761187"/>
-            <a:ext cx="48355375" cy="36267051"/>
+            <a:off x="-15535222" y="-4759577"/>
+            <a:ext cx="48345137" cy="36257512"/>
           </a:xfrm>
           <a:prstGeom prst="rect">
             <a:avLst/>
@@ -23044,7 +23260,7 @@
       </p:pic>
       <p:pic>
         <p:nvPicPr>
-          <p:cNvPr id="2" name="PPTIndicator201705111426164100"/>
+          <p:cNvPr id="2" name="PPTIndicator201904121151314512"/>
           <p:cNvPicPr>
             <a:picLocks/>
           </p:cNvPicPr>
@@ -23075,7 +23291,7 @@
     </p:spTree>
     <p:extLst>
       <p:ext uri="{BB962C8B-B14F-4D97-AF65-F5344CB8AC3E}">
-        <p14:creationId xmlns:p14="http://schemas.microsoft.com/office/powerpoint/2010/main" val="3936984793"/>
+        <p14:creationId xmlns:p14="http://schemas.microsoft.com/office/powerpoint/2010/main" val="3102557951"/>
       </p:ext>
     </p:extLst>
   </p:cSld>
@@ -23173,7 +23389,7 @@
                                     <p:cond delay="0"/>
                                   </p:stCondLst>
                                   <p:childTnLst>
-                                    <p:animMotion origin="layout" path="M 0 0 C 0.2223462 0.7249445 0.2223462 0.7249445 0.4446925 1.449889 E" pathEditMode="relative" ptsTypes="">
+                                    <p:animMotion origin="layout" path="M 0 0 C 0.2222958 0.7247232 0.2222958 0.7247232 0.4445916 1.449446 E" pathEditMode="relative" ptsTypes="">
                                       <p:cBhvr>
                                         <p:cTn id="10" dur="1" fill="hold"/>
                                         <p:tgtEl>
@@ -23201,7 +23417,7 @@
                                           <p:spTgt spid="5"/>
                                         </p:tgtEl>
                                       </p:cBhvr>
-                                      <p:by x="528828" y="528828"/>
+                                      <p:by x="528709" y="528709"/>
                                     </p:animScale>
                                   </p:childTnLst>
                                 </p:cTn>
@@ -23256,7 +23472,7 @@
                                     <p:cond delay="0"/>
                                   </p:stCondLst>
                                   <p:childTnLst>
-                                    <p:animMotion origin="layout" path="M 0.4446925 1.449889 C 0.002813399 0.8386196 0.002813399 0.8386196 -0.4390657 0.2273501 E" pathEditMode="relative" ptsTypes="">
+                                    <p:animMotion origin="layout" path="M 0.4445916 1.449447 C 0.0027771 0.8383933 0.0027771 0.8383933 -0.4390375 0.2273406 E" pathEditMode="relative" ptsTypes="">
                                       <p:cBhvr>
                                         <p:cTn id="18" dur="400" fill="hold"/>
                                         <p:tgtEl>
@@ -23284,7 +23500,7 @@
                                           <p:spTgt spid="5"/>
                                         </p:tgtEl>
                                       </p:cBhvr>
-                                      <p:by x="35516" y="35515"/>
+                                      <p:by x="35522" y="35523"/>
                                     </p:animScale>
                                   </p:childTnLst>
                                 </p:cTn>
@@ -23322,7 +23538,7 @@
 
 <file path=ppt/slides/slide37.xml><?xml version="1.0" encoding="utf-8"?>
 <p:sld xmlns:a="http://schemas.openxmlformats.org/drawingml/2006/main" xmlns:r="http://schemas.openxmlformats.org/officeDocument/2006/relationships" xmlns:p="http://schemas.openxmlformats.org/presentationml/2006/main">
-  <p:cSld name="PPTLabsMagnifiedSlide201705111426163642">
+  <p:cSld name="PPTLabsMagnifiedSlide201904121151314052">
     <p:bg>
       <p:bgPr>
         <a:solidFill>
@@ -23347,14 +23563,20 @@
       </p:grpSpPr>
       <p:pic>
         <p:nvPicPr>
-          <p:cNvPr id="5" name="PPTLabsMagnifyAreaGroup201705111426163125"/>
+          <p:cNvPr id="5" name="PPTLabsMagnifyAreaGroup201904121151313648"/>
           <p:cNvPicPr>
             <a:picLocks noChangeAspect="1"/>
           </p:cNvPicPr>
           <p:nvPr/>
         </p:nvPicPr>
         <p:blipFill>
-          <a:blip r:embed="rId2"/>
+          <a:blip r:embed="rId2">
+            <a:extLst>
+              <a:ext uri="{28A0092B-C50C-407E-A947-70E740481C1C}">
+                <a14:useLocalDpi xmlns:a14="http://schemas.microsoft.com/office/drawing/2010/main" val="0"/>
+              </a:ext>
+            </a:extLst>
+          </a:blip>
           <a:srcRect/>
           <a:stretch>
             <a:fillRect/>
@@ -23362,8 +23584,8 @@
         </p:blipFill>
         <p:spPr>
           <a:xfrm>
-            <a:off x="-8029764" y="-1452008"/>
-            <a:ext cx="17173764" cy="12880349"/>
+            <a:off x="-8029119" y="-1451933"/>
+            <a:ext cx="17173119" cy="12879811"/>
           </a:xfrm>
           <a:prstGeom prst="rect">
             <a:avLst/>
@@ -23372,7 +23594,7 @@
       </p:pic>
       <p:pic>
         <p:nvPicPr>
-          <p:cNvPr id="3" name="PPTIndicator201705111426163880"/>
+          <p:cNvPr id="3" name="PPTIndicator201904121151314335"/>
           <p:cNvPicPr>
             <a:picLocks/>
           </p:cNvPicPr>
@@ -23403,7 +23625,7 @@
     </p:spTree>
     <p:extLst>
       <p:ext uri="{BB962C8B-B14F-4D97-AF65-F5344CB8AC3E}">
-        <p14:creationId xmlns:p14="http://schemas.microsoft.com/office/powerpoint/2010/main" val="2090193175"/>
+        <p14:creationId xmlns:p14="http://schemas.microsoft.com/office/powerpoint/2010/main" val="2462021186"/>
       </p:ext>
     </p:extLst>
   </p:cSld>
@@ -23528,7 +23750,7 @@
 
 <file path=ppt/slides/slide38.xml><?xml version="1.0" encoding="utf-8"?>
 <p:sld xmlns:a="http://schemas.openxmlformats.org/drawingml/2006/main" xmlns:r="http://schemas.openxmlformats.org/officeDocument/2006/relationships" xmlns:p="http://schemas.openxmlformats.org/presentationml/2006/main">
-  <p:cSld name="PPTLabsMagnifiedPanSlide201705111426167557">
+  <p:cSld name="PPTLabsMagnifiedPanSlide201904121151319690">
     <p:bg>
       <p:bgPr>
         <a:solidFill>
@@ -23553,14 +23775,20 @@
       </p:grpSpPr>
       <p:pic>
         <p:nvPicPr>
-          <p:cNvPr id="5" name="PPTLabsMagnifyAreaGroup201705111426163125"/>
+          <p:cNvPr id="5" name="PPTLabsMagnifyAreaGroup201904121151313648"/>
           <p:cNvPicPr>
             <a:picLocks/>
           </p:cNvPicPr>
           <p:nvPr/>
         </p:nvPicPr>
         <p:blipFill>
-          <a:blip r:embed="rId2"/>
+          <a:blip r:embed="rId2">
+            <a:extLst>
+              <a:ext uri="{28A0092B-C50C-407E-A947-70E740481C1C}">
+                <a14:useLocalDpi xmlns:a14="http://schemas.microsoft.com/office/drawing/2010/main" val="0"/>
+              </a:ext>
+            </a:extLst>
+          </a:blip>
           <a:srcRect/>
           <a:stretch>
             <a:fillRect/>
@@ -23568,8 +23796,8 @@
         </p:blipFill>
         <p:spPr>
           <a:xfrm>
-            <a:off x="1" y="0"/>
-            <a:ext cx="9143981" cy="6858000"/>
+            <a:off x="0" y="0"/>
+            <a:ext cx="9144001" cy="6857984"/>
           </a:xfrm>
           <a:prstGeom prst="rect">
             <a:avLst/>
@@ -23578,14 +23806,20 @@
       </p:pic>
       <p:pic>
         <p:nvPicPr>
-          <p:cNvPr id="6" name="PPTLabsMagnifyAreaGroup201705111426163125"/>
+          <p:cNvPr id="6" name="PPTLabsMagnifyAreaGroup201904121151313648"/>
           <p:cNvPicPr>
             <a:picLocks/>
           </p:cNvPicPr>
           <p:nvPr/>
         </p:nvPicPr>
         <p:blipFill>
-          <a:blip r:embed="rId2"/>
+          <a:blip r:embed="rId2">
+            <a:extLst>
+              <a:ext uri="{28A0092B-C50C-407E-A947-70E740481C1C}">
+                <a14:useLocalDpi xmlns:a14="http://schemas.microsoft.com/office/drawing/2010/main" val="0"/>
+              </a:ext>
+            </a:extLst>
+          </a:blip>
           <a:srcRect/>
           <a:stretch>
             <a:fillRect/>
@@ -23593,8 +23827,8 @@
         </p:blipFill>
         <p:spPr>
           <a:xfrm>
-            <a:off x="-8029764" y="-1452008"/>
-            <a:ext cx="17173764" cy="12880349"/>
+            <a:off x="-8029119" y="-1451933"/>
+            <a:ext cx="17173119" cy="12879811"/>
           </a:xfrm>
           <a:prstGeom prst="rect">
             <a:avLst/>
@@ -23603,7 +23837,7 @@
       </p:pic>
       <p:pic>
         <p:nvPicPr>
-          <p:cNvPr id="2" name="PPTIndicator201705111426167727"/>
+          <p:cNvPr id="2" name="PPTIndicator201904121151319999"/>
           <p:cNvPicPr>
             <a:picLocks/>
           </p:cNvPicPr>
@@ -23634,7 +23868,7 @@
     </p:spTree>
     <p:extLst>
       <p:ext uri="{BB962C8B-B14F-4D97-AF65-F5344CB8AC3E}">
-        <p14:creationId xmlns:p14="http://schemas.microsoft.com/office/powerpoint/2010/main" val="3976883686"/>
+        <p14:creationId xmlns:p14="http://schemas.microsoft.com/office/powerpoint/2010/main" val="866110915"/>
       </p:ext>
     </p:extLst>
   </p:cSld>
@@ -23732,7 +23966,7 @@
                                     <p:cond delay="0"/>
                                   </p:stCondLst>
                                   <p:childTnLst>
-                                    <p:animMotion origin="layout" path="M 0 0 C -0.219536 0.113675 -0.219536 0.113675 -0.4390719 0.22735 E" pathEditMode="relative" ptsTypes="">
+                                    <p:animMotion origin="layout" path="M 0 0 C -0.2195188 0.1136615 -0.2195188 0.1136615 -0.4390375 0.2273229 E" pathEditMode="relative" ptsTypes="">
                                       <p:cBhvr>
                                         <p:cTn id="10" dur="1" fill="hold"/>
                                         <p:tgtEl>
@@ -23760,7 +23994,7 @@
                                           <p:spTgt spid="5"/>
                                         </p:tgtEl>
                                       </p:cBhvr>
-                                      <p:by x="187815" y="187815"/>
+                                      <p:by x="187808" y="187808"/>
                                     </p:animScale>
                                   </p:childTnLst>
                                 </p:cTn>
@@ -23815,7 +24049,7 @@
                                     <p:cond delay="0"/>
                                   </p:stCondLst>
                                   <p:childTnLst>
-                                    <p:animMotion origin="layout" path="M -0.4390718 0.22735 C -0.1814083 -0.1447552 -0.1814083 -0.1447552 0.07625526 -0.5168604 E" pathEditMode="relative" ptsTypes="">
+                                    <p:animMotion origin="layout" path="M -0.4390375 0.2273228 C -0.1813931 -0.1447375 -0.1813931 -0.1447375 0.07625118 -0.5167978 E" pathEditMode="relative" ptsTypes="">
                                       <p:cBhvr>
                                         <p:cTn id="18" dur="400" fill="hold"/>
                                         <p:tgtEl>
@@ -23843,7 +24077,7 @@
                                           <p:spTgt spid="5"/>
                                         </p:tgtEl>
                                       </p:cBhvr>
-                                      <p:by x="108283" y="108283"/>
+                                      <p:by x="108283" y="108281"/>
                                     </p:animScale>
                                   </p:childTnLst>
                                 </p:cTn>
@@ -23881,7 +24115,7 @@
 
 <file path=ppt/slides/slide39.xml><?xml version="1.0" encoding="utf-8"?>
 <p:sld xmlns:a="http://schemas.openxmlformats.org/drawingml/2006/main" xmlns:r="http://schemas.openxmlformats.org/officeDocument/2006/relationships" xmlns:p="http://schemas.openxmlformats.org/presentationml/2006/main">
-  <p:cSld name="PPTLabsMagnifiedSlide201705111426167302">
+  <p:cSld name="PPTLabsMagnifiedSlide201904121151319395">
     <p:bg>
       <p:bgPr>
         <a:solidFill>
@@ -23906,14 +24140,20 @@
       </p:grpSpPr>
       <p:pic>
         <p:nvPicPr>
-          <p:cNvPr id="5" name="PPTLabsMagnifyAreaGroup201705111426166742"/>
+          <p:cNvPr id="5" name="PPTLabsMagnifyAreaGroup201904121151319050"/>
           <p:cNvPicPr>
             <a:picLocks noChangeAspect="1"/>
           </p:cNvPicPr>
           <p:nvPr/>
         </p:nvPicPr>
         <p:blipFill>
-          <a:blip r:embed="rId2"/>
+          <a:blip r:embed="rId2">
+            <a:extLst>
+              <a:ext uri="{28A0092B-C50C-407E-A947-70E740481C1C}">
+                <a14:useLocalDpi xmlns:a14="http://schemas.microsoft.com/office/drawing/2010/main" val="0"/>
+              </a:ext>
+            </a:extLst>
+          </a:blip>
           <a:srcRect/>
           <a:stretch>
             <a:fillRect/>
@@ -23921,8 +24161,8 @@
         </p:blipFill>
         <p:spPr>
           <a:xfrm>
-            <a:off x="-4028893" y="-7089260"/>
-            <a:ext cx="18596324" cy="13947264"/>
+            <a:off x="-4028544" y="-7088422"/>
+            <a:ext cx="18595570" cy="13946431"/>
           </a:xfrm>
           <a:prstGeom prst="rect">
             <a:avLst/>
@@ -23931,7 +24171,7 @@
       </p:pic>
       <p:pic>
         <p:nvPicPr>
-          <p:cNvPr id="3" name="PPTIndicator201705111426167507"/>
+          <p:cNvPr id="3" name="PPTIndicator201904121151319650"/>
           <p:cNvPicPr>
             <a:picLocks/>
           </p:cNvPicPr>
@@ -23962,7 +24202,7 @@
     </p:spTree>
     <p:extLst>
       <p:ext uri="{BB962C8B-B14F-4D97-AF65-F5344CB8AC3E}">
-        <p14:creationId xmlns:p14="http://schemas.microsoft.com/office/powerpoint/2010/main" val="2918540618"/>
+        <p14:creationId xmlns:p14="http://schemas.microsoft.com/office/powerpoint/2010/main" val="986965900"/>
       </p:ext>
     </p:extLst>
   </p:cSld>
@@ -24394,7 +24634,7 @@
 
 <file path=ppt/slides/slide40.xml><?xml version="1.0" encoding="utf-8"?>
 <p:sld xmlns:a="http://schemas.openxmlformats.org/drawingml/2006/main" xmlns:r="http://schemas.openxmlformats.org/officeDocument/2006/relationships" xmlns:p="http://schemas.openxmlformats.org/presentationml/2006/main">
-  <p:cSld name="PPTLabsDeMagnifyingSlide201705111426167807">
+  <p:cSld name="PPTLabsDeMagnifyingSlide201904121151320129">
     <p:bg>
       <p:bgPr>
         <a:solidFill>
@@ -24495,23 +24735,29 @@
       </p:sp>
       <p:pic>
         <p:nvPicPr>
-          <p:cNvPr id="5" name="PPTLabsMagnifyAreaGroup201705111426166742"/>
+          <p:cNvPr id="5" name="PPTLabsMagnifyAreaGroup201904121151319050"/>
           <p:cNvPicPr>
             <a:picLocks/>
           </p:cNvPicPr>
           <p:nvPr/>
         </p:nvPicPr>
         <p:blipFill>
-          <a:blip r:embed="rId3"/>
-          <a:srcRect l="21665" t="50829" r="29164"/>
+          <a:blip r:embed="rId3">
+            <a:extLst>
+              <a:ext uri="{28A0092B-C50C-407E-A947-70E740481C1C}">
+                <a14:useLocalDpi xmlns:a14="http://schemas.microsoft.com/office/drawing/2010/main" val="0"/>
+              </a:ext>
+            </a:extLst>
+          </a:blip>
+          <a:srcRect l="21664" t="50826" r="29163"/>
           <a:stretch>
             <a:fillRect/>
           </a:stretch>
         </p:blipFill>
         <p:spPr>
           <a:xfrm>
-            <a:off x="0" y="-5"/>
-            <a:ext cx="9144000" cy="6858009"/>
+            <a:off x="0" y="-10"/>
+            <a:ext cx="9144000" cy="6858019"/>
           </a:xfrm>
           <a:prstGeom prst="rect">
             <a:avLst/>
@@ -24520,7 +24766,7 @@
       </p:pic>
       <p:pic>
         <p:nvPicPr>
-          <p:cNvPr id="3" name="PPTIndicator201705111426168088"/>
+          <p:cNvPr id="3" name="PPTIndicator201904121151320574"/>
           <p:cNvPicPr>
             <a:picLocks/>
           </p:cNvPicPr>
@@ -24551,7 +24797,7 @@
     </p:spTree>
     <p:extLst>
       <p:ext uri="{BB962C8B-B14F-4D97-AF65-F5344CB8AC3E}">
-        <p14:creationId xmlns:p14="http://schemas.microsoft.com/office/powerpoint/2010/main" val="3062800820"/>
+        <p14:creationId xmlns:p14="http://schemas.microsoft.com/office/powerpoint/2010/main" val="2842464007"/>
       </p:ext>
     </p:extLst>
   </p:cSld>
@@ -25788,7 +26034,7 @@
 
 <file path=ppt/slides/slide43.xml><?xml version="1.0" encoding="utf-8"?>
 <p:sld xmlns:a="http://schemas.openxmlformats.org/drawingml/2006/main" xmlns:r="http://schemas.openxmlformats.org/officeDocument/2006/relationships" xmlns:p="http://schemas.openxmlformats.org/presentationml/2006/main">
-  <p:cSld name="PPTLabsZoomToAreaSlide201705111424002496">
+  <p:cSld name="PPTLabsZoomToAreaSlide201904121149590733">
     <p:bg>
       <p:bgPr>
         <a:solidFill>
@@ -26121,7 +26367,7 @@
       </p:sp>
       <p:sp>
         <p:nvSpPr>
-          <p:cNvPr id="3" name="PPTLabsMagnifyShape201705111424002516"/>
+          <p:cNvPr id="3" name="PPTLabsMagnifyShape201904121149590742"/>
           <p:cNvSpPr/>
           <p:nvPr/>
         </p:nvSpPr>
@@ -26168,14 +26414,14 @@
           <a:p>
             <a:pPr algn="ctr"/>
             <a:r>
-              <a:rPr lang="en-US" b="1" smtClean="0">
+              <a:rPr lang="en-SG" b="1" smtClean="0">
                 <a:solidFill>
                   <a:srgbClr val="FFFFFF"/>
                 </a:solidFill>
               </a:rPr>
               <a:t>Zoom Shape 1</a:t>
             </a:r>
-            <a:endParaRPr lang="en-US" b="1">
+            <a:endParaRPr lang="en-SG" b="1">
               <a:solidFill>
                 <a:srgbClr val="FFFFFF"/>
               </a:solidFill>
@@ -26185,7 +26431,7 @@
       </p:sp>
       <p:sp>
         <p:nvSpPr>
-          <p:cNvPr id="8" name="PPTLabsMagnifyShape201705111424002566"/>
+          <p:cNvPr id="8" name="PPTLabsMagnifyShape201904121149590782"/>
           <p:cNvSpPr/>
           <p:nvPr/>
         </p:nvSpPr>
@@ -26232,14 +26478,14 @@
           <a:p>
             <a:pPr algn="ctr"/>
             <a:r>
-              <a:rPr lang="en-US" b="1" smtClean="0">
+              <a:rPr lang="en-SG" b="1" smtClean="0">
                 <a:solidFill>
                   <a:srgbClr val="FFFFFF"/>
                 </a:solidFill>
               </a:rPr>
               <a:t>Zoom Shape 2</a:t>
             </a:r>
-            <a:endParaRPr lang="en-US" b="1">
+            <a:endParaRPr lang="en-SG" b="1">
               <a:solidFill>
                 <a:srgbClr val="FFFFFF"/>
               </a:solidFill>
@@ -26249,7 +26495,7 @@
       </p:sp>
       <p:sp>
         <p:nvSpPr>
-          <p:cNvPr id="9" name="PPTLabsMagnifyShape201705111424002616"/>
+          <p:cNvPr id="9" name="PPTLabsMagnifyShape201904121149590822"/>
           <p:cNvSpPr/>
           <p:nvPr/>
         </p:nvSpPr>
@@ -26296,14 +26542,14 @@
           <a:p>
             <a:pPr algn="ctr"/>
             <a:r>
-              <a:rPr lang="en-US" b="1" smtClean="0">
+              <a:rPr lang="en-SG" b="1" smtClean="0">
                 <a:solidFill>
                   <a:srgbClr val="FFFFFF"/>
                 </a:solidFill>
               </a:rPr>
               <a:t>Zoom Shape 3</a:t>
             </a:r>
-            <a:endParaRPr lang="en-US" b="1">
+            <a:endParaRPr lang="en-SG" b="1">
               <a:solidFill>
                 <a:srgbClr val="FFFFFF"/>
               </a:solidFill>
@@ -26313,7 +26559,7 @@
       </p:sp>
       <p:sp>
         <p:nvSpPr>
-          <p:cNvPr id="10" name="PPTLabsMagnifyShape201705111424002666"/>
+          <p:cNvPr id="10" name="PPTLabsMagnifyShape201904121149590870"/>
           <p:cNvSpPr/>
           <p:nvPr/>
         </p:nvSpPr>
@@ -26360,14 +26606,14 @@
           <a:p>
             <a:pPr algn="ctr"/>
             <a:r>
-              <a:rPr lang="en-US" b="1" smtClean="0">
+              <a:rPr lang="en-SG" b="1" smtClean="0">
                 <a:solidFill>
                   <a:srgbClr val="FFFFFF"/>
                 </a:solidFill>
               </a:rPr>
               <a:t>Zoom Shape 4</a:t>
             </a:r>
-            <a:endParaRPr lang="en-US" b="1">
+            <a:endParaRPr lang="en-SG" b="1">
               <a:solidFill>
                 <a:srgbClr val="FFFFFF"/>
               </a:solidFill>
@@ -26378,7 +26624,7 @@
     </p:spTree>
     <p:extLst>
       <p:ext uri="{BB962C8B-B14F-4D97-AF65-F5344CB8AC3E}">
-        <p14:creationId xmlns:p14="http://schemas.microsoft.com/office/powerpoint/2010/main" val="1282630545"/>
+        <p14:creationId xmlns:p14="http://schemas.microsoft.com/office/powerpoint/2010/main" val="1583712554"/>
       </p:ext>
     </p:extLst>
   </p:cSld>
@@ -26802,7 +27048,7 @@
 
 <file path=ppt/slides/slide44.xml><?xml version="1.0" encoding="utf-8"?>
 <p:sld xmlns:a="http://schemas.openxmlformats.org/drawingml/2006/main" xmlns:r="http://schemas.openxmlformats.org/officeDocument/2006/relationships" xmlns:p="http://schemas.openxmlformats.org/presentationml/2006/main">
-  <p:cSld name="PPTLabsMagnifyingSlide201705111424002890">
+  <p:cSld name="PPTLabsMagnifyingSlide201904121149591009">
     <p:bg>
       <p:bgPr>
         <a:solidFill>
@@ -26903,23 +27149,29 @@
       </p:sp>
       <p:pic>
         <p:nvPicPr>
-          <p:cNvPr id="36" name="PPTLabsMagnifyAreaGroup201705111424017468"/>
+          <p:cNvPr id="36" name="PPTLabsMagnifyAreaGroup201904121150011634"/>
           <p:cNvPicPr>
             <a:picLocks/>
           </p:cNvPicPr>
           <p:nvPr/>
         </p:nvPicPr>
         <p:blipFill>
-          <a:blip r:embed="rId3"/>
-          <a:srcRect l="21665" t="50829" r="29164"/>
+          <a:blip r:embed="rId3">
+            <a:extLst>
+              <a:ext uri="{28A0092B-C50C-407E-A947-70E740481C1C}">
+                <a14:useLocalDpi xmlns:a14="http://schemas.microsoft.com/office/drawing/2010/main" val="0"/>
+              </a:ext>
+            </a:extLst>
+          </a:blip>
+          <a:srcRect l="21664" t="50826" r="29163"/>
           <a:stretch>
             <a:fillRect/>
           </a:stretch>
         </p:blipFill>
         <p:spPr>
           <a:xfrm>
-            <a:off x="0" y="-5"/>
-            <a:ext cx="9144000" cy="6858009"/>
+            <a:off x="0" y="-10"/>
+            <a:ext cx="9144000" cy="6858019"/>
           </a:xfrm>
           <a:prstGeom prst="rect">
             <a:avLst/>
@@ -26928,14 +27180,20 @@
       </p:pic>
       <p:pic>
         <p:nvPicPr>
-          <p:cNvPr id="33" name="PPTLabsMagnifyAreaGroup201705111424017468"/>
+          <p:cNvPr id="33" name="PPTLabsMagnifyAreaGroup201904121150011634"/>
           <p:cNvPicPr>
             <a:picLocks noChangeAspect="1"/>
           </p:cNvPicPr>
           <p:nvPr/>
         </p:nvPicPr>
         <p:blipFill>
-          <a:blip r:embed="rId3"/>
+          <a:blip r:embed="rId3">
+            <a:extLst>
+              <a:ext uri="{28A0092B-C50C-407E-A947-70E740481C1C}">
+                <a14:useLocalDpi xmlns:a14="http://schemas.microsoft.com/office/drawing/2010/main" val="0"/>
+              </a:ext>
+            </a:extLst>
+          </a:blip>
           <a:srcRect/>
           <a:stretch>
             <a:fillRect/>
@@ -26943,8 +27201,8 @@
         </p:blipFill>
         <p:spPr>
           <a:xfrm>
-            <a:off x="-4028893" y="-7089260"/>
-            <a:ext cx="18596324" cy="13947264"/>
+            <a:off x="-4028544" y="-7088422"/>
+            <a:ext cx="18595570" cy="13946431"/>
           </a:xfrm>
           <a:prstGeom prst="rect">
             <a:avLst/>
@@ -26953,14 +27211,206 @@
       </p:pic>
       <p:pic>
         <p:nvPicPr>
-          <p:cNvPr id="31" name="PPTLabsMagnifyAreaGroup201705111424013281"/>
+          <p:cNvPr id="31" name="PPTLabsMagnifyAreaGroup201904121150006784"/>
           <p:cNvPicPr>
             <a:picLocks/>
           </p:cNvPicPr>
           <p:nvPr/>
         </p:nvPicPr>
         <p:blipFill>
-          <a:blip r:embed="rId3"/>
+          <a:blip r:embed="rId3">
+            <a:extLst>
+              <a:ext uri="{28A0092B-C50C-407E-A947-70E740481C1C}">
+                <a14:useLocalDpi xmlns:a14="http://schemas.microsoft.com/office/drawing/2010/main" val="0"/>
+              </a:ext>
+            </a:extLst>
+          </a:blip>
+          <a:srcRect/>
+          <a:stretch>
+            <a:fillRect/>
+          </a:stretch>
+        </p:blipFill>
+        <p:spPr>
+          <a:xfrm>
+            <a:off x="0" y="0"/>
+            <a:ext cx="9144001" cy="6857984"/>
+          </a:xfrm>
+          <a:prstGeom prst="rect">
+            <a:avLst/>
+          </a:prstGeom>
+        </p:spPr>
+      </p:pic>
+      <p:pic>
+        <p:nvPicPr>
+          <p:cNvPr id="32" name="PPTLabsMagnifyAreaGroup201904121150006784"/>
+          <p:cNvPicPr>
+            <a:picLocks/>
+          </p:cNvPicPr>
+          <p:nvPr/>
+        </p:nvPicPr>
+        <p:blipFill>
+          <a:blip r:embed="rId3">
+            <a:extLst>
+              <a:ext uri="{28A0092B-C50C-407E-A947-70E740481C1C}">
+                <a14:useLocalDpi xmlns:a14="http://schemas.microsoft.com/office/drawing/2010/main" val="0"/>
+              </a:ext>
+            </a:extLst>
+          </a:blip>
+          <a:srcRect/>
+          <a:stretch>
+            <a:fillRect/>
+          </a:stretch>
+        </p:blipFill>
+        <p:spPr>
+          <a:xfrm>
+            <a:off x="-8029119" y="-1451933"/>
+            <a:ext cx="17173119" cy="12879811"/>
+          </a:xfrm>
+          <a:prstGeom prst="rect">
+            <a:avLst/>
+          </a:prstGeom>
+        </p:spPr>
+      </p:pic>
+      <p:pic>
+        <p:nvPicPr>
+          <p:cNvPr id="30" name="PPTLabsMagnifyAreaGroup201904121150006784"/>
+          <p:cNvPicPr>
+            <a:picLocks noChangeAspect="1"/>
+          </p:cNvPicPr>
+          <p:nvPr/>
+        </p:nvPicPr>
+        <p:blipFill>
+          <a:blip r:embed="rId3">
+            <a:extLst>
+              <a:ext uri="{28A0092B-C50C-407E-A947-70E740481C1C}">
+                <a14:useLocalDpi xmlns:a14="http://schemas.microsoft.com/office/drawing/2010/main" val="0"/>
+              </a:ext>
+            </a:extLst>
+          </a:blip>
+          <a:srcRect/>
+          <a:stretch>
+            <a:fillRect/>
+          </a:stretch>
+        </p:blipFill>
+        <p:spPr>
+          <a:xfrm>
+            <a:off x="-8029119" y="-1451933"/>
+            <a:ext cx="17173119" cy="12879811"/>
+          </a:xfrm>
+          <a:prstGeom prst="rect">
+            <a:avLst/>
+          </a:prstGeom>
+        </p:spPr>
+      </p:pic>
+      <p:pic>
+        <p:nvPicPr>
+          <p:cNvPr id="28" name="PPTLabsMagnifyAreaGroup201904121150001729"/>
+          <p:cNvPicPr>
+            <a:picLocks/>
+          </p:cNvPicPr>
+          <p:nvPr/>
+        </p:nvPicPr>
+        <p:blipFill>
+          <a:blip r:embed="rId3">
+            <a:extLst>
+              <a:ext uri="{28A0092B-C50C-407E-A947-70E740481C1C}">
+                <a14:useLocalDpi xmlns:a14="http://schemas.microsoft.com/office/drawing/2010/main" val="0"/>
+              </a:ext>
+            </a:extLst>
+          </a:blip>
+          <a:srcRect/>
+          <a:stretch>
+            <a:fillRect/>
+          </a:stretch>
+        </p:blipFill>
+        <p:spPr>
+          <a:xfrm>
+            <a:off x="0" y="1"/>
+            <a:ext cx="9144000" cy="6857747"/>
+          </a:xfrm>
+          <a:prstGeom prst="rect">
+            <a:avLst/>
+          </a:prstGeom>
+        </p:spPr>
+      </p:pic>
+      <p:pic>
+        <p:nvPicPr>
+          <p:cNvPr id="29" name="PPTLabsMagnifyAreaGroup201904121150001729"/>
+          <p:cNvPicPr>
+            <a:picLocks/>
+          </p:cNvPicPr>
+          <p:nvPr/>
+        </p:nvPicPr>
+        <p:blipFill>
+          <a:blip r:embed="rId3">
+            <a:extLst>
+              <a:ext uri="{28A0092B-C50C-407E-A947-70E740481C1C}">
+                <a14:useLocalDpi xmlns:a14="http://schemas.microsoft.com/office/drawing/2010/main" val="0"/>
+              </a:ext>
+            </a:extLst>
+          </a:blip>
+          <a:srcRect/>
+          <a:stretch>
+            <a:fillRect/>
+          </a:stretch>
+        </p:blipFill>
+        <p:spPr>
+          <a:xfrm>
+            <a:off x="-15535222" y="-4759577"/>
+            <a:ext cx="48345137" cy="36257512"/>
+          </a:xfrm>
+          <a:prstGeom prst="rect">
+            <a:avLst/>
+          </a:prstGeom>
+        </p:spPr>
+      </p:pic>
+      <p:pic>
+        <p:nvPicPr>
+          <p:cNvPr id="27" name="PPTLabsMagnifyAreaGroup201904121150001729"/>
+          <p:cNvPicPr>
+            <a:picLocks noChangeAspect="1"/>
+          </p:cNvPicPr>
+          <p:nvPr/>
+        </p:nvPicPr>
+        <p:blipFill>
+          <a:blip r:embed="rId3">
+            <a:extLst>
+              <a:ext uri="{28A0092B-C50C-407E-A947-70E740481C1C}">
+                <a14:useLocalDpi xmlns:a14="http://schemas.microsoft.com/office/drawing/2010/main" val="0"/>
+              </a:ext>
+            </a:extLst>
+          </a:blip>
+          <a:srcRect/>
+          <a:stretch>
+            <a:fillRect/>
+          </a:stretch>
+        </p:blipFill>
+        <p:spPr>
+          <a:xfrm>
+            <a:off x="-15535222" y="-4759577"/>
+            <a:ext cx="48345137" cy="36257512"/>
+          </a:xfrm>
+          <a:prstGeom prst="rect">
+            <a:avLst/>
+          </a:prstGeom>
+        </p:spPr>
+      </p:pic>
+      <p:pic>
+        <p:nvPicPr>
+          <p:cNvPr id="25" name="PPTLabsMagnifyAreaGroup201904121149596740"/>
+          <p:cNvPicPr>
+            <a:picLocks/>
+          </p:cNvPicPr>
+          <p:nvPr/>
+        </p:nvPicPr>
+        <p:blipFill>
+          <a:blip r:embed="rId3">
+            <a:extLst>
+              <a:ext uri="{28A0092B-C50C-407E-A947-70E740481C1C}">
+                <a14:useLocalDpi xmlns:a14="http://schemas.microsoft.com/office/drawing/2010/main" val="0"/>
+              </a:ext>
+            </a:extLst>
+          </a:blip>
           <a:srcRect/>
           <a:stretch>
             <a:fillRect/>
@@ -26969,7 +27419,7 @@
         <p:spPr>
           <a:xfrm>
             <a:off x="1" y="0"/>
-            <a:ext cx="9143981" cy="6858000"/>
+            <a:ext cx="9143991" cy="6858000"/>
           </a:xfrm>
           <a:prstGeom prst="rect">
             <a:avLst/>
@@ -26978,14 +27428,20 @@
       </p:pic>
       <p:pic>
         <p:nvPicPr>
-          <p:cNvPr id="32" name="PPTLabsMagnifyAreaGroup201705111424013281"/>
+          <p:cNvPr id="26" name="PPTLabsMagnifyAreaGroup201904121149596740"/>
           <p:cNvPicPr>
             <a:picLocks/>
           </p:cNvPicPr>
           <p:nvPr/>
         </p:nvPicPr>
         <p:blipFill>
-          <a:blip r:embed="rId3"/>
+          <a:blip r:embed="rId3">
+            <a:extLst>
+              <a:ext uri="{28A0092B-C50C-407E-A947-70E740481C1C}">
+                <a14:useLocalDpi xmlns:a14="http://schemas.microsoft.com/office/drawing/2010/main" val="0"/>
+              </a:ext>
+            </a:extLst>
+          </a:blip>
           <a:srcRect/>
           <a:stretch>
             <a:fillRect/>
@@ -26993,8 +27449,8 @@
         </p:blipFill>
         <p:spPr>
           <a:xfrm>
-            <a:off x="-8029764" y="-1452008"/>
-            <a:ext cx="17173764" cy="12880349"/>
+            <a:off x="-2354311" y="-1254200"/>
+            <a:ext cx="21549770" cy="16162343"/>
           </a:xfrm>
           <a:prstGeom prst="rect">
             <a:avLst/>
@@ -27003,14 +27459,20 @@
       </p:pic>
       <p:pic>
         <p:nvPicPr>
-          <p:cNvPr id="30" name="PPTLabsMagnifyAreaGroup201705111424013281"/>
+          <p:cNvPr id="24" name="PPTLabsMagnifyAreaGroup201904121149596740"/>
           <p:cNvPicPr>
             <a:picLocks noChangeAspect="1"/>
           </p:cNvPicPr>
           <p:nvPr/>
         </p:nvPicPr>
         <p:blipFill>
-          <a:blip r:embed="rId3"/>
+          <a:blip r:embed="rId3">
+            <a:extLst>
+              <a:ext uri="{28A0092B-C50C-407E-A947-70E740481C1C}">
+                <a14:useLocalDpi xmlns:a14="http://schemas.microsoft.com/office/drawing/2010/main" val="0"/>
+              </a:ext>
+            </a:extLst>
+          </a:blip>
           <a:srcRect/>
           <a:stretch>
             <a:fillRect/>
@@ -27018,158 +27480,8 @@
         </p:blipFill>
         <p:spPr>
           <a:xfrm>
-            <a:off x="-8029764" y="-1452008"/>
-            <a:ext cx="17173764" cy="12880349"/>
-          </a:xfrm>
-          <a:prstGeom prst="rect">
-            <a:avLst/>
-          </a:prstGeom>
-        </p:spPr>
-      </p:pic>
-      <p:pic>
-        <p:nvPicPr>
-          <p:cNvPr id="28" name="PPTLabsMagnifyAreaGroup201705111424009178"/>
-          <p:cNvPicPr>
-            <a:picLocks/>
-          </p:cNvPicPr>
-          <p:nvPr/>
-        </p:nvPicPr>
-        <p:blipFill>
-          <a:blip r:embed="rId3"/>
-          <a:srcRect/>
-          <a:stretch>
-            <a:fillRect/>
-          </a:stretch>
-        </p:blipFill>
-        <p:spPr>
-          <a:xfrm>
-            <a:off x="0" y="0"/>
-            <a:ext cx="9143869" cy="6858000"/>
-          </a:xfrm>
-          <a:prstGeom prst="rect">
-            <a:avLst/>
-          </a:prstGeom>
-        </p:spPr>
-      </p:pic>
-      <p:pic>
-        <p:nvPicPr>
-          <p:cNvPr id="29" name="PPTLabsMagnifyAreaGroup201705111424009178"/>
-          <p:cNvPicPr>
-            <a:picLocks/>
-          </p:cNvPicPr>
-          <p:nvPr/>
-        </p:nvPicPr>
-        <p:blipFill>
-          <a:blip r:embed="rId3"/>
-          <a:srcRect/>
-          <a:stretch>
-            <a:fillRect/>
-          </a:stretch>
-        </p:blipFill>
-        <p:spPr>
-          <a:xfrm>
-            <a:off x="-15539486" y="-4761187"/>
-            <a:ext cx="48355375" cy="36267051"/>
-          </a:xfrm>
-          <a:prstGeom prst="rect">
-            <a:avLst/>
-          </a:prstGeom>
-        </p:spPr>
-      </p:pic>
-      <p:pic>
-        <p:nvPicPr>
-          <p:cNvPr id="27" name="PPTLabsMagnifyAreaGroup201705111424009178"/>
-          <p:cNvPicPr>
-            <a:picLocks noChangeAspect="1"/>
-          </p:cNvPicPr>
-          <p:nvPr/>
-        </p:nvPicPr>
-        <p:blipFill>
-          <a:blip r:embed="rId3"/>
-          <a:srcRect/>
-          <a:stretch>
-            <a:fillRect/>
-          </a:stretch>
-        </p:blipFill>
-        <p:spPr>
-          <a:xfrm>
-            <a:off x="-15539486" y="-4761187"/>
-            <a:ext cx="48355375" cy="36267051"/>
-          </a:xfrm>
-          <a:prstGeom prst="rect">
-            <a:avLst/>
-          </a:prstGeom>
-        </p:spPr>
-      </p:pic>
-      <p:pic>
-        <p:nvPicPr>
-          <p:cNvPr id="25" name="PPTLabsMagnifyAreaGroup201705111424005542"/>
-          <p:cNvPicPr>
-            <a:picLocks/>
-          </p:cNvPicPr>
-          <p:nvPr/>
-        </p:nvPicPr>
-        <p:blipFill>
-          <a:blip r:embed="rId3"/>
-          <a:srcRect/>
-          <a:stretch>
-            <a:fillRect/>
-          </a:stretch>
-        </p:blipFill>
-        <p:spPr>
-          <a:xfrm>
-            <a:off x="0" y="0"/>
-            <a:ext cx="9144000" cy="6857993"/>
-          </a:xfrm>
-          <a:prstGeom prst="rect">
-            <a:avLst/>
-          </a:prstGeom>
-        </p:spPr>
-      </p:pic>
-      <p:pic>
-        <p:nvPicPr>
-          <p:cNvPr id="26" name="PPTLabsMagnifyAreaGroup201705111424005542"/>
-          <p:cNvPicPr>
-            <a:picLocks/>
-          </p:cNvPicPr>
-          <p:nvPr/>
-        </p:nvPicPr>
-        <p:blipFill>
-          <a:blip r:embed="rId3"/>
-          <a:srcRect/>
-          <a:stretch>
-            <a:fillRect/>
-          </a:stretch>
-        </p:blipFill>
-        <p:spPr>
-          <a:xfrm>
-            <a:off x="-2354749" y="-1254471"/>
-            <a:ext cx="21551802" cy="16163835"/>
-          </a:xfrm>
-          <a:prstGeom prst="rect">
-            <a:avLst/>
-          </a:prstGeom>
-        </p:spPr>
-      </p:pic>
-      <p:pic>
-        <p:nvPicPr>
-          <p:cNvPr id="24" name="PPTLabsMagnifyAreaGroup201705111424005542"/>
-          <p:cNvPicPr>
-            <a:picLocks noChangeAspect="1"/>
-          </p:cNvPicPr>
-          <p:nvPr/>
-        </p:nvPicPr>
-        <p:blipFill>
-          <a:blip r:embed="rId3"/>
-          <a:srcRect/>
-          <a:stretch>
-            <a:fillRect/>
-          </a:stretch>
-        </p:blipFill>
-        <p:spPr>
-          <a:xfrm>
-            <a:off x="-2354749" y="-1254471"/>
-            <a:ext cx="21551802" cy="16163835"/>
+            <a:off x="-2354311" y="-1254200"/>
+            <a:ext cx="21549770" cy="16162343"/>
           </a:xfrm>
           <a:prstGeom prst="rect">
             <a:avLst/>
@@ -27254,14 +27566,20 @@
       </p:sp>
       <p:pic>
         <p:nvPicPr>
-          <p:cNvPr id="5" name="PPTLabsMagnifyAreaGroup201705111424005542" hidden="1"/>
+          <p:cNvPr id="5" name="PPTLabsMagnifyAreaGroup201904121149596740" hidden="1"/>
           <p:cNvPicPr>
             <a:picLocks/>
           </p:cNvPicPr>
           <p:nvPr/>
         </p:nvPicPr>
         <p:blipFill>
-          <a:blip r:embed="rId3"/>
+          <a:blip r:embed="rId3">
+            <a:extLst>
+              <a:ext uri="{28A0092B-C50C-407E-A947-70E740481C1C}">
+                <a14:useLocalDpi xmlns:a14="http://schemas.microsoft.com/office/drawing/2010/main" val="0"/>
+              </a:ext>
+            </a:extLst>
+          </a:blip>
           <a:stretch>
             <a:fillRect/>
           </a:stretch>
@@ -27278,23 +27596,29 @@
       </p:pic>
       <p:pic>
         <p:nvPicPr>
-          <p:cNvPr id="22" name="PPTLabsMagnifyAreaSlide201705111424006063"/>
+          <p:cNvPr id="22" name="PPTLabsMagnifyAreaSlide201904121149596970"/>
           <p:cNvPicPr>
             <a:picLocks/>
           </p:cNvPicPr>
           <p:nvPr/>
         </p:nvPicPr>
         <p:blipFill>
-          <a:blip r:embed="rId3"/>
-          <a:srcRect l="10926" t="7761" r="46646" b="49811"/>
+          <a:blip r:embed="rId3">
+            <a:extLst>
+              <a:ext uri="{28A0092B-C50C-407E-A947-70E740481C1C}">
+                <a14:useLocalDpi xmlns:a14="http://schemas.microsoft.com/office/drawing/2010/main" val="0"/>
+              </a:ext>
+            </a:extLst>
+          </a:blip>
+          <a:srcRect l="10925" t="7760" r="46643" b="49808"/>
           <a:stretch>
             <a:fillRect/>
           </a:stretch>
         </p:blipFill>
         <p:spPr>
           <a:xfrm>
-            <a:off x="998925" y="532116"/>
-            <a:ext cx="3879657" cy="2909740"/>
+            <a:off x="998776" y="532000"/>
+            <a:ext cx="3879956" cy="2909970"/>
           </a:xfrm>
           <a:prstGeom prst="rect">
             <a:avLst/>
@@ -27303,7 +27627,7 @@
       </p:pic>
       <p:pic>
         <p:nvPicPr>
-          <p:cNvPr id="6" name="PPTIndicator201705111424005983"/>
+          <p:cNvPr id="6" name="PPTIndicator201904121149596940"/>
           <p:cNvPicPr>
             <a:picLocks/>
           </p:cNvPicPr>
@@ -27334,7 +27658,7 @@
     </p:spTree>
     <p:extLst>
       <p:ext uri="{BB962C8B-B14F-4D97-AF65-F5344CB8AC3E}">
-        <p14:creationId xmlns:p14="http://schemas.microsoft.com/office/powerpoint/2010/main" val="1968603056"/>
+        <p14:creationId xmlns:p14="http://schemas.microsoft.com/office/powerpoint/2010/main" val="1632335804"/>
       </p:ext>
     </p:extLst>
   </p:cSld>
@@ -27511,7 +27835,7 @@
                                     <p:cond delay="0"/>
                                   </p:stCondLst>
                                   <p:childTnLst>
-                                    <p:animMotion origin="layout" path="M 0 0 C 0.089307 0.1051337 0.089307 0.1051337 0.178614 0.2102674 E" pathEditMode="relative" ptsTypes="">
+                                    <p:animMotion origin="layout" path="M 0 0 C 0.08930698 0.1051338 0.08930698 0.1051338 0.178614 0.2102676 E" pathEditMode="relative" ptsTypes="">
                                       <p:cBhvr>
                                         <p:cTn id="17" dur="500" fill="hold"/>
                                         <p:tgtEl>
@@ -27539,7 +27863,7 @@
                                           <p:spTgt spid="22"/>
                                         </p:tgtEl>
                                       </p:cBhvr>
-                                      <p:by x="235691" y="235691"/>
+                                      <p:by x="235673" y="235673"/>
                                     </p:animScale>
                                   </p:childTnLst>
                                 </p:cTn>
@@ -27739,7 +28063,7 @@
                                     <p:cond delay="0"/>
                                   </p:stCondLst>
                                   <p:childTnLst>
-                                    <p:animMotion origin="layout" path="M 0 0 C 0.2104742 0.2477727 0.2104742 0.2477727 0.4209484 0.4955453 E" pathEditMode="relative" ptsTypes="">
+                                    <p:animMotion origin="layout" path="M 0 0 C 0.2104428 0.2477378 0.2104428 0.2477378 0.4208856 0.4954756 E" pathEditMode="relative" ptsTypes="">
                                       <p:cBhvr>
                                         <p:cTn id="36" dur="1" fill="hold"/>
                                         <p:tgtEl>
@@ -27767,7 +28091,7 @@
                                           <p:spTgt spid="25"/>
                                         </p:tgtEl>
                                       </p:cBhvr>
-                                      <p:by x="235693" y="235693"/>
+                                      <p:by x="235671" y="235671"/>
                                     </p:animScale>
                                   </p:childTnLst>
                                 </p:cTn>
@@ -27822,7 +28146,7 @@
                                     <p:cond delay="0"/>
                                   </p:stCondLst>
                                   <p:childTnLst>
-                                    <p:animMotion origin="layout" path="M 0.4209484 0.4955453 C 0.4328169 0.9727173 0.4328169 0.9727173 0.4446853 1.449889 E" pathEditMode="relative" ptsTypes="">
+                                    <p:animMotion origin="layout" path="M 0.4208857 0.4954756 C 0.4327389 0.9724518 0.4327389 0.9724518 0.4445921 1.449428 E" pathEditMode="relative" ptsTypes="">
                                       <p:cBhvr>
                                         <p:cTn id="44" dur="400" fill="hold"/>
                                         <p:tgtEl>
@@ -27850,7 +28174,7 @@
                                           <p:spTgt spid="25"/>
                                         </p:tgtEl>
                                       </p:cBhvr>
-                                      <p:by x="224368" y="224372"/>
+                                      <p:by x="224342" y="224333"/>
                                     </p:animScale>
                                   </p:childTnLst>
                                 </p:cTn>
@@ -28023,7 +28347,7 @@
                                     <p:cond delay="0"/>
                                   </p:stCondLst>
                                   <p:childTnLst>
-                                    <p:animMotion origin="layout" path="M 0 0 C 0.2223462 0.7249445 0.2223462 0.7249445 0.4446925 1.449889 E" pathEditMode="relative" ptsTypes="">
+                                    <p:animMotion origin="layout" path="M 0 0 C 0.2222958 0.7247232 0.2222958 0.7247232 0.4445916 1.449446 E" pathEditMode="relative" ptsTypes="">
                                       <p:cBhvr>
                                         <p:cTn id="61" dur="1" fill="hold"/>
                                         <p:tgtEl>
@@ -28051,7 +28375,7 @@
                                           <p:spTgt spid="28"/>
                                         </p:tgtEl>
                                       </p:cBhvr>
-                                      <p:by x="528828" y="528828"/>
+                                      <p:by x="528709" y="528709"/>
                                     </p:animScale>
                                   </p:childTnLst>
                                 </p:cTn>
@@ -28106,7 +28430,7 @@
                                     <p:cond delay="0"/>
                                   </p:stCondLst>
                                   <p:childTnLst>
-                                    <p:animMotion origin="layout" path="M 0.4446925 1.449889 C 0.002813399 0.8386196 0.002813399 0.8386196 -0.4390657 0.2273501 E" pathEditMode="relative" ptsTypes="">
+                                    <p:animMotion origin="layout" path="M 0.4445916 1.449447 C 0.0027771 0.8383933 0.0027771 0.8383933 -0.4390375 0.2273406 E" pathEditMode="relative" ptsTypes="">
                                       <p:cBhvr>
                                         <p:cTn id="69" dur="400" fill="hold"/>
                                         <p:tgtEl>
@@ -28134,7 +28458,7 @@
                                           <p:spTgt spid="28"/>
                                         </p:tgtEl>
                                       </p:cBhvr>
-                                      <p:by x="35516" y="35515"/>
+                                      <p:by x="35522" y="35523"/>
                                     </p:animScale>
                                   </p:childTnLst>
                                 </p:cTn>
@@ -28307,7 +28631,7 @@
                                     <p:cond delay="0"/>
                                   </p:stCondLst>
                                   <p:childTnLst>
-                                    <p:animMotion origin="layout" path="M 0 0 C -0.219536 0.113675 -0.219536 0.113675 -0.4390719 0.22735 E" pathEditMode="relative" ptsTypes="">
+                                    <p:animMotion origin="layout" path="M 0 0 C -0.2195188 0.1136615 -0.2195188 0.1136615 -0.4390375 0.2273229 E" pathEditMode="relative" ptsTypes="">
                                       <p:cBhvr>
                                         <p:cTn id="86" dur="1" fill="hold"/>
                                         <p:tgtEl>
@@ -28335,7 +28659,7 @@
                                           <p:spTgt spid="31"/>
                                         </p:tgtEl>
                                       </p:cBhvr>
-                                      <p:by x="187815" y="187815"/>
+                                      <p:by x="187808" y="187808"/>
                                     </p:animScale>
                                   </p:childTnLst>
                                 </p:cTn>
@@ -28390,7 +28714,7 @@
                                     <p:cond delay="0"/>
                                   </p:stCondLst>
                                   <p:childTnLst>
-                                    <p:animMotion origin="layout" path="M -0.4390718 0.22735 C -0.1814083 -0.1447552 -0.1814083 -0.1447552 0.07625526 -0.5168604 E" pathEditMode="relative" ptsTypes="">
+                                    <p:animMotion origin="layout" path="M -0.4390375 0.2273228 C -0.1813931 -0.1447375 -0.1813931 -0.1447375 0.07625118 -0.5167978 E" pathEditMode="relative" ptsTypes="">
                                       <p:cBhvr>
                                         <p:cTn id="94" dur="400" fill="hold"/>
                                         <p:tgtEl>
@@ -28418,7 +28742,7 @@
                                           <p:spTgt spid="31"/>
                                         </p:tgtEl>
                                       </p:cBhvr>
-                                      <p:by x="108283" y="108283"/>
+                                      <p:by x="108283" y="108281"/>
                                     </p:animScale>
                                   </p:childTnLst>
                                 </p:cTn>
@@ -29325,11 +29649,11 @@
   <p:clrMapOvr>
     <a:masterClrMapping/>
   </p:clrMapOvr>
-  <mc:AlternateContent xmlns:mc="http://schemas.openxmlformats.org/markup-compatibility/2006">
-    <mc:Choice xmlns:p14="http://schemas.microsoft.com/office/powerpoint/2010/main" Requires="p14">
+  <mc:AlternateContent xmlns:mc="http://schemas.openxmlformats.org/markup-compatibility/2006" xmlns:p14="http://schemas.microsoft.com/office/powerpoint/2010/main">
+    <mc:Choice Requires="p14">
       <p:transition spd="slow" p14:dur="2000" advClick="0" advTm="0"/>
     </mc:Choice>
-    <mc:Fallback>
+    <mc:Fallback xmlns="">
       <p:transition spd="slow" advClick="0" advTm="0"/>
     </mc:Fallback>
   </mc:AlternateContent>
@@ -29579,11 +29903,11 @@
   <p:clrMapOvr>
     <a:masterClrMapping/>
   </p:clrMapOvr>
-  <mc:AlternateContent xmlns:mc="http://schemas.openxmlformats.org/markup-compatibility/2006">
-    <mc:Choice xmlns:p14="http://schemas.microsoft.com/office/powerpoint/2010/main" Requires="p14">
+  <mc:AlternateContent xmlns:mc="http://schemas.openxmlformats.org/markup-compatibility/2006" xmlns:p14="http://schemas.microsoft.com/office/powerpoint/2010/main">
+    <mc:Choice Requires="p14">
       <p:transition spd="slow" p14:dur="2000"/>
     </mc:Choice>
-    <mc:Fallback>
+    <mc:Fallback xmlns="">
       <p:transition spd="slow"/>
     </mc:Fallback>
   </mc:AlternateContent>
@@ -29854,11 +30178,11 @@
   <p:clrMapOvr>
     <a:masterClrMapping/>
   </p:clrMapOvr>
-  <mc:AlternateContent xmlns:mc="http://schemas.openxmlformats.org/markup-compatibility/2006">
-    <mc:Choice xmlns:p14="http://schemas.microsoft.com/office/powerpoint/2010/main" Requires="p14">
+  <mc:AlternateContent xmlns:mc="http://schemas.openxmlformats.org/markup-compatibility/2006" xmlns:p14="http://schemas.microsoft.com/office/powerpoint/2010/main">
+    <mc:Choice Requires="p14">
       <p:transition spd="slow" p14:dur="2000"/>
     </mc:Choice>
-    <mc:Fallback>
+    <mc:Fallback xmlns="">
       <p:transition spd="slow"/>
     </mc:Fallback>
   </mc:AlternateContent>

</xml_diff>